<commit_message>
water in greedy, it works, and almost finished ppt
</commit_message>
<xml_diff>
--- a/files/presentatie heuristieken.pptx
+++ b/files/presentatie heuristieken.pptx
@@ -7,15 +7,11 @@
   <p:sldIdLst>
     <p:sldId id="256" r:id="rId2"/>
     <p:sldId id="257" r:id="rId3"/>
-    <p:sldId id="263" r:id="rId4"/>
-    <p:sldId id="259" r:id="rId5"/>
-    <p:sldId id="260" r:id="rId6"/>
-    <p:sldId id="261" r:id="rId7"/>
-    <p:sldId id="267" r:id="rId8"/>
-    <p:sldId id="265" r:id="rId9"/>
-    <p:sldId id="262" r:id="rId10"/>
-    <p:sldId id="264" r:id="rId11"/>
-    <p:sldId id="266" r:id="rId12"/>
+    <p:sldId id="267" r:id="rId4"/>
+    <p:sldId id="265" r:id="rId5"/>
+    <p:sldId id="262" r:id="rId6"/>
+    <p:sldId id="268" r:id="rId7"/>
+    <p:sldId id="269" r:id="rId8"/>
   </p:sldIdLst>
   <p:sldSz cx="12192000" cy="6858000"/>
   <p:notesSz cx="6858000" cy="9144000"/>
@@ -116,7 +112,7 @@
   </p:defaultTextStyle>
   <p:extLst>
     <p:ext uri="{EFAFB233-063F-42B5-8137-9DF3F51BA10A}">
-      <p15:sldGuideLst xmlns:p15="http://schemas.microsoft.com/office/powerpoint/2012/main">
+      <p15:sldGuideLst xmlns:p15="http://schemas.microsoft.com/office/powerpoint/2012/main" xmlns="">
         <p15:guide id="1" orient="horz" pos="2160">
           <p15:clr>
             <a:srgbClr val="A4A3A4"/>
@@ -878,7 +874,7 @@
           <a:p>
             <a:fld id="{B527434C-DB8D-3E4A-85E1-336D115BA189}" type="datetimeFigureOut">
               <a:rPr lang="nl-NL" smtClean="0"/>
-              <a:t>20-4-2018</a:t>
+              <a:t>1-5-2018</a:t>
             </a:fld>
             <a:endParaRPr lang="nl-NL"/>
           </a:p>
@@ -1124,7 +1120,7 @@
           <a:p>
             <a:fld id="{B527434C-DB8D-3E4A-85E1-336D115BA189}" type="datetimeFigureOut">
               <a:rPr lang="nl-NL" smtClean="0"/>
-              <a:t>20-4-2018</a:t>
+              <a:t>1-5-2018</a:t>
             </a:fld>
             <a:endParaRPr lang="nl-NL"/>
           </a:p>
@@ -1433,7 +1429,7 @@
           <a:p>
             <a:fld id="{B527434C-DB8D-3E4A-85E1-336D115BA189}" type="datetimeFigureOut">
               <a:rPr lang="nl-NL" smtClean="0"/>
-              <a:t>20-4-2018</a:t>
+              <a:t>1-5-2018</a:t>
             </a:fld>
             <a:endParaRPr lang="nl-NL"/>
           </a:p>
@@ -1761,7 +1757,7 @@
           <a:p>
             <a:fld id="{B527434C-DB8D-3E4A-85E1-336D115BA189}" type="datetimeFigureOut">
               <a:rPr lang="nl-NL" smtClean="0"/>
-              <a:t>20-4-2018</a:t>
+              <a:t>1-5-2018</a:t>
             </a:fld>
             <a:endParaRPr lang="nl-NL"/>
           </a:p>
@@ -2070,7 +2066,7 @@
           <a:p>
             <a:fld id="{B527434C-DB8D-3E4A-85E1-336D115BA189}" type="datetimeFigureOut">
               <a:rPr lang="nl-NL" smtClean="0"/>
-              <a:t>20-4-2018</a:t>
+              <a:t>1-5-2018</a:t>
             </a:fld>
             <a:endParaRPr lang="nl-NL"/>
           </a:p>
@@ -2458,7 +2454,7 @@
           <a:p>
             <a:fld id="{B527434C-DB8D-3E4A-85E1-336D115BA189}" type="datetimeFigureOut">
               <a:rPr lang="nl-NL" smtClean="0"/>
-              <a:t>20-4-2018</a:t>
+              <a:t>1-5-2018</a:t>
             </a:fld>
             <a:endParaRPr lang="nl-NL"/>
           </a:p>
@@ -2623,7 +2619,7 @@
           <a:p>
             <a:fld id="{B527434C-DB8D-3E4A-85E1-336D115BA189}" type="datetimeFigureOut">
               <a:rPr lang="nl-NL" smtClean="0"/>
-              <a:t>20-4-2018</a:t>
+              <a:t>1-5-2018</a:t>
             </a:fld>
             <a:endParaRPr lang="nl-NL"/>
           </a:p>
@@ -2798,7 +2794,7 @@
           <a:p>
             <a:fld id="{B527434C-DB8D-3E4A-85E1-336D115BA189}" type="datetimeFigureOut">
               <a:rPr lang="nl-NL" smtClean="0"/>
-              <a:t>20-4-2018</a:t>
+              <a:t>1-5-2018</a:t>
             </a:fld>
             <a:endParaRPr lang="nl-NL"/>
           </a:p>
@@ -2963,7 +2959,7 @@
           <a:p>
             <a:fld id="{B527434C-DB8D-3E4A-85E1-336D115BA189}" type="datetimeFigureOut">
               <a:rPr lang="nl-NL" smtClean="0"/>
-              <a:t>20-4-2018</a:t>
+              <a:t>1-5-2018</a:t>
             </a:fld>
             <a:endParaRPr lang="nl-NL"/>
           </a:p>
@@ -3205,7 +3201,7 @@
           <a:p>
             <a:fld id="{B527434C-DB8D-3E4A-85E1-336D115BA189}" type="datetimeFigureOut">
               <a:rPr lang="nl-NL" smtClean="0"/>
-              <a:t>20-4-2018</a:t>
+              <a:t>1-5-2018</a:t>
             </a:fld>
             <a:endParaRPr lang="nl-NL"/>
           </a:p>
@@ -3432,7 +3428,7 @@
           <a:p>
             <a:fld id="{B527434C-DB8D-3E4A-85E1-336D115BA189}" type="datetimeFigureOut">
               <a:rPr lang="nl-NL" smtClean="0"/>
-              <a:t>20-4-2018</a:t>
+              <a:t>1-5-2018</a:t>
             </a:fld>
             <a:endParaRPr lang="nl-NL"/>
           </a:p>
@@ -3801,7 +3797,7 @@
           <a:p>
             <a:fld id="{B527434C-DB8D-3E4A-85E1-336D115BA189}" type="datetimeFigureOut">
               <a:rPr lang="nl-NL" smtClean="0"/>
-              <a:t>20-4-2018</a:t>
+              <a:t>1-5-2018</a:t>
             </a:fld>
             <a:endParaRPr lang="nl-NL"/>
           </a:p>
@@ -3919,7 +3915,7 @@
           <a:p>
             <a:fld id="{B527434C-DB8D-3E4A-85E1-336D115BA189}" type="datetimeFigureOut">
               <a:rPr lang="nl-NL" smtClean="0"/>
-              <a:t>20-4-2018</a:t>
+              <a:t>1-5-2018</a:t>
             </a:fld>
             <a:endParaRPr lang="nl-NL"/>
           </a:p>
@@ -4009,7 +4005,7 @@
           <a:p>
             <a:fld id="{B527434C-DB8D-3E4A-85E1-336D115BA189}" type="datetimeFigureOut">
               <a:rPr lang="nl-NL" smtClean="0"/>
-              <a:t>20-4-2018</a:t>
+              <a:t>1-5-2018</a:t>
             </a:fld>
             <a:endParaRPr lang="nl-NL"/>
           </a:p>
@@ -4259,7 +4255,7 @@
           <a:p>
             <a:fld id="{B527434C-DB8D-3E4A-85E1-336D115BA189}" type="datetimeFigureOut">
               <a:rPr lang="nl-NL" smtClean="0"/>
-              <a:t>20-4-2018</a:t>
+              <a:t>1-5-2018</a:t>
             </a:fld>
             <a:endParaRPr lang="nl-NL"/>
           </a:p>
@@ -4559,7 +4555,7 @@
           <a:p>
             <a:fld id="{B527434C-DB8D-3E4A-85E1-336D115BA189}" type="datetimeFigureOut">
               <a:rPr lang="nl-NL" smtClean="0"/>
-              <a:t>20-4-2018</a:t>
+              <a:t>1-5-2018</a:t>
             </a:fld>
             <a:endParaRPr lang="nl-NL"/>
           </a:p>
@@ -5256,7 +5252,7 @@
           <a:p>
             <a:fld id="{B527434C-DB8D-3E4A-85E1-336D115BA189}" type="datetimeFigureOut">
               <a:rPr lang="nl-NL" smtClean="0"/>
-              <a:t>20-4-2018</a:t>
+              <a:t>1-5-2018</a:t>
             </a:fld>
             <a:endParaRPr lang="nl-NL"/>
           </a:p>
@@ -5762,7 +5758,7 @@
   </p:txStyles>
   <p:extLst>
     <p:ext uri="{27BBF7A9-308A-43DC-89C8-2F10F3537804}">
-      <p15:sldGuideLst xmlns:p15="http://schemas.microsoft.com/office/powerpoint/2012/main"/>
+      <p15:sldGuideLst xmlns:p15="http://schemas.microsoft.com/office/powerpoint/2012/main" xmlns=""/>
     </p:ext>
   </p:extLst>
 </p:sldMaster>
@@ -5875,6 +5871,14 @@
               </a:rPr>
               <a:t>Sterkenburg</a:t>
             </a:r>
+            <a:r>
+              <a:rPr lang="nl-NL" sz="2800" dirty="0">
+                <a:solidFill>
+                  <a:schemeClr val="tx1"/>
+                </a:solidFill>
+              </a:rPr>
+              <a:t/>
+            </a:r>
             <a:br>
               <a:rPr lang="nl-NL" sz="2800" dirty="0">
                 <a:solidFill>
@@ -5905,477 +5909,6 @@
     <p:extLst>
       <p:ext uri="{BB962C8B-B14F-4D97-AF65-F5344CB8AC3E}">
         <p14:creationId xmlns:p14="http://schemas.microsoft.com/office/powerpoint/2010/main" val="761445126"/>
-      </p:ext>
-    </p:extLst>
-  </p:cSld>
-  <p:clrMapOvr>
-    <a:masterClrMapping/>
-  </p:clrMapOvr>
-</p:sld>
-</file>
-
-<file path=ppt/slides/slide10.xml><?xml version="1.0" encoding="utf-8"?>
-<p:sld xmlns:a="http://schemas.openxmlformats.org/drawingml/2006/main" xmlns:r="http://schemas.openxmlformats.org/officeDocument/2006/relationships" xmlns:p="http://schemas.openxmlformats.org/presentationml/2006/main">
-  <p:cSld>
-    <p:spTree>
-      <p:nvGrpSpPr>
-        <p:cNvPr id="1" name=""/>
-        <p:cNvGrpSpPr/>
-        <p:nvPr/>
-      </p:nvGrpSpPr>
-      <p:grpSpPr>
-        <a:xfrm>
-          <a:off x="0" y="0"/>
-          <a:ext cx="0" cy="0"/>
-          <a:chOff x="0" y="0"/>
-          <a:chExt cx="0" cy="0"/>
-        </a:xfrm>
-      </p:grpSpPr>
-      <p:pic>
-        <p:nvPicPr>
-          <p:cNvPr id="3" name="Tijdelijke aanduiding voor inhoud 3"/>
-          <p:cNvPicPr>
-            <a:picLocks noChangeAspect="1"/>
-          </p:cNvPicPr>
-          <p:nvPr/>
-        </p:nvPicPr>
-        <p:blipFill>
-          <a:blip r:embed="rId2">
-            <a:extLst>
-              <a:ext uri="{28A0092B-C50C-407E-A947-70E740481C1C}">
-                <a14:useLocalDpi xmlns:a14="http://schemas.microsoft.com/office/drawing/2010/main" val="0"/>
-              </a:ext>
-            </a:extLst>
-          </a:blip>
-          <a:stretch>
-            <a:fillRect/>
-          </a:stretch>
-        </p:blipFill>
-        <p:spPr>
-          <a:xfrm>
-            <a:off x="1846589" y="585836"/>
-            <a:ext cx="5507431" cy="5176985"/>
-          </a:xfrm>
-          <a:prstGeom prst="rect">
-            <a:avLst/>
-          </a:prstGeom>
-        </p:spPr>
-      </p:pic>
-      <p:sp>
-        <p:nvSpPr>
-          <p:cNvPr id="2" name="Tijdelijke aanduiding voor inhoud 1"/>
-          <p:cNvSpPr>
-            <a:spLocks noGrp="1"/>
-          </p:cNvSpPr>
-          <p:nvPr>
-            <p:ph idx="1"/>
-          </p:nvPr>
-        </p:nvSpPr>
-        <p:spPr/>
-        <p:txBody>
-          <a:bodyPr/>
-          <a:lstStyle/>
-          <a:p>
-            <a:endParaRPr lang="nl-NL"/>
-          </a:p>
-        </p:txBody>
-      </p:sp>
-    </p:spTree>
-    <p:extLst>
-      <p:ext uri="{BB962C8B-B14F-4D97-AF65-F5344CB8AC3E}">
-        <p14:creationId xmlns:p14="http://schemas.microsoft.com/office/powerpoint/2010/main" val="543281600"/>
-      </p:ext>
-    </p:extLst>
-  </p:cSld>
-  <p:clrMapOvr>
-    <a:masterClrMapping/>
-  </p:clrMapOvr>
-</p:sld>
-</file>
-
-<file path=ppt/slides/slide11.xml><?xml version="1.0" encoding="utf-8"?>
-<p:sld xmlns:a="http://schemas.openxmlformats.org/drawingml/2006/main" xmlns:r="http://schemas.openxmlformats.org/officeDocument/2006/relationships" xmlns:p="http://schemas.openxmlformats.org/presentationml/2006/main">
-  <p:cSld>
-    <p:spTree>
-      <p:nvGrpSpPr>
-        <p:cNvPr id="1" name=""/>
-        <p:cNvGrpSpPr/>
-        <p:nvPr/>
-      </p:nvGrpSpPr>
-      <p:grpSpPr>
-        <a:xfrm>
-          <a:off x="0" y="0"/>
-          <a:ext cx="0" cy="0"/>
-          <a:chOff x="0" y="0"/>
-          <a:chExt cx="0" cy="0"/>
-        </a:xfrm>
-      </p:grpSpPr>
-      <p:sp>
-        <p:nvSpPr>
-          <p:cNvPr id="2" name="Titel 1"/>
-          <p:cNvSpPr>
-            <a:spLocks noGrp="1"/>
-          </p:cNvSpPr>
-          <p:nvPr>
-            <p:ph type="title"/>
-          </p:nvPr>
-        </p:nvSpPr>
-        <p:spPr/>
-        <p:txBody>
-          <a:bodyPr/>
-          <a:lstStyle/>
-          <a:p>
-            <a:r>
-              <a:rPr lang="en-US" dirty="0" err="1"/>
-              <a:t>Strategie</a:t>
-            </a:r>
-            <a:endParaRPr lang="nl-NL" dirty="0"/>
-          </a:p>
-        </p:txBody>
-      </p:sp>
-      <p:sp>
-        <p:nvSpPr>
-          <p:cNvPr id="3" name="Tijdelijke aanduiding voor inhoud 2"/>
-          <p:cNvSpPr>
-            <a:spLocks noGrp="1"/>
-          </p:cNvSpPr>
-          <p:nvPr>
-            <p:ph idx="1"/>
-          </p:nvPr>
-        </p:nvSpPr>
-        <p:spPr/>
-        <p:txBody>
-          <a:bodyPr>
-            <a:normAutofit/>
-          </a:bodyPr>
-          <a:lstStyle/>
-          <a:p>
-            <a:pPr>
-              <a:buFont typeface="Arial" panose="020B0604020202020204" pitchFamily="34" charset="0"/>
-              <a:buChar char="•"/>
-            </a:pPr>
-            <a:r>
-              <a:rPr lang="en-US" sz="2800" dirty="0" err="1">
-                <a:solidFill>
-                  <a:schemeClr val="tx1"/>
-                </a:solidFill>
-              </a:rPr>
-              <a:t>Huizen</a:t>
-            </a:r>
-            <a:r>
-              <a:rPr lang="en-US" sz="2800" dirty="0">
-                <a:solidFill>
-                  <a:schemeClr val="tx1"/>
-                </a:solidFill>
-              </a:rPr>
-              <a:t> </a:t>
-            </a:r>
-            <a:r>
-              <a:rPr lang="en-US" sz="2800" dirty="0" err="1">
-                <a:solidFill>
-                  <a:schemeClr val="tx1"/>
-                </a:solidFill>
-              </a:rPr>
-              <a:t>kunnen</a:t>
-            </a:r>
-            <a:r>
-              <a:rPr lang="en-US" sz="2800" dirty="0">
-                <a:solidFill>
-                  <a:schemeClr val="tx1"/>
-                </a:solidFill>
-              </a:rPr>
-              <a:t> </a:t>
-            </a:r>
-            <a:r>
-              <a:rPr lang="en-US" sz="2800" dirty="0" err="1">
-                <a:solidFill>
-                  <a:schemeClr val="tx1"/>
-                </a:solidFill>
-              </a:rPr>
-              <a:t>ook</a:t>
-            </a:r>
-            <a:r>
-              <a:rPr lang="en-US" sz="2800" dirty="0">
-                <a:solidFill>
-                  <a:schemeClr val="tx1"/>
-                </a:solidFill>
-              </a:rPr>
-              <a:t> minder </a:t>
-            </a:r>
-            <a:r>
-              <a:rPr lang="en-US" sz="2800" dirty="0" err="1">
-                <a:solidFill>
-                  <a:schemeClr val="tx1"/>
-                </a:solidFill>
-              </a:rPr>
-              <a:t>dan</a:t>
-            </a:r>
-            <a:r>
-              <a:rPr lang="en-US" sz="2800" dirty="0">
-                <a:solidFill>
-                  <a:schemeClr val="tx1"/>
-                </a:solidFill>
-              </a:rPr>
-              <a:t> </a:t>
-            </a:r>
-            <a:r>
-              <a:rPr lang="en-US" sz="2800" dirty="0" err="1">
-                <a:solidFill>
-                  <a:schemeClr val="tx1"/>
-                </a:solidFill>
-              </a:rPr>
-              <a:t>een</a:t>
-            </a:r>
-            <a:r>
-              <a:rPr lang="en-US" sz="2800" dirty="0">
-                <a:solidFill>
-                  <a:schemeClr val="tx1"/>
-                </a:solidFill>
-              </a:rPr>
-              <a:t> meter extra </a:t>
-            </a:r>
-            <a:r>
-              <a:rPr lang="en-US" sz="2800" dirty="0" err="1">
-                <a:solidFill>
-                  <a:schemeClr val="tx1"/>
-                </a:solidFill>
-              </a:rPr>
-              <a:t>vrijstand</a:t>
-            </a:r>
-            <a:r>
-              <a:rPr lang="en-US" sz="2800" dirty="0">
-                <a:solidFill>
-                  <a:schemeClr val="tx1"/>
-                </a:solidFill>
-              </a:rPr>
-              <a:t> </a:t>
-            </a:r>
-            <a:r>
-              <a:rPr lang="en-US" sz="2800" dirty="0" err="1">
-                <a:solidFill>
-                  <a:schemeClr val="tx1"/>
-                </a:solidFill>
-              </a:rPr>
-              <a:t>hebben</a:t>
-            </a:r>
-            <a:endParaRPr lang="en-US" sz="2800" dirty="0">
-              <a:solidFill>
-                <a:schemeClr val="tx1"/>
-              </a:solidFill>
-            </a:endParaRPr>
-          </a:p>
-          <a:p>
-            <a:pPr>
-              <a:buFont typeface="Arial" panose="020B0604020202020204" pitchFamily="34" charset="0"/>
-              <a:buChar char="•"/>
-            </a:pPr>
-            <a:r>
-              <a:rPr lang="en-US" sz="2800" dirty="0" err="1">
-                <a:solidFill>
-                  <a:schemeClr val="tx1"/>
-                </a:solidFill>
-              </a:rPr>
-              <a:t>Maisons</a:t>
-            </a:r>
-            <a:r>
-              <a:rPr lang="en-US" sz="2800" dirty="0">
-                <a:solidFill>
-                  <a:schemeClr val="tx1"/>
-                </a:solidFill>
-              </a:rPr>
-              <a:t> </a:t>
-            </a:r>
-            <a:r>
-              <a:rPr lang="en-US" sz="2800" dirty="0" err="1">
-                <a:solidFill>
-                  <a:schemeClr val="tx1"/>
-                </a:solidFill>
-              </a:rPr>
-              <a:t>leveren</a:t>
-            </a:r>
-            <a:r>
-              <a:rPr lang="en-US" sz="2800" dirty="0">
-                <a:solidFill>
-                  <a:schemeClr val="tx1"/>
-                </a:solidFill>
-              </a:rPr>
-              <a:t> het </a:t>
-            </a:r>
-            <a:r>
-              <a:rPr lang="en-US" sz="2800" dirty="0" err="1">
-                <a:solidFill>
-                  <a:schemeClr val="tx1"/>
-                </a:solidFill>
-              </a:rPr>
-              <a:t>meeste</a:t>
-            </a:r>
-            <a:r>
-              <a:rPr lang="en-US" sz="2800" dirty="0">
-                <a:solidFill>
-                  <a:schemeClr val="tx1"/>
-                </a:solidFill>
-              </a:rPr>
-              <a:t> op; </a:t>
-            </a:r>
-            <a:r>
-              <a:rPr lang="en-US" sz="2800" dirty="0" err="1">
-                <a:solidFill>
-                  <a:schemeClr val="tx1"/>
-                </a:solidFill>
-              </a:rPr>
-              <a:t>probeer</a:t>
-            </a:r>
-            <a:r>
-              <a:rPr lang="en-US" sz="2800" dirty="0">
-                <a:solidFill>
-                  <a:schemeClr val="tx1"/>
-                </a:solidFill>
-              </a:rPr>
-              <a:t> </a:t>
-            </a:r>
-            <a:r>
-              <a:rPr lang="en-US" sz="2800" dirty="0" err="1">
-                <a:solidFill>
-                  <a:schemeClr val="tx1"/>
-                </a:solidFill>
-              </a:rPr>
-              <a:t>vrijstand</a:t>
-            </a:r>
-            <a:r>
-              <a:rPr lang="en-US" sz="2800" dirty="0">
-                <a:solidFill>
-                  <a:schemeClr val="tx1"/>
-                </a:solidFill>
-              </a:rPr>
-              <a:t> </a:t>
-            </a:r>
-            <a:r>
-              <a:rPr lang="en-US" sz="2800" dirty="0" err="1">
-                <a:solidFill>
-                  <a:schemeClr val="tx1"/>
-                </a:solidFill>
-              </a:rPr>
-              <a:t>maisons</a:t>
-            </a:r>
-            <a:r>
-              <a:rPr lang="en-US" sz="2800" dirty="0">
-                <a:solidFill>
-                  <a:schemeClr val="tx1"/>
-                </a:solidFill>
-              </a:rPr>
-              <a:t> </a:t>
-            </a:r>
-            <a:r>
-              <a:rPr lang="en-US" sz="2800" dirty="0" err="1">
-                <a:solidFill>
-                  <a:schemeClr val="tx1"/>
-                </a:solidFill>
-              </a:rPr>
-              <a:t>maximaal</a:t>
-            </a:r>
-            <a:r>
-              <a:rPr lang="en-US" sz="2800" dirty="0">
-                <a:solidFill>
-                  <a:schemeClr val="tx1"/>
-                </a:solidFill>
-              </a:rPr>
-              <a:t> </a:t>
-            </a:r>
-            <a:r>
-              <a:rPr lang="en-US" sz="2800" dirty="0" err="1">
-                <a:solidFill>
-                  <a:schemeClr val="tx1"/>
-                </a:solidFill>
-              </a:rPr>
-              <a:t>te</a:t>
-            </a:r>
-            <a:r>
-              <a:rPr lang="en-US" sz="2800" dirty="0">
-                <a:solidFill>
-                  <a:schemeClr val="tx1"/>
-                </a:solidFill>
-              </a:rPr>
-              <a:t> </a:t>
-            </a:r>
-            <a:r>
-              <a:rPr lang="en-US" sz="2800" dirty="0" err="1">
-                <a:solidFill>
-                  <a:schemeClr val="tx1"/>
-                </a:solidFill>
-              </a:rPr>
-              <a:t>maken</a:t>
-            </a:r>
-            <a:endParaRPr lang="en-US" sz="2800" dirty="0">
-              <a:solidFill>
-                <a:schemeClr val="tx1"/>
-              </a:solidFill>
-            </a:endParaRPr>
-          </a:p>
-          <a:p>
-            <a:pPr>
-              <a:buFont typeface="Arial" panose="020B0604020202020204" pitchFamily="34" charset="0"/>
-              <a:buChar char="•"/>
-            </a:pPr>
-            <a:r>
-              <a:rPr lang="en-US" sz="2800" dirty="0" err="1">
-                <a:solidFill>
-                  <a:schemeClr val="tx1"/>
-                </a:solidFill>
-              </a:rPr>
-              <a:t>Voor</a:t>
-            </a:r>
-            <a:r>
-              <a:rPr lang="en-US" sz="2800" dirty="0">
-                <a:solidFill>
-                  <a:schemeClr val="tx1"/>
-                </a:solidFill>
-              </a:rPr>
-              <a:t> 60-huizenvariant: </a:t>
-            </a:r>
-            <a:r>
-              <a:rPr lang="en-US" sz="2800" dirty="0" err="1">
-                <a:solidFill>
-                  <a:schemeClr val="tx1"/>
-                </a:solidFill>
-              </a:rPr>
-              <a:t>optimaliseer</a:t>
-            </a:r>
-            <a:r>
-              <a:rPr lang="en-US" sz="2800" dirty="0">
-                <a:solidFill>
-                  <a:schemeClr val="tx1"/>
-                </a:solidFill>
-              </a:rPr>
-              <a:t> de </a:t>
-            </a:r>
-            <a:r>
-              <a:rPr lang="en-US" sz="2800" dirty="0" err="1">
-                <a:solidFill>
-                  <a:schemeClr val="tx1"/>
-                </a:solidFill>
-              </a:rPr>
-              <a:t>omtrek</a:t>
-            </a:r>
-            <a:r>
-              <a:rPr lang="en-US" sz="2800" dirty="0">
-                <a:solidFill>
-                  <a:schemeClr val="tx1"/>
-                </a:solidFill>
-              </a:rPr>
-              <a:t> van het water</a:t>
-            </a:r>
-            <a:endParaRPr lang="nl-NL" sz="2800" dirty="0">
-              <a:solidFill>
-                <a:schemeClr val="tx1"/>
-              </a:solidFill>
-            </a:endParaRPr>
-          </a:p>
-        </p:txBody>
-      </p:sp>
-    </p:spTree>
-    <p:extLst>
-      <p:ext uri="{BB962C8B-B14F-4D97-AF65-F5344CB8AC3E}">
-        <p14:creationId xmlns:p14="http://schemas.microsoft.com/office/powerpoint/2010/main" val="3593608854"/>
       </p:ext>
     </p:extLst>
   </p:cSld>
@@ -6473,6 +6006,15 @@
                 <a:sym typeface="Wingdings"/>
               </a:rPr>
             </a:br>
+            <a:r>
+              <a:rPr lang="nl-NL" dirty="0">
+                <a:solidFill>
+                  <a:schemeClr val="tx1"/>
+                </a:solidFill>
+                <a:sym typeface="Wingdings"/>
+              </a:rPr>
+              <a:t/>
+            </a:r>
             <a:br>
               <a:rPr lang="nl-NL" dirty="0">
                 <a:solidFill>
@@ -6489,30 +6031,137 @@
           </a:p>
         </p:txBody>
       </p:sp>
-      <p:pic>
-        <p:nvPicPr>
-          <p:cNvPr id="4" name="Afbeelding 3"/>
-          <p:cNvPicPr>
-            <a:picLocks noChangeAspect="1"/>
-          </p:cNvPicPr>
+      <p:sp>
+        <p:nvSpPr>
+          <p:cNvPr id="3" name="Tekstvak 2"/>
+          <p:cNvSpPr txBox="1"/>
           <p:nvPr/>
-        </p:nvPicPr>
-        <p:blipFill>
-          <a:blip r:embed="rId2"/>
-          <a:stretch>
-            <a:fillRect/>
-          </a:stretch>
-        </p:blipFill>
+        </p:nvSpPr>
         <p:spPr>
           <a:xfrm>
-            <a:off x="677334" y="2736668"/>
-            <a:ext cx="4534747" cy="3644536"/>
+            <a:off x="677334" y="2640169"/>
+            <a:ext cx="3657600" cy="3231654"/>
           </a:xfrm>
           <a:prstGeom prst="rect">
             <a:avLst/>
           </a:prstGeom>
+          <a:noFill/>
         </p:spPr>
-      </p:pic>
+        <p:txBody>
+          <a:bodyPr wrap="square" rtlCol="0">
+            <a:spAutoFit/>
+          </a:bodyPr>
+          <a:lstStyle/>
+          <a:p>
+            <a:pPr marL="285750" indent="-285750">
+              <a:buFontTx/>
+              <a:buChar char="-"/>
+            </a:pPr>
+            <a:r>
+              <a:rPr lang="nl-NL" sz="2800" dirty="0" err="1" smtClean="0"/>
+              <a:t>Eengezins</a:t>
+            </a:r>
+            <a:endParaRPr lang="nl-NL" sz="2800" dirty="0" smtClean="0"/>
+          </a:p>
+          <a:p>
+            <a:pPr marL="742950" lvl="1" indent="-285750">
+              <a:buFontTx/>
+              <a:buChar char="-"/>
+            </a:pPr>
+            <a:r>
+              <a:rPr lang="nl-NL" sz="2000" dirty="0" smtClean="0"/>
+              <a:t>8x8, 2 </a:t>
+            </a:r>
+            <a:r>
+              <a:rPr lang="nl-NL" sz="2000" dirty="0" err="1" smtClean="0"/>
+              <a:t>vrijstand</a:t>
+            </a:r>
+            <a:endParaRPr lang="nl-NL" sz="2000" dirty="0" smtClean="0"/>
+          </a:p>
+          <a:p>
+            <a:pPr marL="742950" lvl="1" indent="-285750">
+              <a:buFontTx/>
+              <a:buChar char="-"/>
+            </a:pPr>
+            <a:r>
+              <a:rPr lang="nl-NL" sz="2000" dirty="0" smtClean="0"/>
+              <a:t>€285.000, +3%</a:t>
+            </a:r>
+          </a:p>
+          <a:p>
+            <a:pPr marL="285750" indent="-285750">
+              <a:buFontTx/>
+              <a:buChar char="-"/>
+            </a:pPr>
+            <a:r>
+              <a:rPr lang="nl-NL" sz="2800" dirty="0" smtClean="0"/>
+              <a:t>Bungalow</a:t>
+            </a:r>
+          </a:p>
+          <a:p>
+            <a:pPr marL="742950" lvl="1" indent="-285750">
+              <a:buFontTx/>
+              <a:buChar char="-"/>
+            </a:pPr>
+            <a:r>
+              <a:rPr lang="nl-NL" sz="2000" dirty="0" smtClean="0"/>
+              <a:t>10x7.5, 3 </a:t>
+            </a:r>
+            <a:r>
+              <a:rPr lang="nl-NL" sz="2000" dirty="0" err="1" smtClean="0"/>
+              <a:t>vrijstand</a:t>
+            </a:r>
+            <a:endParaRPr lang="nl-NL" sz="2000" dirty="0" smtClean="0"/>
+          </a:p>
+          <a:p>
+            <a:pPr marL="742950" lvl="1" indent="-285750">
+              <a:buFontTx/>
+              <a:buChar char="-"/>
+            </a:pPr>
+            <a:r>
+              <a:rPr lang="nl-NL" sz="2000" dirty="0" smtClean="0"/>
+              <a:t>€399.000, +4%</a:t>
+            </a:r>
+            <a:endParaRPr lang="nl-NL" dirty="0"/>
+          </a:p>
+          <a:p>
+            <a:pPr marL="285750" indent="-285750">
+              <a:buFontTx/>
+              <a:buChar char="-"/>
+            </a:pPr>
+            <a:r>
+              <a:rPr lang="nl-NL" sz="2800" dirty="0" smtClean="0"/>
+              <a:t>Maison</a:t>
+            </a:r>
+          </a:p>
+          <a:p>
+            <a:pPr marL="742950" lvl="1" indent="-285750">
+              <a:buFontTx/>
+              <a:buChar char="-"/>
+            </a:pPr>
+            <a:r>
+              <a:rPr lang="nl-NL" sz="2000" dirty="0" smtClean="0"/>
+              <a:t>11x10.5, 6 </a:t>
+            </a:r>
+            <a:r>
+              <a:rPr lang="nl-NL" sz="2000" dirty="0" err="1" smtClean="0"/>
+              <a:t>vrijstand</a:t>
+            </a:r>
+            <a:endParaRPr lang="nl-NL" sz="2000" dirty="0" smtClean="0"/>
+          </a:p>
+          <a:p>
+            <a:pPr marL="742950" lvl="1" indent="-285750">
+              <a:buFontTx/>
+              <a:buChar char="-"/>
+            </a:pPr>
+            <a:r>
+              <a:rPr lang="nl-NL" sz="2000" dirty="0" smtClean="0"/>
+              <a:t>€610.000 + 6%</a:t>
+            </a:r>
+            <a:endParaRPr lang="nl-NL" sz="2000" dirty="0"/>
+          </a:p>
+        </p:txBody>
+      </p:sp>
     </p:spTree>
     <p:extLst>
       <p:ext uri="{BB962C8B-B14F-4D97-AF65-F5344CB8AC3E}">
@@ -6559,9 +6208,10 @@
           <a:lstStyle/>
           <a:p>
             <a:r>
-              <a:rPr lang="nl-NL" dirty="0"/>
-              <a:t>Voorwaarden:</a:t>
-            </a:r>
+              <a:rPr lang="en-US" dirty="0" err="1"/>
+              <a:t>Datastructuur</a:t>
+            </a:r>
+            <a:endParaRPr lang="nl-NL" dirty="0"/>
           </a:p>
         </p:txBody>
       </p:sp>
@@ -6577,118 +6227,314 @@
         </p:nvSpPr>
         <p:spPr/>
         <p:txBody>
-          <a:bodyPr/>
-          <a:lstStyle/>
-          <a:p>
-            <a:pPr lvl="0">
-              <a:buFont typeface="Arial" charset="0"/>
+          <a:bodyPr>
+            <a:normAutofit/>
+          </a:bodyPr>
+          <a:lstStyle/>
+          <a:p>
+            <a:pPr>
+              <a:buFont typeface="Arial" panose="020B0604020202020204" pitchFamily="34" charset="0"/>
               <a:buChar char="•"/>
             </a:pPr>
             <a:r>
-              <a:rPr lang="nl-NL" sz="2800" dirty="0">
-                <a:solidFill>
-                  <a:schemeClr val="tx1"/>
-                </a:solidFill>
-              </a:rPr>
-              <a:t>Land 160 x 180 meter</a:t>
-            </a:r>
-          </a:p>
-          <a:p>
-            <a:pPr lvl="0">
-              <a:buFont typeface="Arial" charset="0"/>
+              <a:rPr lang="en-US" sz="2800" dirty="0" smtClean="0">
+                <a:solidFill>
+                  <a:schemeClr val="tx1"/>
+                </a:solidFill>
+              </a:rPr>
+              <a:t>Floorplan met </a:t>
+            </a:r>
+            <a:r>
+              <a:rPr lang="en-US" sz="2800" dirty="0" err="1" smtClean="0">
+                <a:solidFill>
+                  <a:schemeClr val="tx1"/>
+                </a:solidFill>
+              </a:rPr>
+              <a:t>daarin</a:t>
+            </a:r>
+            <a:r>
+              <a:rPr lang="en-US" sz="2800" dirty="0" smtClean="0">
+                <a:solidFill>
+                  <a:schemeClr val="tx1"/>
+                </a:solidFill>
+              </a:rPr>
+              <a:t> de </a:t>
+            </a:r>
+            <a:r>
+              <a:rPr lang="en-US" sz="2800" dirty="0" err="1" smtClean="0">
+                <a:solidFill>
+                  <a:schemeClr val="tx1"/>
+                </a:solidFill>
+              </a:rPr>
+              <a:t>grootte</a:t>
+            </a:r>
+            <a:r>
+              <a:rPr lang="en-US" sz="2800" dirty="0" smtClean="0">
+                <a:solidFill>
+                  <a:schemeClr val="tx1"/>
+                </a:solidFill>
+              </a:rPr>
+              <a:t> van het </a:t>
+            </a:r>
+            <a:r>
+              <a:rPr lang="en-US" sz="2800" dirty="0" err="1" smtClean="0">
+                <a:solidFill>
+                  <a:schemeClr val="tx1"/>
+                </a:solidFill>
+              </a:rPr>
+              <a:t>kavel</a:t>
+            </a:r>
+            <a:r>
+              <a:rPr lang="en-US" sz="2800" dirty="0" smtClean="0">
+                <a:solidFill>
+                  <a:schemeClr val="tx1"/>
+                </a:solidFill>
+              </a:rPr>
+              <a:t> </a:t>
+            </a:r>
+            <a:r>
+              <a:rPr lang="en-US" sz="2800" dirty="0" err="1" smtClean="0">
+                <a:solidFill>
+                  <a:schemeClr val="tx1"/>
+                </a:solidFill>
+              </a:rPr>
+              <a:t>en</a:t>
+            </a:r>
+            <a:r>
+              <a:rPr lang="en-US" sz="2800" dirty="0" smtClean="0">
+                <a:solidFill>
+                  <a:schemeClr val="tx1"/>
+                </a:solidFill>
+              </a:rPr>
+              <a:t> </a:t>
+            </a:r>
+            <a:r>
+              <a:rPr lang="en-US" sz="2800" dirty="0" err="1" smtClean="0">
+                <a:solidFill>
+                  <a:schemeClr val="tx1"/>
+                </a:solidFill>
+              </a:rPr>
+              <a:t>lijst</a:t>
+            </a:r>
+            <a:r>
+              <a:rPr lang="en-US" sz="2800" dirty="0" smtClean="0">
+                <a:solidFill>
+                  <a:schemeClr val="tx1"/>
+                </a:solidFill>
+              </a:rPr>
+              <a:t> van </a:t>
+            </a:r>
+            <a:r>
+              <a:rPr lang="en-US" sz="2800" dirty="0" err="1" smtClean="0">
+                <a:solidFill>
+                  <a:schemeClr val="tx1"/>
+                </a:solidFill>
+              </a:rPr>
+              <a:t>alle</a:t>
+            </a:r>
+            <a:r>
+              <a:rPr lang="en-US" sz="2800" dirty="0" smtClean="0">
+                <a:solidFill>
+                  <a:schemeClr val="tx1"/>
+                </a:solidFill>
+              </a:rPr>
+              <a:t> </a:t>
+            </a:r>
+            <a:r>
+              <a:rPr lang="en-US" sz="2800" dirty="0" err="1" smtClean="0">
+                <a:solidFill>
+                  <a:schemeClr val="tx1"/>
+                </a:solidFill>
+              </a:rPr>
+              <a:t>huizen</a:t>
+            </a:r>
+            <a:r>
+              <a:rPr lang="en-US" sz="2800" dirty="0" smtClean="0">
+                <a:solidFill>
+                  <a:schemeClr val="tx1"/>
+                </a:solidFill>
+              </a:rPr>
+              <a:t> </a:t>
+            </a:r>
+            <a:r>
+              <a:rPr lang="en-US" sz="2800" dirty="0" err="1" smtClean="0">
+                <a:solidFill>
+                  <a:schemeClr val="tx1"/>
+                </a:solidFill>
+              </a:rPr>
+              <a:t>en</a:t>
+            </a:r>
+            <a:r>
+              <a:rPr lang="en-US" sz="2800" dirty="0" smtClean="0">
+                <a:solidFill>
+                  <a:schemeClr val="tx1"/>
+                </a:solidFill>
+              </a:rPr>
+              <a:t> waters</a:t>
+            </a:r>
+          </a:p>
+          <a:p>
+            <a:pPr>
+              <a:buFont typeface="Arial" panose="020B0604020202020204" pitchFamily="34" charset="0"/>
               <a:buChar char="•"/>
             </a:pPr>
             <a:r>
-              <a:rPr lang="nl-NL" sz="2800" dirty="0">
-                <a:solidFill>
-                  <a:schemeClr val="tx1"/>
-                </a:solidFill>
-              </a:rPr>
-              <a:t>20% oppervlaktewater:</a:t>
-            </a:r>
-            <a:br>
-              <a:rPr lang="nl-NL" sz="2800" dirty="0">
-                <a:solidFill>
-                  <a:schemeClr val="tx1"/>
-                </a:solidFill>
-              </a:rPr>
-            </a:br>
-            <a:r>
-              <a:rPr lang="nl-NL" sz="2800" dirty="0">
-                <a:solidFill>
-                  <a:schemeClr val="tx1"/>
-                </a:solidFill>
-              </a:rPr>
-              <a:t>		ingedeeld in niet meer dan vier gebieden</a:t>
-            </a:r>
-            <a:br>
-              <a:rPr lang="nl-NL" sz="2800" dirty="0">
-                <a:solidFill>
-                  <a:schemeClr val="tx1"/>
-                </a:solidFill>
-              </a:rPr>
-            </a:br>
-            <a:r>
-              <a:rPr lang="nl-NL" sz="2800" dirty="0">
-                <a:solidFill>
-                  <a:schemeClr val="tx1"/>
-                </a:solidFill>
-              </a:rPr>
-              <a:t>		hoogte-breedteverhoudingen tussen 1-4</a:t>
-            </a:r>
-          </a:p>
-          <a:p>
-            <a:pPr lvl="0">
-              <a:buFont typeface="Arial" charset="0"/>
+              <a:rPr lang="en-US" sz="2800" dirty="0" err="1">
+                <a:solidFill>
+                  <a:schemeClr val="tx1"/>
+                </a:solidFill>
+              </a:rPr>
+              <a:t>O</a:t>
+            </a:r>
+            <a:r>
+              <a:rPr lang="en-US" sz="2800" dirty="0" err="1" smtClean="0">
+                <a:solidFill>
+                  <a:schemeClr val="tx1"/>
+                </a:solidFill>
+              </a:rPr>
+              <a:t>verkoepelende</a:t>
+            </a:r>
+            <a:r>
+              <a:rPr lang="en-US" sz="2800" dirty="0" smtClean="0">
+                <a:solidFill>
+                  <a:schemeClr val="tx1"/>
+                </a:solidFill>
+              </a:rPr>
+              <a:t> </a:t>
+            </a:r>
+            <a:r>
+              <a:rPr lang="en-US" sz="2800" dirty="0">
+                <a:solidFill>
+                  <a:schemeClr val="tx1"/>
+                </a:solidFill>
+              </a:rPr>
+              <a:t>“House”-</a:t>
+            </a:r>
+            <a:r>
+              <a:rPr lang="en-US" sz="2800" dirty="0" smtClean="0">
+                <a:solidFill>
+                  <a:schemeClr val="tx1"/>
+                </a:solidFill>
+              </a:rPr>
+              <a:t>class</a:t>
+            </a:r>
+          </a:p>
+          <a:p>
+            <a:pPr>
+              <a:buFont typeface="Arial" panose="020B0604020202020204" pitchFamily="34" charset="0"/>
               <a:buChar char="•"/>
             </a:pPr>
             <a:r>
-              <a:rPr lang="nl-NL" sz="2800" dirty="0">
-                <a:solidFill>
-                  <a:schemeClr val="tx1"/>
-                </a:solidFill>
-              </a:rPr>
-              <a:t>60% </a:t>
-            </a:r>
-            <a:r>
-              <a:rPr lang="nl-NL" sz="2800" dirty="0" err="1">
-                <a:solidFill>
-                  <a:schemeClr val="tx1"/>
-                </a:solidFill>
-              </a:rPr>
-              <a:t>eensgezinswoningen</a:t>
-            </a:r>
-            <a:r>
-              <a:rPr lang="nl-NL" sz="2800" dirty="0">
-                <a:solidFill>
-                  <a:schemeClr val="tx1"/>
-                </a:solidFill>
-              </a:rPr>
-              <a:t>, 25% bungalows, 15% </a:t>
-            </a:r>
-            <a:r>
-              <a:rPr lang="nl-NL" sz="2800" dirty="0" err="1">
-                <a:solidFill>
-                  <a:schemeClr val="tx1"/>
-                </a:solidFill>
-              </a:rPr>
-              <a:t>maisons</a:t>
-            </a:r>
-            <a:br>
-              <a:rPr lang="nl-NL" dirty="0">
-                <a:solidFill>
-                  <a:schemeClr val="tx1"/>
-                </a:solidFill>
-              </a:rPr>
-            </a:br>
-            <a:endParaRPr lang="nl-NL" dirty="0"/>
+              <a:rPr lang="en-US" sz="2800" dirty="0" smtClean="0">
+                <a:solidFill>
+                  <a:schemeClr val="tx1"/>
+                </a:solidFill>
+              </a:rPr>
+              <a:t>Subclasses </a:t>
+            </a:r>
+            <a:r>
+              <a:rPr lang="en-US" sz="2800" dirty="0" err="1">
+                <a:solidFill>
+                  <a:schemeClr val="tx1"/>
+                </a:solidFill>
+              </a:rPr>
+              <a:t>voor</a:t>
+            </a:r>
+            <a:r>
+              <a:rPr lang="en-US" sz="2800" dirty="0">
+                <a:solidFill>
+                  <a:schemeClr val="tx1"/>
+                </a:solidFill>
+              </a:rPr>
+              <a:t> de </a:t>
+            </a:r>
+            <a:r>
+              <a:rPr lang="en-US" sz="2800" dirty="0" err="1">
+                <a:solidFill>
+                  <a:schemeClr val="tx1"/>
+                </a:solidFill>
+              </a:rPr>
+              <a:t>verschillende</a:t>
+            </a:r>
+            <a:r>
+              <a:rPr lang="en-US" sz="2800" dirty="0">
+                <a:solidFill>
+                  <a:schemeClr val="tx1"/>
+                </a:solidFill>
+              </a:rPr>
+              <a:t> </a:t>
+            </a:r>
+            <a:r>
+              <a:rPr lang="en-US" sz="2800" dirty="0" err="1" smtClean="0">
+                <a:solidFill>
+                  <a:schemeClr val="tx1"/>
+                </a:solidFill>
+              </a:rPr>
+              <a:t>huizen</a:t>
+            </a:r>
+            <a:endParaRPr lang="en-US" sz="2800" dirty="0" smtClean="0">
+              <a:solidFill>
+                <a:schemeClr val="tx1"/>
+              </a:solidFill>
+            </a:endParaRPr>
+          </a:p>
+          <a:p>
+            <a:pPr>
+              <a:buFont typeface="Arial" panose="020B0604020202020204" pitchFamily="34" charset="0"/>
+              <a:buChar char="•"/>
+            </a:pPr>
+            <a:r>
+              <a:rPr lang="en-US" sz="2800" dirty="0" err="1" smtClean="0">
+                <a:solidFill>
+                  <a:schemeClr val="tx1"/>
+                </a:solidFill>
+              </a:rPr>
+              <a:t>Ieder</a:t>
+            </a:r>
+            <a:r>
+              <a:rPr lang="en-US" sz="2800" dirty="0" smtClean="0">
+                <a:solidFill>
+                  <a:schemeClr val="tx1"/>
+                </a:solidFill>
+              </a:rPr>
+              <a:t> huis </a:t>
+            </a:r>
+            <a:r>
+              <a:rPr lang="en-US" sz="2800" dirty="0" err="1" smtClean="0">
+                <a:solidFill>
+                  <a:schemeClr val="tx1"/>
+                </a:solidFill>
+              </a:rPr>
+              <a:t>heeft</a:t>
+            </a:r>
+            <a:r>
+              <a:rPr lang="en-US" sz="2800" dirty="0" smtClean="0">
+                <a:solidFill>
+                  <a:schemeClr val="tx1"/>
+                </a:solidFill>
+              </a:rPr>
+              <a:t> </a:t>
+            </a:r>
+            <a:r>
+              <a:rPr lang="en-US" sz="2800" dirty="0" err="1" smtClean="0">
+                <a:solidFill>
+                  <a:schemeClr val="tx1"/>
+                </a:solidFill>
+              </a:rPr>
+              <a:t>coördinaten</a:t>
+            </a:r>
+            <a:endParaRPr lang="en-US" sz="2800" dirty="0">
+              <a:solidFill>
+                <a:schemeClr val="tx1"/>
+              </a:solidFill>
+            </a:endParaRPr>
           </a:p>
         </p:txBody>
       </p:sp>
     </p:spTree>
     <p:extLst>
       <p:ext uri="{BB962C8B-B14F-4D97-AF65-F5344CB8AC3E}">
-        <p14:creationId xmlns:p14="http://schemas.microsoft.com/office/powerpoint/2010/main" val="2076619262"/>
+        <p14:creationId xmlns:p14="http://schemas.microsoft.com/office/powerpoint/2010/main" val="3821020884"/>
       </p:ext>
     </p:extLst>
   </p:cSld>
@@ -6731,9 +6577,10 @@
           <a:lstStyle/>
           <a:p>
             <a:r>
-              <a:rPr lang="nl-NL" dirty="0"/>
-              <a:t>Eengezinswoning:</a:t>
-            </a:r>
+              <a:rPr lang="en-US" dirty="0" err="1" smtClean="0"/>
+              <a:t>Algoritmes</a:t>
+            </a:r>
+            <a:endParaRPr lang="nl-NL" dirty="0"/>
           </a:p>
         </p:txBody>
       </p:sp>
@@ -6749,110 +6596,90 @@
         </p:nvSpPr>
         <p:spPr/>
         <p:txBody>
-          <a:bodyPr/>
-          <a:lstStyle/>
-          <a:p>
-            <a:pPr lvl="0">
-              <a:buFont typeface="Arial" charset="0"/>
+          <a:bodyPr>
+            <a:normAutofit/>
+          </a:bodyPr>
+          <a:lstStyle/>
+          <a:p>
+            <a:pPr>
+              <a:buFont typeface="Arial" panose="020B0604020202020204" pitchFamily="34" charset="0"/>
               <a:buChar char="•"/>
             </a:pPr>
             <a:r>
-              <a:rPr lang="nl-NL" sz="2800" dirty="0">
-                <a:solidFill>
-                  <a:schemeClr val="tx1"/>
-                </a:solidFill>
-              </a:rPr>
-              <a:t>8x8 meter (breed x diep)</a:t>
-            </a:r>
-            <a:br>
-              <a:rPr lang="nl-NL" sz="2800" dirty="0">
-                <a:solidFill>
-                  <a:schemeClr val="tx1"/>
-                </a:solidFill>
-              </a:rPr>
-            </a:br>
+              <a:rPr lang="en-US" sz="2800" dirty="0" smtClean="0">
+                <a:solidFill>
+                  <a:schemeClr val="tx1"/>
+                </a:solidFill>
+              </a:rPr>
+              <a:t>Random</a:t>
+            </a:r>
+          </a:p>
+          <a:p>
+            <a:pPr>
+              <a:buFont typeface="Arial" panose="020B0604020202020204" pitchFamily="34" charset="0"/>
+              <a:buChar char="•"/>
+            </a:pPr>
+            <a:r>
+              <a:rPr lang="en-US" sz="2800" dirty="0" smtClean="0">
+                <a:solidFill>
+                  <a:schemeClr val="tx1"/>
+                </a:solidFill>
+              </a:rPr>
+              <a:t>Greedy</a:t>
+            </a:r>
+          </a:p>
+          <a:p>
+            <a:pPr>
+              <a:buFont typeface="Arial" panose="020B0604020202020204" pitchFamily="34" charset="0"/>
+              <a:buChar char="•"/>
+            </a:pPr>
+            <a:r>
+              <a:rPr lang="en-US" sz="2800" dirty="0" smtClean="0">
+                <a:solidFill>
+                  <a:schemeClr val="tx1"/>
+                </a:solidFill>
+              </a:rPr>
+              <a:t>Hill </a:t>
+            </a:r>
+            <a:r>
+              <a:rPr lang="en-US" sz="2800" dirty="0" err="1" smtClean="0">
+                <a:solidFill>
+                  <a:schemeClr val="tx1"/>
+                </a:solidFill>
+              </a:rPr>
+              <a:t>Climbin</a:t>
+            </a:r>
+            <a:endParaRPr lang="en-US" sz="2800" dirty="0" smtClean="0">
+              <a:solidFill>
+                <a:schemeClr val="tx1"/>
+              </a:solidFill>
+            </a:endParaRPr>
+          </a:p>
+          <a:p>
+            <a:pPr>
+              <a:buFont typeface="Arial" panose="020B0604020202020204" pitchFamily="34" charset="0"/>
+              <a:buChar char="•"/>
+            </a:pPr>
+            <a:r>
+              <a:rPr lang="en-US" sz="2800" dirty="0" smtClean="0">
+                <a:solidFill>
+                  <a:schemeClr val="tx1"/>
+                </a:solidFill>
+              </a:rPr>
+              <a:t>Simulated Annealing?</a:t>
+            </a:r>
             <a:endParaRPr lang="nl-NL" sz="2800" dirty="0">
               <a:solidFill>
                 <a:schemeClr val="tx1"/>
               </a:solidFill>
             </a:endParaRPr>
           </a:p>
-          <a:p>
-            <a:pPr lvl="0">
-              <a:buFont typeface="Arial" charset="0"/>
-              <a:buChar char="•"/>
-            </a:pPr>
-            <a:r>
-              <a:rPr lang="nl-NL" sz="2800" dirty="0">
-                <a:solidFill>
-                  <a:schemeClr val="tx1"/>
-                </a:solidFill>
-              </a:rPr>
-              <a:t>Waarde van E.285.000,- </a:t>
-            </a:r>
-            <a:br>
-              <a:rPr lang="nl-NL" sz="2800" dirty="0">
-                <a:solidFill>
-                  <a:schemeClr val="tx1"/>
-                </a:solidFill>
-              </a:rPr>
-            </a:br>
-            <a:endParaRPr lang="nl-NL" sz="2800" dirty="0">
-              <a:solidFill>
-                <a:schemeClr val="tx1"/>
-              </a:solidFill>
-            </a:endParaRPr>
-          </a:p>
-          <a:p>
-            <a:pPr lvl="0">
-              <a:buFont typeface="Arial" charset="0"/>
-              <a:buChar char="•"/>
-            </a:pPr>
-            <a:r>
-              <a:rPr lang="nl-NL" sz="2800" dirty="0">
-                <a:solidFill>
-                  <a:schemeClr val="tx1"/>
-                </a:solidFill>
-              </a:rPr>
-              <a:t>De woning heeft rondom twee meter </a:t>
-            </a:r>
-            <a:r>
-              <a:rPr lang="nl-NL" sz="2800" dirty="0" err="1">
-                <a:solidFill>
-                  <a:schemeClr val="tx1"/>
-                </a:solidFill>
-              </a:rPr>
-              <a:t>vrijstand</a:t>
-            </a:r>
-            <a:br>
-              <a:rPr lang="nl-NL" sz="2800" dirty="0">
-                <a:solidFill>
-                  <a:schemeClr val="tx1"/>
-                </a:solidFill>
-              </a:rPr>
-            </a:br>
-            <a:r>
-              <a:rPr lang="nl-NL" sz="2800" dirty="0">
-                <a:solidFill>
-                  <a:schemeClr val="tx1"/>
-                </a:solidFill>
-              </a:rPr>
-              <a:t>nodig; iedere meter extra levert een              prijsverbetering op van 3%.</a:t>
-            </a:r>
-          </a:p>
-          <a:p>
-            <a:endParaRPr lang="nl-NL" dirty="0">
-              <a:solidFill>
-                <a:schemeClr val="tx1"/>
-              </a:solidFill>
-            </a:endParaRPr>
-          </a:p>
         </p:txBody>
       </p:sp>
     </p:spTree>
     <p:extLst>
       <p:ext uri="{BB962C8B-B14F-4D97-AF65-F5344CB8AC3E}">
-        <p14:creationId xmlns:p14="http://schemas.microsoft.com/office/powerpoint/2010/main" val="1928127768"/>
+        <p14:creationId xmlns:p14="http://schemas.microsoft.com/office/powerpoint/2010/main" val="194090137"/>
       </p:ext>
     </p:extLst>
   </p:cSld>
@@ -6881,29 +6708,7 @@
       </p:grpSpPr>
       <p:sp>
         <p:nvSpPr>
-          <p:cNvPr id="2" name="Titel 1"/>
-          <p:cNvSpPr>
-            <a:spLocks noGrp="1"/>
-          </p:cNvSpPr>
-          <p:nvPr>
-            <p:ph type="title"/>
-          </p:nvPr>
-        </p:nvSpPr>
-        <p:spPr/>
-        <p:txBody>
-          <a:bodyPr/>
-          <a:lstStyle/>
-          <a:p>
-            <a:r>
-              <a:rPr lang="nl-NL" dirty="0"/>
-              <a:t>Bungalow:</a:t>
-            </a:r>
-          </a:p>
-        </p:txBody>
-      </p:sp>
-      <p:sp>
-        <p:nvSpPr>
-          <p:cNvPr id="3" name="Tijdelijke aanduiding voor inhoud 2"/>
+          <p:cNvPr id="2" name="Tijdelijke aanduiding voor inhoud 1"/>
           <p:cNvSpPr>
             <a:spLocks noGrp="1"/>
           </p:cNvSpPr>
@@ -6913,110 +6718,507 @@
         </p:nvSpPr>
         <p:spPr>
           <a:xfrm>
-            <a:off x="677334" y="2100217"/>
-            <a:ext cx="8596668" cy="3880773"/>
+            <a:off x="677334" y="1671192"/>
+            <a:ext cx="8596668" cy="4697411"/>
           </a:xfrm>
         </p:spPr>
         <p:txBody>
           <a:bodyPr>
-            <a:noAutofit/>
+            <a:normAutofit lnSpcReduction="10000"/>
           </a:bodyPr>
           <a:lstStyle/>
           <a:p>
-            <a:pPr>
-              <a:buFont typeface="Arial" charset="0"/>
-              <a:buChar char="•"/>
+            <a:pPr marL="0" indent="0">
+              <a:buNone/>
             </a:pPr>
             <a:r>
-              <a:rPr lang="nl-NL" sz="2800" dirty="0">
-                <a:solidFill>
-                  <a:schemeClr val="tx1"/>
-                </a:solidFill>
-              </a:rPr>
-              <a:t>10x7.5 meter (breed x diep) </a:t>
-            </a:r>
-            <a:br>
-              <a:rPr lang="nl-NL" sz="2800" dirty="0">
-                <a:solidFill>
-                  <a:schemeClr val="tx1"/>
-                </a:solidFill>
-              </a:rPr>
-            </a:br>
-            <a:endParaRPr lang="nl-NL" sz="2800" dirty="0">
+              <a:rPr lang="nl-NL" sz="2000" dirty="0" smtClean="0">
+                <a:solidFill>
+                  <a:schemeClr val="tx1"/>
+                </a:solidFill>
+              </a:rPr>
+              <a:t>(loop) plaatsen water:</a:t>
+            </a:r>
+          </a:p>
+          <a:p>
+            <a:pPr marL="0" indent="0">
+              <a:buNone/>
+            </a:pPr>
+            <a:r>
+              <a:rPr lang="nl-NL" sz="2000" dirty="0">
+                <a:solidFill>
+                  <a:schemeClr val="tx1"/>
+                </a:solidFill>
+              </a:rPr>
+              <a:t>	</a:t>
+            </a:r>
+            <a:r>
+              <a:rPr lang="nl-NL" sz="2000" dirty="0" smtClean="0">
+                <a:solidFill>
+                  <a:schemeClr val="tx1"/>
+                </a:solidFill>
+              </a:rPr>
+              <a:t>maak water</a:t>
+            </a:r>
+          </a:p>
+          <a:p>
+            <a:pPr marL="0" indent="0">
+              <a:buNone/>
+            </a:pPr>
+            <a:r>
+              <a:rPr lang="nl-NL" sz="2000" dirty="0">
+                <a:solidFill>
+                  <a:schemeClr val="tx1"/>
+                </a:solidFill>
+              </a:rPr>
+              <a:t>	</a:t>
+            </a:r>
+            <a:r>
+              <a:rPr lang="nl-NL" sz="2000" dirty="0" smtClean="0">
+                <a:solidFill>
+                  <a:schemeClr val="tx1"/>
+                </a:solidFill>
+              </a:rPr>
+              <a:t>(</a:t>
+            </a:r>
+            <a:r>
+              <a:rPr lang="nl-NL" sz="2000" dirty="0" err="1" smtClean="0">
+                <a:solidFill>
+                  <a:schemeClr val="tx1"/>
+                </a:solidFill>
+              </a:rPr>
+              <a:t>if</a:t>
+            </a:r>
+            <a:r>
+              <a:rPr lang="nl-NL" sz="2000" dirty="0" smtClean="0">
+                <a:solidFill>
+                  <a:schemeClr val="tx1"/>
+                </a:solidFill>
+              </a:rPr>
+              <a:t>) check of water geplaatst kan worden:</a:t>
+            </a:r>
+          </a:p>
+          <a:p>
+            <a:pPr marL="0" indent="0">
+              <a:buNone/>
+            </a:pPr>
+            <a:r>
+              <a:rPr lang="nl-NL" sz="2000" dirty="0">
+                <a:solidFill>
+                  <a:schemeClr val="tx1"/>
+                </a:solidFill>
+              </a:rPr>
+              <a:t>	</a:t>
+            </a:r>
+            <a:r>
+              <a:rPr lang="nl-NL" sz="2000" dirty="0" smtClean="0">
+                <a:solidFill>
+                  <a:schemeClr val="tx1"/>
+                </a:solidFill>
+              </a:rPr>
+              <a:t>	plaats water</a:t>
+            </a:r>
+          </a:p>
+          <a:p>
+            <a:pPr marL="0" indent="0">
+              <a:buNone/>
+            </a:pPr>
+            <a:endParaRPr lang="nl-NL" sz="2000" dirty="0">
               <a:solidFill>
                 <a:schemeClr val="tx1"/>
               </a:solidFill>
             </a:endParaRPr>
           </a:p>
           <a:p>
-            <a:pPr>
-              <a:buFont typeface="Arial" charset="0"/>
-              <a:buChar char="•"/>
+            <a:pPr marL="0" indent="0">
+              <a:buNone/>
             </a:pPr>
             <a:r>
-              <a:rPr lang="nl-NL" sz="2800" dirty="0">
-                <a:solidFill>
-                  <a:schemeClr val="tx1"/>
-                </a:solidFill>
-              </a:rPr>
-              <a:t>Waarde van E.399.000,- </a:t>
-            </a:r>
-            <a:br>
-              <a:rPr lang="nl-NL" sz="2800" dirty="0">
-                <a:solidFill>
-                  <a:schemeClr val="tx1"/>
-                </a:solidFill>
-              </a:rPr>
-            </a:br>
-            <a:endParaRPr lang="nl-NL" sz="2800" dirty="0">
+              <a:rPr lang="nl-NL" sz="2000" dirty="0" smtClean="0">
+                <a:solidFill>
+                  <a:schemeClr val="tx1"/>
+                </a:solidFill>
+              </a:rPr>
+              <a:t>(loop) plaatsen huizen:</a:t>
+            </a:r>
+          </a:p>
+          <a:p>
+            <a:pPr marL="0" indent="0">
+              <a:buNone/>
+            </a:pPr>
+            <a:r>
+              <a:rPr lang="nl-NL" sz="2000" dirty="0">
+                <a:solidFill>
+                  <a:schemeClr val="tx1"/>
+                </a:solidFill>
+              </a:rPr>
+              <a:t>	</a:t>
+            </a:r>
+            <a:r>
+              <a:rPr lang="nl-NL" sz="2000" dirty="0" smtClean="0">
+                <a:solidFill>
+                  <a:schemeClr val="tx1"/>
+                </a:solidFill>
+              </a:rPr>
+              <a:t>maak huis</a:t>
+            </a:r>
+          </a:p>
+          <a:p>
+            <a:pPr marL="0" indent="0">
+              <a:buNone/>
+            </a:pPr>
+            <a:r>
+              <a:rPr lang="nl-NL" sz="2000" dirty="0" smtClean="0">
+                <a:solidFill>
+                  <a:schemeClr val="tx1"/>
+                </a:solidFill>
+              </a:rPr>
+              <a:t>	(</a:t>
+            </a:r>
+            <a:r>
+              <a:rPr lang="nl-NL" sz="2000" dirty="0" err="1" smtClean="0">
+                <a:solidFill>
+                  <a:schemeClr val="tx1"/>
+                </a:solidFill>
+              </a:rPr>
+              <a:t>if</a:t>
+            </a:r>
+            <a:r>
+              <a:rPr lang="nl-NL" sz="2000" dirty="0" smtClean="0">
+                <a:solidFill>
+                  <a:schemeClr val="tx1"/>
+                </a:solidFill>
+              </a:rPr>
+              <a:t>) check of huis geplaatst kan worden:</a:t>
+            </a:r>
+          </a:p>
+          <a:p>
+            <a:pPr marL="0" indent="0">
+              <a:buNone/>
+            </a:pPr>
+            <a:r>
+              <a:rPr lang="nl-NL" sz="2000" dirty="0">
+                <a:solidFill>
+                  <a:schemeClr val="tx1"/>
+                </a:solidFill>
+              </a:rPr>
+              <a:t>	</a:t>
+            </a:r>
+            <a:r>
+              <a:rPr lang="nl-NL" sz="2000" dirty="0" smtClean="0">
+                <a:solidFill>
+                  <a:schemeClr val="tx1"/>
+                </a:solidFill>
+              </a:rPr>
+              <a:t>	plaats huis</a:t>
+            </a:r>
+          </a:p>
+          <a:p>
+            <a:pPr marL="0" indent="0">
+              <a:buNone/>
+            </a:pPr>
+            <a:endParaRPr lang="nl-NL" sz="2000" dirty="0">
               <a:solidFill>
                 <a:schemeClr val="tx1"/>
               </a:solidFill>
             </a:endParaRPr>
           </a:p>
           <a:p>
-            <a:pPr>
-              <a:buFont typeface="Arial" charset="0"/>
-              <a:buChar char="•"/>
+            <a:pPr marL="0" indent="0">
+              <a:buNone/>
             </a:pPr>
             <a:r>
-              <a:rPr lang="nl-NL" sz="2800" dirty="0">
-                <a:solidFill>
-                  <a:schemeClr val="tx1"/>
-                </a:solidFill>
-              </a:rPr>
-              <a:t>De woning heeft rondom drie meter </a:t>
-            </a:r>
-            <a:r>
-              <a:rPr lang="nl-NL" sz="2800" dirty="0" err="1">
-                <a:solidFill>
-                  <a:schemeClr val="tx1"/>
-                </a:solidFill>
-              </a:rPr>
-              <a:t>vrijstand</a:t>
-            </a:r>
-            <a:r>
-              <a:rPr lang="nl-NL" sz="2800" dirty="0">
-                <a:solidFill>
-                  <a:schemeClr val="tx1"/>
-                </a:solidFill>
-              </a:rPr>
-              <a:t> nodig, iedere meter extra levert een prijsverbetering op van 4%.</a:t>
-            </a:r>
-            <a:br>
-              <a:rPr lang="nl-NL" sz="2400" dirty="0"/>
-            </a:br>
-            <a:br>
-              <a:rPr lang="nl-NL" sz="2400" dirty="0"/>
-            </a:br>
-            <a:endParaRPr lang="nl-NL" sz="2400" dirty="0"/>
-          </a:p>
-        </p:txBody>
-      </p:sp>
+              <a:rPr lang="nl-NL" sz="2000" dirty="0" smtClean="0">
+                <a:solidFill>
+                  <a:schemeClr val="tx1"/>
+                </a:solidFill>
+              </a:rPr>
+              <a:t>scorefunctie + visualisatie</a:t>
+            </a:r>
+            <a:endParaRPr lang="nl-NL" sz="2000" dirty="0">
+              <a:solidFill>
+                <a:schemeClr val="tx1"/>
+              </a:solidFill>
+            </a:endParaRPr>
+          </a:p>
+        </p:txBody>
+      </p:sp>
+      <p:sp>
+        <p:nvSpPr>
+          <p:cNvPr id="6" name="Titel 1"/>
+          <p:cNvSpPr>
+            <a:spLocks noGrp="1"/>
+          </p:cNvSpPr>
+          <p:nvPr>
+            <p:ph type="title"/>
+          </p:nvPr>
+        </p:nvSpPr>
+        <p:spPr>
+          <a:xfrm>
+            <a:off x="677334" y="609600"/>
+            <a:ext cx="8596668" cy="1320800"/>
+          </a:xfrm>
+        </p:spPr>
+        <p:txBody>
+          <a:bodyPr/>
+          <a:lstStyle/>
+          <a:p>
+            <a:r>
+              <a:rPr lang="en-US" dirty="0" smtClean="0"/>
+              <a:t>Random</a:t>
+            </a:r>
+            <a:endParaRPr lang="nl-NL" dirty="0"/>
+          </a:p>
+        </p:txBody>
+      </p:sp>
+      <p:sp>
+        <p:nvSpPr>
+          <p:cNvPr id="7" name="Tekstvak 6"/>
+          <p:cNvSpPr txBox="1"/>
+          <p:nvPr/>
+        </p:nvSpPr>
+        <p:spPr>
+          <a:xfrm>
+            <a:off x="6823652" y="747862"/>
+            <a:ext cx="2216379" cy="1200329"/>
+          </a:xfrm>
+          <a:prstGeom prst="rect">
+            <a:avLst/>
+          </a:prstGeom>
+          <a:noFill/>
+        </p:spPr>
+        <p:txBody>
+          <a:bodyPr wrap="square" rtlCol="0">
+            <a:spAutoFit/>
+          </a:bodyPr>
+          <a:lstStyle/>
+          <a:p>
+            <a:r>
+              <a:rPr lang="nl-NL" dirty="0"/>
+              <a:t>W</a:t>
+            </a:r>
+            <a:r>
+              <a:rPr lang="nl-NL" dirty="0" smtClean="0"/>
+              <a:t>aarde:</a:t>
+            </a:r>
+          </a:p>
+          <a:p>
+            <a:r>
+              <a:rPr lang="nl-NL" dirty="0" smtClean="0"/>
+              <a:t>€9.554.057</a:t>
+            </a:r>
+            <a:endParaRPr lang="nl-NL" dirty="0"/>
+          </a:p>
+          <a:p>
+            <a:r>
+              <a:rPr lang="nl-NL" dirty="0" smtClean="0"/>
+              <a:t>Minimale waarde:</a:t>
+            </a:r>
+          </a:p>
+          <a:p>
+            <a:r>
+              <a:rPr lang="nl-NL" dirty="0" smtClean="0"/>
+              <a:t>€7.245.000</a:t>
+            </a:r>
+            <a:endParaRPr lang="nl-NL" dirty="0"/>
+          </a:p>
+        </p:txBody>
+      </p:sp>
+      <p:sp>
+        <p:nvSpPr>
+          <p:cNvPr id="8" name="Tekstvak 7"/>
+          <p:cNvSpPr txBox="1"/>
+          <p:nvPr/>
+        </p:nvSpPr>
+        <p:spPr>
+          <a:xfrm>
+            <a:off x="6823653" y="2923500"/>
+            <a:ext cx="2216379" cy="1200329"/>
+          </a:xfrm>
+          <a:prstGeom prst="rect">
+            <a:avLst/>
+          </a:prstGeom>
+          <a:noFill/>
+        </p:spPr>
+        <p:txBody>
+          <a:bodyPr wrap="square" rtlCol="0">
+            <a:spAutoFit/>
+          </a:bodyPr>
+          <a:lstStyle/>
+          <a:p>
+            <a:r>
+              <a:rPr lang="nl-NL" dirty="0" smtClean="0"/>
+              <a:t>Waarde:</a:t>
+            </a:r>
+          </a:p>
+          <a:p>
+            <a:r>
+              <a:rPr lang="nl-NL" dirty="0" smtClean="0"/>
+              <a:t>€16.102.734</a:t>
+            </a:r>
+            <a:endParaRPr lang="nl-NL" dirty="0"/>
+          </a:p>
+          <a:p>
+            <a:r>
+              <a:rPr lang="nl-NL" dirty="0" smtClean="0"/>
+              <a:t>Minimale waarde:</a:t>
+            </a:r>
+          </a:p>
+          <a:p>
+            <a:r>
+              <a:rPr lang="nl-NL" dirty="0" smtClean="0"/>
+              <a:t>€14.490.000</a:t>
+            </a:r>
+            <a:endParaRPr lang="nl-NL" dirty="0"/>
+          </a:p>
+        </p:txBody>
+      </p:sp>
+      <p:sp>
+        <p:nvSpPr>
+          <p:cNvPr id="9" name="Tekstvak 8"/>
+          <p:cNvSpPr txBox="1"/>
+          <p:nvPr/>
+        </p:nvSpPr>
+        <p:spPr>
+          <a:xfrm>
+            <a:off x="6823656" y="4859627"/>
+            <a:ext cx="2216379" cy="1200329"/>
+          </a:xfrm>
+          <a:prstGeom prst="rect">
+            <a:avLst/>
+          </a:prstGeom>
+          <a:noFill/>
+        </p:spPr>
+        <p:txBody>
+          <a:bodyPr wrap="square" rtlCol="0">
+            <a:spAutoFit/>
+          </a:bodyPr>
+          <a:lstStyle/>
+          <a:p>
+            <a:r>
+              <a:rPr lang="nl-NL" dirty="0"/>
+              <a:t>W</a:t>
+            </a:r>
+            <a:r>
+              <a:rPr lang="nl-NL" dirty="0" smtClean="0"/>
+              <a:t>aarde:</a:t>
+            </a:r>
+          </a:p>
+          <a:p>
+            <a:r>
+              <a:rPr lang="nl-NL" dirty="0" smtClean="0"/>
+              <a:t>€23.469.612</a:t>
+            </a:r>
+          </a:p>
+          <a:p>
+            <a:r>
+              <a:rPr lang="nl-NL" dirty="0" smtClean="0"/>
+              <a:t>Minimale waarde:</a:t>
+            </a:r>
+          </a:p>
+          <a:p>
+            <a:r>
+              <a:rPr lang="nl-NL" dirty="0" smtClean="0"/>
+              <a:t>€21.735.000</a:t>
+            </a:r>
+            <a:endParaRPr lang="nl-NL" dirty="0"/>
+          </a:p>
+        </p:txBody>
+      </p:sp>
+      <p:pic>
+        <p:nvPicPr>
+          <p:cNvPr id="10" name="Afbeelding 9"/>
+          <p:cNvPicPr>
+            <a:picLocks noChangeAspect="1"/>
+          </p:cNvPicPr>
+          <p:nvPr/>
+        </p:nvPicPr>
+        <p:blipFill>
+          <a:blip r:embed="rId2">
+            <a:extLst>
+              <a:ext uri="{28A0092B-C50C-407E-A947-70E740481C1C}">
+                <a14:useLocalDpi xmlns:a14="http://schemas.microsoft.com/office/drawing/2010/main" val="0"/>
+              </a:ext>
+            </a:extLst>
+          </a:blip>
+          <a:stretch>
+            <a:fillRect/>
+          </a:stretch>
+        </p:blipFill>
+        <p:spPr>
+          <a:xfrm>
+            <a:off x="8986738" y="0"/>
+            <a:ext cx="3191259" cy="2373499"/>
+          </a:xfrm>
+          <a:prstGeom prst="rect">
+            <a:avLst/>
+          </a:prstGeom>
+        </p:spPr>
+      </p:pic>
+      <p:pic>
+        <p:nvPicPr>
+          <p:cNvPr id="11" name="Afbeelding 10"/>
+          <p:cNvPicPr>
+            <a:picLocks noChangeAspect="1"/>
+          </p:cNvPicPr>
+          <p:nvPr/>
+        </p:nvPicPr>
+        <p:blipFill>
+          <a:blip r:embed="rId3">
+            <a:extLst>
+              <a:ext uri="{28A0092B-C50C-407E-A947-70E740481C1C}">
+                <a14:useLocalDpi xmlns:a14="http://schemas.microsoft.com/office/drawing/2010/main" val="0"/>
+              </a:ext>
+            </a:extLst>
+          </a:blip>
+          <a:stretch>
+            <a:fillRect/>
+          </a:stretch>
+        </p:blipFill>
+        <p:spPr>
+          <a:xfrm>
+            <a:off x="9000741" y="2336912"/>
+            <a:ext cx="3191259" cy="2373499"/>
+          </a:xfrm>
+          <a:prstGeom prst="rect">
+            <a:avLst/>
+          </a:prstGeom>
+        </p:spPr>
+      </p:pic>
+      <p:pic>
+        <p:nvPicPr>
+          <p:cNvPr id="12" name="Afbeelding 11"/>
+          <p:cNvPicPr>
+            <a:picLocks noChangeAspect="1"/>
+          </p:cNvPicPr>
+          <p:nvPr/>
+        </p:nvPicPr>
+        <p:blipFill>
+          <a:blip r:embed="rId4">
+            <a:extLst>
+              <a:ext uri="{28A0092B-C50C-407E-A947-70E740481C1C}">
+                <a14:useLocalDpi xmlns:a14="http://schemas.microsoft.com/office/drawing/2010/main" val="0"/>
+              </a:ext>
+            </a:extLst>
+          </a:blip>
+          <a:stretch>
+            <a:fillRect/>
+          </a:stretch>
+        </p:blipFill>
+        <p:spPr>
+          <a:xfrm>
+            <a:off x="9040031" y="4484501"/>
+            <a:ext cx="3191259" cy="2373499"/>
+          </a:xfrm>
+          <a:prstGeom prst="rect">
+            <a:avLst/>
+          </a:prstGeom>
+        </p:spPr>
+      </p:pic>
     </p:spTree>
     <p:extLst>
       <p:ext uri="{BB962C8B-B14F-4D97-AF65-F5344CB8AC3E}">
-        <p14:creationId xmlns:p14="http://schemas.microsoft.com/office/powerpoint/2010/main" val="981581880"/>
+        <p14:creationId xmlns:p14="http://schemas.microsoft.com/office/powerpoint/2010/main" val="358144180"/>
       </p:ext>
     </p:extLst>
   </p:cSld>
@@ -7045,29 +7247,7 @@
       </p:grpSpPr>
       <p:sp>
         <p:nvSpPr>
-          <p:cNvPr id="2" name="Titel 1"/>
-          <p:cNvSpPr>
-            <a:spLocks noGrp="1"/>
-          </p:cNvSpPr>
-          <p:nvPr>
-            <p:ph type="title"/>
-          </p:nvPr>
-        </p:nvSpPr>
-        <p:spPr/>
-        <p:txBody>
-          <a:bodyPr/>
-          <a:lstStyle/>
-          <a:p>
-            <a:r>
-              <a:rPr lang="nl-NL" dirty="0"/>
-              <a:t>Maison:</a:t>
-            </a:r>
-          </a:p>
-        </p:txBody>
-      </p:sp>
-      <p:sp>
-        <p:nvSpPr>
-          <p:cNvPr id="3" name="Tijdelijke aanduiding voor inhoud 2"/>
+          <p:cNvPr id="2" name="Tijdelijke aanduiding voor inhoud 1"/>
           <p:cNvSpPr>
             <a:spLocks noGrp="1"/>
           </p:cNvSpPr>
@@ -7075,100 +7255,466 @@
             <p:ph idx="1"/>
           </p:nvPr>
         </p:nvSpPr>
-        <p:spPr/>
+        <p:spPr>
+          <a:xfrm>
+            <a:off x="677334" y="1671192"/>
+            <a:ext cx="8596668" cy="4697411"/>
+          </a:xfrm>
+        </p:spPr>
         <p:txBody>
           <a:bodyPr>
-            <a:normAutofit/>
+            <a:normAutofit fontScale="92500" lnSpcReduction="20000"/>
           </a:bodyPr>
           <a:lstStyle/>
           <a:p>
-            <a:pPr>
-              <a:buFont typeface="Arial" charset="0"/>
-              <a:buChar char="•"/>
+            <a:pPr marL="0" indent="0">
+              <a:buNone/>
             </a:pPr>
             <a:r>
-              <a:rPr lang="nl-NL" sz="2800" dirty="0">
-                <a:solidFill>
-                  <a:schemeClr val="tx1"/>
-                </a:solidFill>
-              </a:rPr>
-              <a:t>11x10.5 meter (breed x diep) </a:t>
-            </a:r>
-            <a:br>
-              <a:rPr lang="nl-NL" sz="2800" dirty="0">
-                <a:solidFill>
-                  <a:schemeClr val="tx1"/>
-                </a:solidFill>
-              </a:rPr>
-            </a:br>
-            <a:endParaRPr lang="nl-NL" sz="2800" dirty="0">
+              <a:rPr lang="nl-NL" sz="2000" dirty="0" smtClean="0">
+                <a:solidFill>
+                  <a:schemeClr val="tx1"/>
+                </a:solidFill>
+              </a:rPr>
+              <a:t>(loop) plaatsen water:</a:t>
+            </a:r>
+          </a:p>
+          <a:p>
+            <a:pPr marL="0" indent="0">
+              <a:buNone/>
+            </a:pPr>
+            <a:r>
+              <a:rPr lang="nl-NL" sz="2000" dirty="0">
+                <a:solidFill>
+                  <a:schemeClr val="tx1"/>
+                </a:solidFill>
+              </a:rPr>
+              <a:t>	</a:t>
+            </a:r>
+            <a:r>
+              <a:rPr lang="nl-NL" sz="2000" dirty="0" smtClean="0">
+                <a:solidFill>
+                  <a:schemeClr val="tx1"/>
+                </a:solidFill>
+              </a:rPr>
+              <a:t>maak water</a:t>
+            </a:r>
+          </a:p>
+          <a:p>
+            <a:pPr marL="0" indent="0">
+              <a:buNone/>
+            </a:pPr>
+            <a:r>
+              <a:rPr lang="nl-NL" sz="2000" dirty="0">
+                <a:solidFill>
+                  <a:schemeClr val="tx1"/>
+                </a:solidFill>
+              </a:rPr>
+              <a:t>	</a:t>
+            </a:r>
+            <a:r>
+              <a:rPr lang="nl-NL" sz="2000" dirty="0" smtClean="0">
+                <a:solidFill>
+                  <a:schemeClr val="tx1"/>
+                </a:solidFill>
+              </a:rPr>
+              <a:t>(</a:t>
+            </a:r>
+            <a:r>
+              <a:rPr lang="nl-NL" sz="2000" dirty="0" err="1" smtClean="0">
+                <a:solidFill>
+                  <a:schemeClr val="tx1"/>
+                </a:solidFill>
+              </a:rPr>
+              <a:t>if</a:t>
+            </a:r>
+            <a:r>
+              <a:rPr lang="nl-NL" sz="2000" dirty="0" smtClean="0">
+                <a:solidFill>
+                  <a:schemeClr val="tx1"/>
+                </a:solidFill>
+              </a:rPr>
+              <a:t>) check of water geplaatst kan worden:</a:t>
+            </a:r>
+          </a:p>
+          <a:p>
+            <a:pPr marL="0" indent="0">
+              <a:buNone/>
+            </a:pPr>
+            <a:r>
+              <a:rPr lang="nl-NL" sz="2000" dirty="0">
+                <a:solidFill>
+                  <a:schemeClr val="tx1"/>
+                </a:solidFill>
+              </a:rPr>
+              <a:t>	</a:t>
+            </a:r>
+            <a:r>
+              <a:rPr lang="nl-NL" sz="2000" dirty="0" smtClean="0">
+                <a:solidFill>
+                  <a:schemeClr val="tx1"/>
+                </a:solidFill>
+              </a:rPr>
+              <a:t>	plaats water</a:t>
+            </a:r>
+          </a:p>
+          <a:p>
+            <a:pPr marL="0" indent="0">
+              <a:buNone/>
+            </a:pPr>
+            <a:endParaRPr lang="nl-NL" sz="2000" dirty="0">
               <a:solidFill>
                 <a:schemeClr val="tx1"/>
               </a:solidFill>
             </a:endParaRPr>
           </a:p>
           <a:p>
-            <a:pPr>
-              <a:buFont typeface="Arial" charset="0"/>
-              <a:buChar char="•"/>
+            <a:pPr marL="0" indent="0">
+              <a:buNone/>
             </a:pPr>
             <a:r>
-              <a:rPr lang="nl-NL" sz="2800" dirty="0">
-                <a:solidFill>
-                  <a:schemeClr val="tx1"/>
-                </a:solidFill>
-              </a:rPr>
-              <a:t>Een waarde van E.610.000,- </a:t>
-            </a:r>
-            <a:br>
-              <a:rPr lang="nl-NL" sz="2800" dirty="0">
-                <a:solidFill>
-                  <a:schemeClr val="tx1"/>
-                </a:solidFill>
-              </a:rPr>
-            </a:br>
-            <a:endParaRPr lang="nl-NL" sz="2800" dirty="0">
+              <a:rPr lang="nl-NL" sz="2000" dirty="0" smtClean="0">
+                <a:solidFill>
+                  <a:schemeClr val="tx1"/>
+                </a:solidFill>
+              </a:rPr>
+              <a:t>(loop) plaatsen huizen:</a:t>
+            </a:r>
+          </a:p>
+          <a:p>
+            <a:pPr marL="0" indent="0">
+              <a:buNone/>
+            </a:pPr>
+            <a:r>
+              <a:rPr lang="nl-NL" sz="2000" dirty="0">
+                <a:solidFill>
+                  <a:schemeClr val="tx1"/>
+                </a:solidFill>
+              </a:rPr>
+              <a:t>	</a:t>
+            </a:r>
+            <a:r>
+              <a:rPr lang="nl-NL" sz="2000" dirty="0" smtClean="0">
+                <a:solidFill>
+                  <a:schemeClr val="tx1"/>
+                </a:solidFill>
+              </a:rPr>
+              <a:t>maak huis</a:t>
+            </a:r>
+          </a:p>
+          <a:p>
+            <a:pPr marL="0" indent="0">
+              <a:buNone/>
+            </a:pPr>
+            <a:r>
+              <a:rPr lang="nl-NL" sz="2000" dirty="0" smtClean="0">
+                <a:solidFill>
+                  <a:schemeClr val="tx1"/>
+                </a:solidFill>
+              </a:rPr>
+              <a:t>	(loop) alle mogelijke coördinaten:</a:t>
+            </a:r>
+          </a:p>
+          <a:p>
+            <a:pPr marL="0" indent="0">
+              <a:buNone/>
+            </a:pPr>
+            <a:r>
+              <a:rPr lang="nl-NL" sz="2000" dirty="0">
+                <a:solidFill>
+                  <a:schemeClr val="tx1"/>
+                </a:solidFill>
+              </a:rPr>
+              <a:t>	</a:t>
+            </a:r>
+            <a:r>
+              <a:rPr lang="nl-NL" sz="2000" dirty="0" smtClean="0">
+                <a:solidFill>
+                  <a:schemeClr val="tx1"/>
+                </a:solidFill>
+              </a:rPr>
+              <a:t>	(</a:t>
+            </a:r>
+            <a:r>
+              <a:rPr lang="nl-NL" sz="2000" dirty="0" err="1" smtClean="0">
+                <a:solidFill>
+                  <a:schemeClr val="tx1"/>
+                </a:solidFill>
+              </a:rPr>
+              <a:t>if</a:t>
+            </a:r>
+            <a:r>
+              <a:rPr lang="nl-NL" sz="2000" dirty="0" smtClean="0">
+                <a:solidFill>
+                  <a:schemeClr val="tx1"/>
+                </a:solidFill>
+              </a:rPr>
+              <a:t>) coördinaat levert een betere prijs op:</a:t>
+            </a:r>
+          </a:p>
+          <a:p>
+            <a:pPr marL="0" indent="0">
+              <a:buNone/>
+            </a:pPr>
+            <a:r>
+              <a:rPr lang="nl-NL" sz="2000" dirty="0">
+                <a:solidFill>
+                  <a:schemeClr val="tx1"/>
+                </a:solidFill>
+              </a:rPr>
+              <a:t>	</a:t>
+            </a:r>
+            <a:r>
+              <a:rPr lang="nl-NL" sz="2000" dirty="0" smtClean="0">
+                <a:solidFill>
+                  <a:schemeClr val="tx1"/>
+                </a:solidFill>
+              </a:rPr>
+              <a:t>		onthoud coördinaat</a:t>
+            </a:r>
+          </a:p>
+          <a:p>
+            <a:pPr marL="0" indent="0">
+              <a:buNone/>
+            </a:pPr>
+            <a:r>
+              <a:rPr lang="nl-NL" sz="2000" dirty="0">
+                <a:solidFill>
+                  <a:schemeClr val="tx1"/>
+                </a:solidFill>
+              </a:rPr>
+              <a:t>	</a:t>
+            </a:r>
+            <a:r>
+              <a:rPr lang="nl-NL" sz="2000" dirty="0" smtClean="0">
+                <a:solidFill>
+                  <a:schemeClr val="tx1"/>
+                </a:solidFill>
+              </a:rPr>
+              <a:t>plaats huis met beste coördinaat</a:t>
+            </a:r>
+          </a:p>
+          <a:p>
+            <a:pPr marL="0" indent="0">
+              <a:buNone/>
+            </a:pPr>
+            <a:endParaRPr lang="nl-NL" sz="2000" dirty="0">
               <a:solidFill>
                 <a:schemeClr val="tx1"/>
               </a:solidFill>
             </a:endParaRPr>
           </a:p>
           <a:p>
-            <a:pPr>
-              <a:buFont typeface="Arial" charset="0"/>
-              <a:buChar char="•"/>
+            <a:pPr marL="0" indent="0">
+              <a:buNone/>
             </a:pPr>
             <a:r>
-              <a:rPr lang="nl-NL" sz="2800" dirty="0">
-                <a:solidFill>
-                  <a:schemeClr val="tx1"/>
-                </a:solidFill>
-              </a:rPr>
-              <a:t>De woning heeft rondom zes meter </a:t>
-            </a:r>
-            <a:r>
-              <a:rPr lang="nl-NL" sz="2800" dirty="0" err="1">
-                <a:solidFill>
-                  <a:schemeClr val="tx1"/>
-                </a:solidFill>
-              </a:rPr>
-              <a:t>vrijstand</a:t>
-            </a:r>
-            <a:r>
-              <a:rPr lang="nl-NL" sz="2800" dirty="0">
-                <a:solidFill>
-                  <a:schemeClr val="tx1"/>
-                </a:solidFill>
-              </a:rPr>
-              <a:t> nodig, iedere meter extra levert een prijsverbetering op van 6%.</a:t>
-            </a:r>
+              <a:rPr lang="nl-NL" sz="2000" dirty="0" smtClean="0">
+                <a:solidFill>
+                  <a:schemeClr val="tx1"/>
+                </a:solidFill>
+              </a:rPr>
+              <a:t>scorefunctie + visualisatie</a:t>
+            </a:r>
+            <a:endParaRPr lang="nl-NL" sz="2000" dirty="0">
+              <a:solidFill>
+                <a:schemeClr val="tx1"/>
+              </a:solidFill>
+            </a:endParaRPr>
+          </a:p>
+        </p:txBody>
+      </p:sp>
+      <p:sp>
+        <p:nvSpPr>
+          <p:cNvPr id="6" name="Titel 1"/>
+          <p:cNvSpPr>
+            <a:spLocks noGrp="1"/>
+          </p:cNvSpPr>
+          <p:nvPr>
+            <p:ph type="title"/>
+          </p:nvPr>
+        </p:nvSpPr>
+        <p:spPr>
+          <a:xfrm>
+            <a:off x="677334" y="609600"/>
+            <a:ext cx="8596668" cy="1320800"/>
+          </a:xfrm>
+        </p:spPr>
+        <p:txBody>
+          <a:bodyPr/>
+          <a:lstStyle/>
+          <a:p>
+            <a:r>
+              <a:rPr lang="en-US" dirty="0" smtClean="0"/>
+              <a:t>Greedy</a:t>
+            </a:r>
+            <a:endParaRPr lang="nl-NL" dirty="0"/>
+          </a:p>
+        </p:txBody>
+      </p:sp>
+      <p:sp>
+        <p:nvSpPr>
+          <p:cNvPr id="4" name="Tekstvak 3"/>
+          <p:cNvSpPr txBox="1"/>
+          <p:nvPr/>
+        </p:nvSpPr>
+        <p:spPr>
+          <a:xfrm>
+            <a:off x="6787166" y="884349"/>
+            <a:ext cx="2216379" cy="1200329"/>
+          </a:xfrm>
+          <a:prstGeom prst="rect">
+            <a:avLst/>
+          </a:prstGeom>
+          <a:noFill/>
+        </p:spPr>
+        <p:txBody>
+          <a:bodyPr wrap="square" rtlCol="0">
+            <a:spAutoFit/>
+          </a:bodyPr>
+          <a:lstStyle/>
+          <a:p>
+            <a:r>
+              <a:rPr lang="nl-NL" dirty="0"/>
+              <a:t>W</a:t>
+            </a:r>
+            <a:r>
+              <a:rPr lang="nl-NL" dirty="0" smtClean="0"/>
+              <a:t>aarde:</a:t>
+            </a:r>
+          </a:p>
+          <a:p>
+            <a:r>
+              <a:rPr lang="nl-NL" dirty="0" smtClean="0"/>
+              <a:t>€11.343.076</a:t>
+            </a:r>
+            <a:endParaRPr lang="nl-NL" dirty="0"/>
+          </a:p>
+          <a:p>
+            <a:r>
+              <a:rPr lang="nl-NL" dirty="0" smtClean="0"/>
+              <a:t>Minimale waarde:</a:t>
+            </a:r>
+          </a:p>
+          <a:p>
+            <a:r>
+              <a:rPr lang="nl-NL" dirty="0" smtClean="0"/>
+              <a:t>€7.245.000</a:t>
+            </a:r>
+            <a:endParaRPr lang="nl-NL" dirty="0"/>
+          </a:p>
+        </p:txBody>
+      </p:sp>
+      <p:sp>
+        <p:nvSpPr>
+          <p:cNvPr id="5" name="Tekstvak 4"/>
+          <p:cNvSpPr txBox="1"/>
+          <p:nvPr/>
+        </p:nvSpPr>
+        <p:spPr>
+          <a:xfrm>
+            <a:off x="6787166" y="4874654"/>
+            <a:ext cx="2216379" cy="1200329"/>
+          </a:xfrm>
+          <a:prstGeom prst="rect">
+            <a:avLst/>
+          </a:prstGeom>
+          <a:noFill/>
+        </p:spPr>
+        <p:txBody>
+          <a:bodyPr wrap="square" rtlCol="0">
+            <a:spAutoFit/>
+          </a:bodyPr>
+          <a:lstStyle/>
+          <a:p>
+            <a:r>
+              <a:rPr lang="nl-NL" dirty="0"/>
+              <a:t>W</a:t>
+            </a:r>
+            <a:r>
+              <a:rPr lang="nl-NL" dirty="0" smtClean="0"/>
+              <a:t>aarde:</a:t>
+            </a:r>
+          </a:p>
+          <a:p>
+            <a:r>
+              <a:rPr lang="nl-NL" dirty="0" smtClean="0"/>
+              <a:t>€</a:t>
+            </a:r>
+            <a:endParaRPr lang="nl-NL" dirty="0"/>
+          </a:p>
+          <a:p>
+            <a:r>
+              <a:rPr lang="nl-NL" dirty="0" smtClean="0"/>
+              <a:t>Minimale waarde:</a:t>
+            </a:r>
+          </a:p>
+          <a:p>
+            <a:r>
+              <a:rPr lang="nl-NL" dirty="0" smtClean="0"/>
+              <a:t>€21.735.000</a:t>
+            </a:r>
+            <a:endParaRPr lang="nl-NL" dirty="0"/>
+          </a:p>
+        </p:txBody>
+      </p:sp>
+      <p:sp>
+        <p:nvSpPr>
+          <p:cNvPr id="7" name="Tekstvak 6"/>
+          <p:cNvSpPr txBox="1"/>
+          <p:nvPr/>
+        </p:nvSpPr>
+        <p:spPr>
+          <a:xfrm>
+            <a:off x="6787166" y="2786129"/>
+            <a:ext cx="2216379" cy="1200329"/>
+          </a:xfrm>
+          <a:prstGeom prst="rect">
+            <a:avLst/>
+          </a:prstGeom>
+          <a:noFill/>
+        </p:spPr>
+        <p:txBody>
+          <a:bodyPr wrap="square" rtlCol="0">
+            <a:spAutoFit/>
+          </a:bodyPr>
+          <a:lstStyle/>
+          <a:p>
+            <a:r>
+              <a:rPr lang="nl-NL" dirty="0"/>
+              <a:t>W</a:t>
+            </a:r>
+            <a:r>
+              <a:rPr lang="nl-NL" dirty="0" smtClean="0"/>
+              <a:t>aarde:</a:t>
+            </a:r>
+          </a:p>
+          <a:p>
+            <a:r>
+              <a:rPr lang="nl-NL" smtClean="0"/>
+              <a:t>€18.443.199</a:t>
+            </a:r>
+            <a:endParaRPr lang="nl-NL" dirty="0"/>
+          </a:p>
+          <a:p>
+            <a:r>
+              <a:rPr lang="nl-NL" dirty="0" smtClean="0"/>
+              <a:t>Minimale waarde:</a:t>
+            </a:r>
+          </a:p>
+          <a:p>
+            <a:r>
+              <a:rPr lang="nl-NL" dirty="0" smtClean="0"/>
+              <a:t>€14.490.000</a:t>
+            </a:r>
+            <a:endParaRPr lang="nl-NL" dirty="0"/>
           </a:p>
         </p:txBody>
       </p:sp>
     </p:spTree>
     <p:extLst>
       <p:ext uri="{BB962C8B-B14F-4D97-AF65-F5344CB8AC3E}">
-        <p14:creationId xmlns:p14="http://schemas.microsoft.com/office/powerpoint/2010/main" val="1922530555"/>
+        <p14:creationId xmlns:p14="http://schemas.microsoft.com/office/powerpoint/2010/main" val="2925198630"/>
       </p:ext>
     </p:extLst>
   </p:cSld>
@@ -7197,30 +7743,7 @@
       </p:grpSpPr>
       <p:sp>
         <p:nvSpPr>
-          <p:cNvPr id="2" name="Titel 1"/>
-          <p:cNvSpPr>
-            <a:spLocks noGrp="1"/>
-          </p:cNvSpPr>
-          <p:nvPr>
-            <p:ph type="title"/>
-          </p:nvPr>
-        </p:nvSpPr>
-        <p:spPr/>
-        <p:txBody>
-          <a:bodyPr/>
-          <a:lstStyle/>
-          <a:p>
-            <a:r>
-              <a:rPr lang="en-US" dirty="0" err="1"/>
-              <a:t>Datastructuur</a:t>
-            </a:r>
-            <a:endParaRPr lang="nl-NL" dirty="0"/>
-          </a:p>
-        </p:txBody>
-      </p:sp>
-      <p:sp>
-        <p:nvSpPr>
-          <p:cNvPr id="3" name="Tijdelijke aanduiding voor inhoud 2"/>
+          <p:cNvPr id="2" name="Tijdelijke aanduiding voor inhoud 1"/>
           <p:cNvSpPr>
             <a:spLocks noGrp="1"/>
           </p:cNvSpPr>
@@ -7228,361 +7751,111 @@
             <p:ph idx="1"/>
           </p:nvPr>
         </p:nvSpPr>
-        <p:spPr/>
+        <p:spPr>
+          <a:xfrm>
+            <a:off x="677334" y="1671192"/>
+            <a:ext cx="8596668" cy="4697411"/>
+          </a:xfrm>
+        </p:spPr>
         <p:txBody>
           <a:bodyPr>
             <a:normAutofit/>
           </a:bodyPr>
           <a:lstStyle/>
           <a:p>
-            <a:pPr>
-              <a:buFont typeface="Arial" panose="020B0604020202020204" pitchFamily="34" charset="0"/>
-              <a:buChar char="•"/>
+            <a:pPr marL="0" indent="0">
+              <a:buNone/>
             </a:pPr>
             <a:r>
-              <a:rPr lang="en-US" sz="2800" dirty="0" err="1">
-                <a:solidFill>
-                  <a:schemeClr val="tx1"/>
-                </a:solidFill>
-              </a:rPr>
-              <a:t>Huizen</a:t>
-            </a:r>
-            <a:r>
-              <a:rPr lang="en-US" sz="2800" dirty="0">
-                <a:solidFill>
-                  <a:schemeClr val="tx1"/>
-                </a:solidFill>
-              </a:rPr>
-              <a:t> in classes, </a:t>
-            </a:r>
-            <a:r>
-              <a:rPr lang="en-US" sz="2800" dirty="0" err="1">
-                <a:solidFill>
-                  <a:schemeClr val="tx1"/>
-                </a:solidFill>
-              </a:rPr>
-              <a:t>overkoepelende</a:t>
-            </a:r>
-            <a:r>
-              <a:rPr lang="en-US" sz="2800" dirty="0">
-                <a:solidFill>
-                  <a:schemeClr val="tx1"/>
-                </a:solidFill>
-              </a:rPr>
-              <a:t> “House”-class met subclasses </a:t>
-            </a:r>
-            <a:r>
-              <a:rPr lang="en-US" sz="2800" dirty="0" err="1">
-                <a:solidFill>
-                  <a:schemeClr val="tx1"/>
-                </a:solidFill>
-              </a:rPr>
-              <a:t>voor</a:t>
-            </a:r>
-            <a:r>
-              <a:rPr lang="en-US" sz="2800" dirty="0">
-                <a:solidFill>
-                  <a:schemeClr val="tx1"/>
-                </a:solidFill>
-              </a:rPr>
-              <a:t> de </a:t>
-            </a:r>
-            <a:r>
-              <a:rPr lang="en-US" sz="2800" dirty="0" err="1">
-                <a:solidFill>
-                  <a:schemeClr val="tx1"/>
-                </a:solidFill>
-              </a:rPr>
-              <a:t>verschillende</a:t>
-            </a:r>
-            <a:r>
-              <a:rPr lang="en-US" sz="2800" dirty="0">
-                <a:solidFill>
-                  <a:schemeClr val="tx1"/>
-                </a:solidFill>
-              </a:rPr>
-              <a:t> </a:t>
-            </a:r>
-            <a:r>
-              <a:rPr lang="en-US" sz="2800" dirty="0" err="1">
-                <a:solidFill>
-                  <a:schemeClr val="tx1"/>
-                </a:solidFill>
-              </a:rPr>
-              <a:t>huizen</a:t>
-            </a:r>
-            <a:endParaRPr lang="en-US" sz="2800" dirty="0">
+              <a:rPr lang="nl-NL" sz="2000" dirty="0" smtClean="0">
+                <a:solidFill>
+                  <a:schemeClr val="tx1"/>
+                </a:solidFill>
+              </a:rPr>
+              <a:t>voer random algoritme uit</a:t>
+            </a:r>
+          </a:p>
+          <a:p>
+            <a:pPr marL="0" indent="0">
+              <a:buNone/>
+            </a:pPr>
+            <a:endParaRPr lang="nl-NL" sz="2000" dirty="0">
               <a:solidFill>
                 <a:schemeClr val="tx1"/>
               </a:solidFill>
             </a:endParaRPr>
           </a:p>
           <a:p>
-            <a:pPr>
-              <a:buFont typeface="Arial" panose="020B0604020202020204" pitchFamily="34" charset="0"/>
-              <a:buChar char="•"/>
+            <a:pPr marL="0" indent="0">
+              <a:buNone/>
             </a:pPr>
             <a:r>
-              <a:rPr lang="en-US" sz="2800" dirty="0" err="1">
-                <a:solidFill>
-                  <a:schemeClr val="tx1"/>
-                </a:solidFill>
-              </a:rPr>
-              <a:t>Eerste</a:t>
-            </a:r>
-            <a:r>
-              <a:rPr lang="en-US" sz="2800" dirty="0">
-                <a:solidFill>
-                  <a:schemeClr val="tx1"/>
-                </a:solidFill>
-              </a:rPr>
-              <a:t> </a:t>
-            </a:r>
-            <a:r>
-              <a:rPr lang="en-US" sz="2800" dirty="0" err="1">
-                <a:solidFill>
-                  <a:schemeClr val="tx1"/>
-                </a:solidFill>
-              </a:rPr>
-              <a:t>idee</a:t>
-            </a:r>
-            <a:r>
-              <a:rPr lang="en-US" sz="2800" dirty="0">
-                <a:solidFill>
-                  <a:schemeClr val="tx1"/>
-                </a:solidFill>
-              </a:rPr>
-              <a:t> </a:t>
-            </a:r>
-            <a:r>
-              <a:rPr lang="en-US" sz="2800" dirty="0" err="1">
-                <a:solidFill>
-                  <a:schemeClr val="tx1"/>
-                </a:solidFill>
-              </a:rPr>
-              <a:t>plattegrond</a:t>
-            </a:r>
-            <a:r>
-              <a:rPr lang="en-US" sz="2800" dirty="0">
-                <a:solidFill>
-                  <a:schemeClr val="tx1"/>
-                </a:solidFill>
-              </a:rPr>
-              <a:t>: </a:t>
-            </a:r>
-            <a:r>
-              <a:rPr lang="en-US" sz="2800" dirty="0" err="1">
-                <a:solidFill>
-                  <a:schemeClr val="tx1"/>
-                </a:solidFill>
-              </a:rPr>
-              <a:t>een</a:t>
-            </a:r>
-            <a:r>
-              <a:rPr lang="en-US" sz="2800" dirty="0">
-                <a:solidFill>
-                  <a:schemeClr val="tx1"/>
-                </a:solidFill>
-              </a:rPr>
-              <a:t> grid in de </a:t>
-            </a:r>
-            <a:r>
-              <a:rPr lang="en-US" sz="2800" dirty="0" err="1">
-                <a:solidFill>
-                  <a:schemeClr val="tx1"/>
-                </a:solidFill>
-              </a:rPr>
-              <a:t>vorm</a:t>
-            </a:r>
-            <a:r>
-              <a:rPr lang="en-US" sz="2800" dirty="0">
-                <a:solidFill>
-                  <a:schemeClr val="tx1"/>
-                </a:solidFill>
-              </a:rPr>
-              <a:t> van </a:t>
-            </a:r>
-            <a:r>
-              <a:rPr lang="en-US" sz="2800" dirty="0" err="1">
-                <a:solidFill>
-                  <a:schemeClr val="tx1"/>
-                </a:solidFill>
-              </a:rPr>
-              <a:t>een</a:t>
-            </a:r>
-            <a:r>
-              <a:rPr lang="en-US" sz="2800" dirty="0">
-                <a:solidFill>
-                  <a:schemeClr val="tx1"/>
-                </a:solidFill>
-              </a:rPr>
-              <a:t> </a:t>
-            </a:r>
-            <a:r>
-              <a:rPr lang="en-US" sz="2800" dirty="0" err="1">
-                <a:solidFill>
-                  <a:schemeClr val="tx1"/>
-                </a:solidFill>
-              </a:rPr>
-              <a:t>dubbele</a:t>
-            </a:r>
-            <a:r>
-              <a:rPr lang="en-US" sz="2800" dirty="0">
-                <a:solidFill>
-                  <a:schemeClr val="tx1"/>
-                </a:solidFill>
-              </a:rPr>
-              <a:t> array</a:t>
-            </a:r>
-          </a:p>
-          <a:p>
-            <a:pPr lvl="1">
-              <a:buFont typeface="Arial" panose="020B0604020202020204" pitchFamily="34" charset="0"/>
-              <a:buChar char="•"/>
+              <a:rPr lang="nl-NL" sz="2000" dirty="0" smtClean="0">
+                <a:solidFill>
+                  <a:schemeClr val="tx1"/>
+                </a:solidFill>
+              </a:rPr>
+              <a:t>(loop) voer random verandering uit:</a:t>
+            </a:r>
+          </a:p>
+          <a:p>
+            <a:pPr marL="0" indent="0">
+              <a:buNone/>
             </a:pPr>
             <a:r>
-              <a:rPr lang="en-US" sz="2400" dirty="0" err="1">
-                <a:solidFill>
-                  <a:schemeClr val="tx1"/>
-                </a:solidFill>
-              </a:rPr>
-              <a:t>Werkt</a:t>
-            </a:r>
-            <a:r>
-              <a:rPr lang="en-US" sz="2400" dirty="0">
-                <a:solidFill>
-                  <a:schemeClr val="tx1"/>
-                </a:solidFill>
-              </a:rPr>
-              <a:t> </a:t>
-            </a:r>
-            <a:r>
-              <a:rPr lang="en-US" sz="2400" dirty="0" err="1">
-                <a:solidFill>
-                  <a:schemeClr val="tx1"/>
-                </a:solidFill>
-              </a:rPr>
-              <a:t>alleen</a:t>
-            </a:r>
-            <a:r>
-              <a:rPr lang="en-US" sz="2400" dirty="0">
-                <a:solidFill>
-                  <a:schemeClr val="tx1"/>
-                </a:solidFill>
-              </a:rPr>
-              <a:t> </a:t>
-            </a:r>
-            <a:r>
-              <a:rPr lang="en-US" sz="2400" dirty="0" err="1">
-                <a:solidFill>
-                  <a:schemeClr val="tx1"/>
-                </a:solidFill>
-              </a:rPr>
-              <a:t>voor</a:t>
-            </a:r>
-            <a:r>
-              <a:rPr lang="en-US" sz="2400" dirty="0">
-                <a:solidFill>
-                  <a:schemeClr val="tx1"/>
-                </a:solidFill>
-              </a:rPr>
-              <a:t> </a:t>
-            </a:r>
-            <a:r>
-              <a:rPr lang="en-US" sz="2400" dirty="0" err="1">
-                <a:solidFill>
-                  <a:schemeClr val="tx1"/>
-                </a:solidFill>
-              </a:rPr>
-              <a:t>afstanden</a:t>
-            </a:r>
-            <a:r>
-              <a:rPr lang="en-US" sz="2400" dirty="0">
-                <a:solidFill>
-                  <a:schemeClr val="tx1"/>
-                </a:solidFill>
-              </a:rPr>
-              <a:t> van halve </a:t>
-            </a:r>
-            <a:r>
-              <a:rPr lang="en-US" sz="2400" dirty="0" err="1">
-                <a:solidFill>
-                  <a:schemeClr val="tx1"/>
-                </a:solidFill>
-              </a:rPr>
-              <a:t>en</a:t>
-            </a:r>
-            <a:r>
-              <a:rPr lang="en-US" sz="2400" dirty="0">
-                <a:solidFill>
-                  <a:schemeClr val="tx1"/>
-                </a:solidFill>
-              </a:rPr>
-              <a:t> hele meters</a:t>
-            </a:r>
-          </a:p>
-          <a:p>
-            <a:pPr>
-              <a:buFont typeface="Arial" panose="020B0604020202020204" pitchFamily="34" charset="0"/>
-              <a:buChar char="•"/>
+              <a:rPr lang="nl-NL" sz="2000" dirty="0">
+                <a:solidFill>
+                  <a:schemeClr val="tx1"/>
+                </a:solidFill>
+              </a:rPr>
+              <a:t>	</a:t>
+            </a:r>
+            <a:r>
+              <a:rPr lang="nl-NL" sz="2000" dirty="0" smtClean="0">
+                <a:solidFill>
+                  <a:schemeClr val="tx1"/>
+                </a:solidFill>
+              </a:rPr>
+              <a:t>(</a:t>
+            </a:r>
+            <a:r>
+              <a:rPr lang="nl-NL" sz="2000" dirty="0" err="1" smtClean="0">
+                <a:solidFill>
+                  <a:schemeClr val="tx1"/>
+                </a:solidFill>
+              </a:rPr>
+              <a:t>if</a:t>
+            </a:r>
+            <a:r>
+              <a:rPr lang="nl-NL" sz="2000" dirty="0" smtClean="0">
+                <a:solidFill>
+                  <a:schemeClr val="tx1"/>
+                </a:solidFill>
+              </a:rPr>
+              <a:t>) levert een betere prijs op:</a:t>
+            </a:r>
+          </a:p>
+          <a:p>
+            <a:pPr marL="800100" lvl="2" indent="0">
+              <a:buNone/>
             </a:pPr>
             <a:r>
-              <a:rPr lang="en-US" sz="2800" dirty="0" err="1">
-                <a:solidFill>
-                  <a:schemeClr val="tx1"/>
-                </a:solidFill>
-              </a:rPr>
-              <a:t>Tweede</a:t>
-            </a:r>
-            <a:r>
-              <a:rPr lang="en-US" sz="2800" dirty="0">
-                <a:solidFill>
-                  <a:schemeClr val="tx1"/>
-                </a:solidFill>
-              </a:rPr>
-              <a:t> </a:t>
-            </a:r>
-            <a:r>
-              <a:rPr lang="en-US" sz="2800" dirty="0" err="1">
-                <a:solidFill>
-                  <a:schemeClr val="tx1"/>
-                </a:solidFill>
-              </a:rPr>
-              <a:t>idee</a:t>
-            </a:r>
-            <a:r>
-              <a:rPr lang="en-US" sz="2800" dirty="0">
-                <a:solidFill>
-                  <a:schemeClr val="tx1"/>
-                </a:solidFill>
-              </a:rPr>
-              <a:t> </a:t>
-            </a:r>
-            <a:r>
-              <a:rPr lang="en-US" sz="2800" dirty="0" err="1">
-                <a:solidFill>
-                  <a:schemeClr val="tx1"/>
-                </a:solidFill>
-              </a:rPr>
-              <a:t>plattegrond</a:t>
-            </a:r>
-            <a:r>
-              <a:rPr lang="en-US" sz="2800" dirty="0">
-                <a:solidFill>
-                  <a:schemeClr val="tx1"/>
-                </a:solidFill>
-              </a:rPr>
-              <a:t>: </a:t>
-            </a:r>
-            <a:r>
-              <a:rPr lang="en-US" sz="2800" dirty="0" err="1">
-                <a:solidFill>
-                  <a:schemeClr val="tx1"/>
-                </a:solidFill>
-              </a:rPr>
-              <a:t>coördinaten</a:t>
-            </a:r>
-            <a:endParaRPr lang="en-US" sz="2800" dirty="0">
+              <a:rPr lang="nl-NL" sz="2000" dirty="0">
+                <a:solidFill>
+                  <a:schemeClr val="tx1"/>
+                </a:solidFill>
+              </a:rPr>
+              <a:t>a</a:t>
+            </a:r>
+            <a:r>
+              <a:rPr lang="nl-NL" sz="2000" dirty="0" smtClean="0">
+                <a:solidFill>
+                  <a:schemeClr val="tx1"/>
+                </a:solidFill>
+              </a:rPr>
+              <a:t>ccepteer verandering</a:t>
+            </a:r>
+            <a:endParaRPr lang="nl-NL" sz="2000" dirty="0">
               <a:solidFill>
                 <a:schemeClr val="tx1"/>
               </a:solidFill>
@@ -7590,436 +7863,38 @@
           </a:p>
         </p:txBody>
       </p:sp>
+      <p:sp>
+        <p:nvSpPr>
+          <p:cNvPr id="6" name="Titel 1"/>
+          <p:cNvSpPr>
+            <a:spLocks noGrp="1"/>
+          </p:cNvSpPr>
+          <p:nvPr>
+            <p:ph type="title"/>
+          </p:nvPr>
+        </p:nvSpPr>
+        <p:spPr>
+          <a:xfrm>
+            <a:off x="677334" y="609600"/>
+            <a:ext cx="8596668" cy="1320800"/>
+          </a:xfrm>
+        </p:spPr>
+        <p:txBody>
+          <a:bodyPr/>
+          <a:lstStyle/>
+          <a:p>
+            <a:r>
+              <a:rPr lang="en-US" dirty="0" smtClean="0"/>
+              <a:t>Hill Climbing</a:t>
+            </a:r>
+            <a:endParaRPr lang="nl-NL" dirty="0"/>
+          </a:p>
+        </p:txBody>
+      </p:sp>
     </p:spTree>
     <p:extLst>
       <p:ext uri="{BB962C8B-B14F-4D97-AF65-F5344CB8AC3E}">
-        <p14:creationId xmlns:p14="http://schemas.microsoft.com/office/powerpoint/2010/main" val="3821020884"/>
-      </p:ext>
-    </p:extLst>
-  </p:cSld>
-  <p:clrMapOvr>
-    <a:masterClrMapping/>
-  </p:clrMapOvr>
-</p:sld>
-</file>
-
-<file path=ppt/slides/slide8.xml><?xml version="1.0" encoding="utf-8"?>
-<p:sld xmlns:a="http://schemas.openxmlformats.org/drawingml/2006/main" xmlns:r="http://schemas.openxmlformats.org/officeDocument/2006/relationships" xmlns:p="http://schemas.openxmlformats.org/presentationml/2006/main">
-  <p:cSld>
-    <p:spTree>
-      <p:nvGrpSpPr>
-        <p:cNvPr id="1" name=""/>
-        <p:cNvGrpSpPr/>
-        <p:nvPr/>
-      </p:nvGrpSpPr>
-      <p:grpSpPr>
-        <a:xfrm>
-          <a:off x="0" y="0"/>
-          <a:ext cx="0" cy="0"/>
-          <a:chOff x="0" y="0"/>
-          <a:chExt cx="0" cy="0"/>
-        </a:xfrm>
-      </p:grpSpPr>
-      <p:sp>
-        <p:nvSpPr>
-          <p:cNvPr id="2" name="Titel 1"/>
-          <p:cNvSpPr>
-            <a:spLocks noGrp="1"/>
-          </p:cNvSpPr>
-          <p:nvPr>
-            <p:ph type="title"/>
-          </p:nvPr>
-        </p:nvSpPr>
-        <p:spPr/>
-        <p:txBody>
-          <a:bodyPr/>
-          <a:lstStyle/>
-          <a:p>
-            <a:r>
-              <a:rPr lang="en-US" dirty="0" err="1"/>
-              <a:t>Restricties</a:t>
-            </a:r>
-            <a:endParaRPr lang="nl-NL" dirty="0"/>
-          </a:p>
-        </p:txBody>
-      </p:sp>
-      <p:sp>
-        <p:nvSpPr>
-          <p:cNvPr id="3" name="Tijdelijke aanduiding voor inhoud 2"/>
-          <p:cNvSpPr>
-            <a:spLocks noGrp="1"/>
-          </p:cNvSpPr>
-          <p:nvPr>
-            <p:ph idx="1"/>
-          </p:nvPr>
-        </p:nvSpPr>
-        <p:spPr/>
-        <p:txBody>
-          <a:bodyPr>
-            <a:normAutofit/>
-          </a:bodyPr>
-          <a:lstStyle/>
-          <a:p>
-            <a:pPr>
-              <a:buFont typeface="Arial" panose="020B0604020202020204" pitchFamily="34" charset="0"/>
-              <a:buChar char="•"/>
-            </a:pPr>
-            <a:r>
-              <a:rPr lang="en-US" sz="2800" dirty="0" err="1">
-                <a:solidFill>
-                  <a:schemeClr val="tx1"/>
-                </a:solidFill>
-              </a:rPr>
-              <a:t>Genoeg</a:t>
-            </a:r>
-            <a:r>
-              <a:rPr lang="en-US" sz="2800" dirty="0">
-                <a:solidFill>
-                  <a:schemeClr val="tx1"/>
-                </a:solidFill>
-              </a:rPr>
-              <a:t> </a:t>
-            </a:r>
-            <a:r>
-              <a:rPr lang="en-US" sz="2800" dirty="0" err="1">
-                <a:solidFill>
-                  <a:schemeClr val="tx1"/>
-                </a:solidFill>
-              </a:rPr>
-              <a:t>ruimte</a:t>
-            </a:r>
-            <a:r>
-              <a:rPr lang="en-US" sz="2800" dirty="0">
-                <a:solidFill>
-                  <a:schemeClr val="tx1"/>
-                </a:solidFill>
-              </a:rPr>
-              <a:t> </a:t>
-            </a:r>
-            <a:r>
-              <a:rPr lang="en-US" sz="2800" dirty="0" err="1">
-                <a:solidFill>
-                  <a:schemeClr val="tx1"/>
-                </a:solidFill>
-              </a:rPr>
-              <a:t>voor</a:t>
-            </a:r>
-            <a:r>
-              <a:rPr lang="en-US" sz="2800" dirty="0">
-                <a:solidFill>
-                  <a:schemeClr val="tx1"/>
-                </a:solidFill>
-              </a:rPr>
-              <a:t> water</a:t>
-            </a:r>
-          </a:p>
-          <a:p>
-            <a:pPr>
-              <a:buFont typeface="Arial" panose="020B0604020202020204" pitchFamily="34" charset="0"/>
-              <a:buChar char="•"/>
-            </a:pPr>
-            <a:r>
-              <a:rPr lang="en-US" sz="2800" dirty="0" err="1">
-                <a:solidFill>
-                  <a:schemeClr val="tx1"/>
-                </a:solidFill>
-              </a:rPr>
-              <a:t>Huizen</a:t>
-            </a:r>
-            <a:r>
-              <a:rPr lang="en-US" sz="2800" dirty="0">
-                <a:solidFill>
-                  <a:schemeClr val="tx1"/>
-                </a:solidFill>
-              </a:rPr>
-              <a:t> </a:t>
-            </a:r>
-            <a:r>
-              <a:rPr lang="en-US" sz="2800" dirty="0" err="1">
-                <a:solidFill>
-                  <a:schemeClr val="tx1"/>
-                </a:solidFill>
-              </a:rPr>
-              <a:t>kunnen</a:t>
-            </a:r>
-            <a:r>
-              <a:rPr lang="en-US" sz="2800" dirty="0">
-                <a:solidFill>
-                  <a:schemeClr val="tx1"/>
-                </a:solidFill>
-              </a:rPr>
-              <a:t> </a:t>
-            </a:r>
-            <a:r>
-              <a:rPr lang="en-US" sz="2800" dirty="0" err="1">
-                <a:solidFill>
-                  <a:schemeClr val="tx1"/>
-                </a:solidFill>
-              </a:rPr>
-              <a:t>niet</a:t>
-            </a:r>
-            <a:r>
-              <a:rPr lang="en-US" sz="2800" dirty="0">
-                <a:solidFill>
-                  <a:schemeClr val="tx1"/>
-                </a:solidFill>
-              </a:rPr>
-              <a:t> in </a:t>
-            </a:r>
-            <a:r>
-              <a:rPr lang="en-US" sz="2800" dirty="0" err="1">
-                <a:solidFill>
-                  <a:schemeClr val="tx1"/>
-                </a:solidFill>
-              </a:rPr>
-              <a:t>elkaar</a:t>
-            </a:r>
-            <a:r>
-              <a:rPr lang="en-US" sz="2800" dirty="0">
-                <a:solidFill>
-                  <a:schemeClr val="tx1"/>
-                </a:solidFill>
-              </a:rPr>
-              <a:t> </a:t>
-            </a:r>
-            <a:r>
-              <a:rPr lang="en-US" sz="2800" dirty="0" err="1">
-                <a:solidFill>
-                  <a:schemeClr val="tx1"/>
-                </a:solidFill>
-              </a:rPr>
-              <a:t>staan</a:t>
-            </a:r>
-            <a:endParaRPr lang="en-US" sz="2800" dirty="0">
-              <a:solidFill>
-                <a:schemeClr val="tx1"/>
-              </a:solidFill>
-            </a:endParaRPr>
-          </a:p>
-          <a:p>
-            <a:pPr>
-              <a:buFont typeface="Arial" panose="020B0604020202020204" pitchFamily="34" charset="0"/>
-              <a:buChar char="•"/>
-            </a:pPr>
-            <a:r>
-              <a:rPr lang="en-US" sz="2800" dirty="0" err="1">
-                <a:solidFill>
-                  <a:schemeClr val="tx1"/>
-                </a:solidFill>
-              </a:rPr>
-              <a:t>Huizen</a:t>
-            </a:r>
-            <a:r>
-              <a:rPr lang="en-US" sz="2800" dirty="0">
-                <a:solidFill>
-                  <a:schemeClr val="tx1"/>
-                </a:solidFill>
-              </a:rPr>
-              <a:t> </a:t>
-            </a:r>
-            <a:r>
-              <a:rPr lang="en-US" sz="2800" dirty="0" err="1">
-                <a:solidFill>
-                  <a:schemeClr val="tx1"/>
-                </a:solidFill>
-              </a:rPr>
-              <a:t>kunnen</a:t>
-            </a:r>
-            <a:r>
-              <a:rPr lang="en-US" sz="2800" dirty="0">
-                <a:solidFill>
-                  <a:schemeClr val="tx1"/>
-                </a:solidFill>
-              </a:rPr>
-              <a:t> </a:t>
-            </a:r>
-            <a:r>
-              <a:rPr lang="en-US" sz="2800" dirty="0" err="1">
-                <a:solidFill>
-                  <a:schemeClr val="tx1"/>
-                </a:solidFill>
-              </a:rPr>
-              <a:t>niet</a:t>
-            </a:r>
-            <a:r>
-              <a:rPr lang="en-US" sz="2800" dirty="0">
-                <a:solidFill>
-                  <a:schemeClr val="tx1"/>
-                </a:solidFill>
-              </a:rPr>
-              <a:t> in </a:t>
-            </a:r>
-            <a:r>
-              <a:rPr lang="en-US" sz="2800" dirty="0" err="1">
-                <a:solidFill>
-                  <a:schemeClr val="tx1"/>
-                </a:solidFill>
-              </a:rPr>
-              <a:t>verplichte</a:t>
-            </a:r>
-            <a:r>
-              <a:rPr lang="en-US" sz="2800" dirty="0">
-                <a:solidFill>
-                  <a:schemeClr val="tx1"/>
-                </a:solidFill>
-              </a:rPr>
-              <a:t> </a:t>
-            </a:r>
-            <a:r>
-              <a:rPr lang="en-US" sz="2800" dirty="0" err="1">
-                <a:solidFill>
-                  <a:schemeClr val="tx1"/>
-                </a:solidFill>
-              </a:rPr>
-              <a:t>vrijstand</a:t>
-            </a:r>
-            <a:r>
-              <a:rPr lang="en-US" sz="2800" dirty="0">
-                <a:solidFill>
-                  <a:schemeClr val="tx1"/>
-                </a:solidFill>
-              </a:rPr>
-              <a:t> </a:t>
-            </a:r>
-            <a:r>
-              <a:rPr lang="en-US" sz="2800" dirty="0" err="1">
-                <a:solidFill>
-                  <a:schemeClr val="tx1"/>
-                </a:solidFill>
-              </a:rPr>
-              <a:t>staan</a:t>
-            </a:r>
-            <a:endParaRPr lang="nl-NL" sz="2800" dirty="0">
-              <a:solidFill>
-                <a:schemeClr val="tx1"/>
-              </a:solidFill>
-            </a:endParaRPr>
-          </a:p>
-        </p:txBody>
-      </p:sp>
-    </p:spTree>
-    <p:extLst>
-      <p:ext uri="{BB962C8B-B14F-4D97-AF65-F5344CB8AC3E}">
-        <p14:creationId xmlns:p14="http://schemas.microsoft.com/office/powerpoint/2010/main" val="194090137"/>
-      </p:ext>
-    </p:extLst>
-  </p:cSld>
-  <p:clrMapOvr>
-    <a:masterClrMapping/>
-  </p:clrMapOvr>
-</p:sld>
-</file>
-
-<file path=ppt/slides/slide9.xml><?xml version="1.0" encoding="utf-8"?>
-<p:sld xmlns:a="http://schemas.openxmlformats.org/drawingml/2006/main" xmlns:r="http://schemas.openxmlformats.org/officeDocument/2006/relationships" xmlns:p="http://schemas.openxmlformats.org/presentationml/2006/main">
-  <p:cSld>
-    <p:spTree>
-      <p:nvGrpSpPr>
-        <p:cNvPr id="1" name=""/>
-        <p:cNvGrpSpPr/>
-        <p:nvPr/>
-      </p:nvGrpSpPr>
-      <p:grpSpPr>
-        <a:xfrm>
-          <a:off x="0" y="0"/>
-          <a:ext cx="0" cy="0"/>
-          <a:chOff x="0" y="0"/>
-          <a:chExt cx="0" cy="0"/>
-        </a:xfrm>
-      </p:grpSpPr>
-      <p:pic>
-        <p:nvPicPr>
-          <p:cNvPr id="4" name="Tijdelijke aanduiding voor inhoud 3"/>
-          <p:cNvPicPr>
-            <a:picLocks noGrp="1" noChangeAspect="1"/>
-          </p:cNvPicPr>
-          <p:nvPr>
-            <p:ph idx="1"/>
-          </p:nvPr>
-        </p:nvPicPr>
-        <p:blipFill>
-          <a:blip r:embed="rId2">
-            <a:extLst>
-              <a:ext uri="{28A0092B-C50C-407E-A947-70E740481C1C}">
-                <a14:useLocalDpi xmlns:a14="http://schemas.microsoft.com/office/drawing/2010/main" val="0"/>
-              </a:ext>
-            </a:extLst>
-          </a:blip>
-          <a:stretch>
-            <a:fillRect/>
-          </a:stretch>
-        </p:blipFill>
-        <p:spPr>
-          <a:xfrm>
-            <a:off x="3055712" y="219480"/>
-            <a:ext cx="3295588" cy="3124636"/>
-          </a:xfrm>
-        </p:spPr>
-      </p:pic>
-      <p:pic>
-        <p:nvPicPr>
-          <p:cNvPr id="3" name="Afbeelding 2"/>
-          <p:cNvPicPr>
-            <a:picLocks noChangeAspect="1"/>
-          </p:cNvPicPr>
-          <p:nvPr/>
-        </p:nvPicPr>
-        <p:blipFill>
-          <a:blip r:embed="rId3">
-            <a:extLst>
-              <a:ext uri="{28A0092B-C50C-407E-A947-70E740481C1C}">
-                <a14:useLocalDpi xmlns:a14="http://schemas.microsoft.com/office/drawing/2010/main" val="0"/>
-              </a:ext>
-            </a:extLst>
-          </a:blip>
-          <a:stretch>
-            <a:fillRect/>
-          </a:stretch>
-        </p:blipFill>
-        <p:spPr>
-          <a:xfrm>
-            <a:off x="5639241" y="3511541"/>
-            <a:ext cx="3315163" cy="3124636"/>
-          </a:xfrm>
-          <a:prstGeom prst="rect">
-            <a:avLst/>
-          </a:prstGeom>
-        </p:spPr>
-      </p:pic>
-      <p:pic>
-        <p:nvPicPr>
-          <p:cNvPr id="5" name="Afbeelding 4"/>
-          <p:cNvPicPr>
-            <a:picLocks noChangeAspect="1"/>
-          </p:cNvPicPr>
-          <p:nvPr/>
-        </p:nvPicPr>
-        <p:blipFill>
-          <a:blip r:embed="rId4">
-            <a:extLst>
-              <a:ext uri="{28A0092B-C50C-407E-A947-70E740481C1C}">
-                <a14:useLocalDpi xmlns:a14="http://schemas.microsoft.com/office/drawing/2010/main" val="0"/>
-              </a:ext>
-            </a:extLst>
-          </a:blip>
-          <a:stretch>
-            <a:fillRect/>
-          </a:stretch>
-        </p:blipFill>
-        <p:spPr>
-          <a:xfrm>
-            <a:off x="738518" y="3511541"/>
-            <a:ext cx="3324689" cy="3134162"/>
-          </a:xfrm>
-          <a:prstGeom prst="rect">
-            <a:avLst/>
-          </a:prstGeom>
-        </p:spPr>
-      </p:pic>
-    </p:spTree>
-    <p:extLst>
-      <p:ext uri="{BB962C8B-B14F-4D97-AF65-F5344CB8AC3E}">
-        <p14:creationId xmlns:p14="http://schemas.microsoft.com/office/powerpoint/2010/main" val="358144180"/>
+        <p14:creationId xmlns:p14="http://schemas.microsoft.com/office/powerpoint/2010/main" val="2307696771"/>
       </p:ext>
     </p:extLst>
   </p:cSld>
@@ -8280,7 +8155,7 @@
   <a:extraClrSchemeLst/>
   <a:extLst>
     <a:ext uri="{05A4C25C-085E-4340-85A3-A5531E510DB2}">
-      <thm15:themeFamily xmlns:thm15="http://schemas.microsoft.com/office/thememl/2012/main" name="Facet" id="{C0C680CD-088A-49FC-A102-D699147F32B2}" vid="{0B5AB586-D108-4FC1-8368-649FE654B894}"/>
+      <thm15:themeFamily xmlns:thm15="http://schemas.microsoft.com/office/thememl/2012/main" xmlns="" name="Facet" id="{C0C680CD-088A-49FC-A102-D699147F32B2}" vid="{0B5AB586-D108-4FC1-8368-649FE654B894}"/>
     </a:ext>
   </a:extLst>
 </a:theme>

</xml_diff>

<commit_message>
ppt 2 done, block comments updated, constraints minimized
ppt for friday done, all block comments are up to date and constraints only contains one function that checks for water overlap and boundaries
</commit_message>
<xml_diff>
--- a/files/presentatie heuristieken.pptx
+++ b/files/presentatie heuristieken.pptx
@@ -112,7 +112,7 @@
   </p:defaultTextStyle>
   <p:extLst>
     <p:ext uri="{EFAFB233-063F-42B5-8137-9DF3F51BA10A}">
-      <p15:sldGuideLst xmlns:p15="http://schemas.microsoft.com/office/powerpoint/2012/main" xmlns="">
+      <p15:sldGuideLst xmlns="" xmlns:p15="http://schemas.microsoft.com/office/powerpoint/2012/main">
         <p15:guide id="1" orient="horz" pos="2160">
           <p15:clr>
             <a:srgbClr val="A4A3A4"/>
@@ -874,7 +874,7 @@
           <a:p>
             <a:fld id="{B527434C-DB8D-3E4A-85E1-336D115BA189}" type="datetimeFigureOut">
               <a:rPr lang="nl-NL" smtClean="0"/>
-              <a:t>1-5-2018</a:t>
+              <a:t>2-5-2018</a:t>
             </a:fld>
             <a:endParaRPr lang="nl-NL"/>
           </a:p>
@@ -1120,7 +1120,7 @@
           <a:p>
             <a:fld id="{B527434C-DB8D-3E4A-85E1-336D115BA189}" type="datetimeFigureOut">
               <a:rPr lang="nl-NL" smtClean="0"/>
-              <a:t>1-5-2018</a:t>
+              <a:t>2-5-2018</a:t>
             </a:fld>
             <a:endParaRPr lang="nl-NL"/>
           </a:p>
@@ -1429,7 +1429,7 @@
           <a:p>
             <a:fld id="{B527434C-DB8D-3E4A-85E1-336D115BA189}" type="datetimeFigureOut">
               <a:rPr lang="nl-NL" smtClean="0"/>
-              <a:t>1-5-2018</a:t>
+              <a:t>2-5-2018</a:t>
             </a:fld>
             <a:endParaRPr lang="nl-NL"/>
           </a:p>
@@ -1757,7 +1757,7 @@
           <a:p>
             <a:fld id="{B527434C-DB8D-3E4A-85E1-336D115BA189}" type="datetimeFigureOut">
               <a:rPr lang="nl-NL" smtClean="0"/>
-              <a:t>1-5-2018</a:t>
+              <a:t>2-5-2018</a:t>
             </a:fld>
             <a:endParaRPr lang="nl-NL"/>
           </a:p>
@@ -2066,7 +2066,7 @@
           <a:p>
             <a:fld id="{B527434C-DB8D-3E4A-85E1-336D115BA189}" type="datetimeFigureOut">
               <a:rPr lang="nl-NL" smtClean="0"/>
-              <a:t>1-5-2018</a:t>
+              <a:t>2-5-2018</a:t>
             </a:fld>
             <a:endParaRPr lang="nl-NL"/>
           </a:p>
@@ -2454,7 +2454,7 @@
           <a:p>
             <a:fld id="{B527434C-DB8D-3E4A-85E1-336D115BA189}" type="datetimeFigureOut">
               <a:rPr lang="nl-NL" smtClean="0"/>
-              <a:t>1-5-2018</a:t>
+              <a:t>2-5-2018</a:t>
             </a:fld>
             <a:endParaRPr lang="nl-NL"/>
           </a:p>
@@ -2619,7 +2619,7 @@
           <a:p>
             <a:fld id="{B527434C-DB8D-3E4A-85E1-336D115BA189}" type="datetimeFigureOut">
               <a:rPr lang="nl-NL" smtClean="0"/>
-              <a:t>1-5-2018</a:t>
+              <a:t>2-5-2018</a:t>
             </a:fld>
             <a:endParaRPr lang="nl-NL"/>
           </a:p>
@@ -2794,7 +2794,7 @@
           <a:p>
             <a:fld id="{B527434C-DB8D-3E4A-85E1-336D115BA189}" type="datetimeFigureOut">
               <a:rPr lang="nl-NL" smtClean="0"/>
-              <a:t>1-5-2018</a:t>
+              <a:t>2-5-2018</a:t>
             </a:fld>
             <a:endParaRPr lang="nl-NL"/>
           </a:p>
@@ -2959,7 +2959,7 @@
           <a:p>
             <a:fld id="{B527434C-DB8D-3E4A-85E1-336D115BA189}" type="datetimeFigureOut">
               <a:rPr lang="nl-NL" smtClean="0"/>
-              <a:t>1-5-2018</a:t>
+              <a:t>2-5-2018</a:t>
             </a:fld>
             <a:endParaRPr lang="nl-NL"/>
           </a:p>
@@ -3201,7 +3201,7 @@
           <a:p>
             <a:fld id="{B527434C-DB8D-3E4A-85E1-336D115BA189}" type="datetimeFigureOut">
               <a:rPr lang="nl-NL" smtClean="0"/>
-              <a:t>1-5-2018</a:t>
+              <a:t>2-5-2018</a:t>
             </a:fld>
             <a:endParaRPr lang="nl-NL"/>
           </a:p>
@@ -3428,7 +3428,7 @@
           <a:p>
             <a:fld id="{B527434C-DB8D-3E4A-85E1-336D115BA189}" type="datetimeFigureOut">
               <a:rPr lang="nl-NL" smtClean="0"/>
-              <a:t>1-5-2018</a:t>
+              <a:t>2-5-2018</a:t>
             </a:fld>
             <a:endParaRPr lang="nl-NL"/>
           </a:p>
@@ -3797,7 +3797,7 @@
           <a:p>
             <a:fld id="{B527434C-DB8D-3E4A-85E1-336D115BA189}" type="datetimeFigureOut">
               <a:rPr lang="nl-NL" smtClean="0"/>
-              <a:t>1-5-2018</a:t>
+              <a:t>2-5-2018</a:t>
             </a:fld>
             <a:endParaRPr lang="nl-NL"/>
           </a:p>
@@ -3915,7 +3915,7 @@
           <a:p>
             <a:fld id="{B527434C-DB8D-3E4A-85E1-336D115BA189}" type="datetimeFigureOut">
               <a:rPr lang="nl-NL" smtClean="0"/>
-              <a:t>1-5-2018</a:t>
+              <a:t>2-5-2018</a:t>
             </a:fld>
             <a:endParaRPr lang="nl-NL"/>
           </a:p>
@@ -4005,7 +4005,7 @@
           <a:p>
             <a:fld id="{B527434C-DB8D-3E4A-85E1-336D115BA189}" type="datetimeFigureOut">
               <a:rPr lang="nl-NL" smtClean="0"/>
-              <a:t>1-5-2018</a:t>
+              <a:t>2-5-2018</a:t>
             </a:fld>
             <a:endParaRPr lang="nl-NL"/>
           </a:p>
@@ -4255,7 +4255,7 @@
           <a:p>
             <a:fld id="{B527434C-DB8D-3E4A-85E1-336D115BA189}" type="datetimeFigureOut">
               <a:rPr lang="nl-NL" smtClean="0"/>
-              <a:t>1-5-2018</a:t>
+              <a:t>2-5-2018</a:t>
             </a:fld>
             <a:endParaRPr lang="nl-NL"/>
           </a:p>
@@ -4555,7 +4555,7 @@
           <a:p>
             <a:fld id="{B527434C-DB8D-3E4A-85E1-336D115BA189}" type="datetimeFigureOut">
               <a:rPr lang="nl-NL" smtClean="0"/>
-              <a:t>1-5-2018</a:t>
+              <a:t>2-5-2018</a:t>
             </a:fld>
             <a:endParaRPr lang="nl-NL"/>
           </a:p>
@@ -5252,7 +5252,7 @@
           <a:p>
             <a:fld id="{B527434C-DB8D-3E4A-85E1-336D115BA189}" type="datetimeFigureOut">
               <a:rPr lang="nl-NL" smtClean="0"/>
-              <a:t>1-5-2018</a:t>
+              <a:t>2-5-2018</a:t>
             </a:fld>
             <a:endParaRPr lang="nl-NL"/>
           </a:p>
@@ -5758,7 +5758,7 @@
   </p:txStyles>
   <p:extLst>
     <p:ext uri="{27BBF7A9-308A-43DC-89C8-2F10F3537804}">
-      <p15:sldGuideLst xmlns:p15="http://schemas.microsoft.com/office/powerpoint/2012/main" xmlns=""/>
+      <p15:sldGuideLst xmlns="" xmlns:p15="http://schemas.microsoft.com/office/powerpoint/2012/main"/>
     </p:ext>
   </p:extLst>
 </p:sldMaster>
@@ -6156,7 +6156,15 @@
             </a:pPr>
             <a:r>
               <a:rPr lang="nl-NL" sz="2000" dirty="0" smtClean="0"/>
-              <a:t>€610.000 + 6%</a:t>
+              <a:t>€610.000 </a:t>
+            </a:r>
+            <a:r>
+              <a:rPr lang="nl-NL" sz="2000" dirty="0" smtClean="0"/>
+              <a:t>+6</a:t>
+            </a:r>
+            <a:r>
+              <a:rPr lang="nl-NL" sz="2000" dirty="0" smtClean="0"/>
+              <a:t>%</a:t>
             </a:r>
             <a:endParaRPr lang="nl-NL" sz="2000" dirty="0"/>
           </a:p>
@@ -6642,12 +6650,12 @@
               <a:t>Hill </a:t>
             </a:r>
             <a:r>
-              <a:rPr lang="en-US" sz="2800" dirty="0" err="1" smtClean="0">
-                <a:solidFill>
-                  <a:schemeClr val="tx1"/>
-                </a:solidFill>
-              </a:rPr>
-              <a:t>Climbin</a:t>
+              <a:rPr lang="en-US" sz="2800" dirty="0" smtClean="0">
+                <a:solidFill>
+                  <a:schemeClr val="tx1"/>
+                </a:solidFill>
+              </a:rPr>
+              <a:t>Climbing</a:t>
             </a:r>
             <a:endParaRPr lang="en-US" sz="2800" dirty="0" smtClean="0">
               <a:solidFill>
@@ -7257,8 +7265,8 @@
         </p:nvSpPr>
         <p:spPr>
           <a:xfrm>
-            <a:off x="677334" y="1671192"/>
-            <a:ext cx="8596668" cy="4697411"/>
+            <a:off x="677334" y="1484514"/>
+            <a:ext cx="8596668" cy="5070832"/>
           </a:xfrm>
         </p:spPr>
         <p:txBody>
@@ -7491,8 +7499,42 @@
                   <a:schemeClr val="tx1"/>
                 </a:solidFill>
               </a:rPr>
-              <a:t>plaats huis met beste coördinaat</a:t>
-            </a:r>
+              <a:t>plaats huis met beste </a:t>
+            </a:r>
+            <a:r>
+              <a:rPr lang="nl-NL" sz="2000" dirty="0" smtClean="0">
+                <a:solidFill>
+                  <a:schemeClr val="tx1"/>
+                </a:solidFill>
+              </a:rPr>
+              <a:t>coördinaat</a:t>
+            </a:r>
+          </a:p>
+          <a:p>
+            <a:pPr marL="0" indent="0">
+              <a:buNone/>
+            </a:pPr>
+            <a:r>
+              <a:rPr lang="nl-NL" sz="2000" dirty="0">
+                <a:solidFill>
+                  <a:schemeClr val="tx1"/>
+                </a:solidFill>
+              </a:rPr>
+              <a:t>	</a:t>
+            </a:r>
+            <a:r>
+              <a:rPr lang="nl-NL" sz="2000" dirty="0" smtClean="0">
+                <a:solidFill>
+                  <a:schemeClr val="tx1"/>
+                </a:solidFill>
+              </a:rPr>
+              <a:t>verwijder onmogelijke coördinaten</a:t>
+            </a:r>
+            <a:endParaRPr lang="nl-NL" sz="2000" dirty="0" smtClean="0">
+              <a:solidFill>
+                <a:schemeClr val="tx1"/>
+              </a:solidFill>
+            </a:endParaRPr>
           </a:p>
           <a:p>
             <a:pPr marL="0" indent="0">
@@ -7639,7 +7681,7 @@
           <a:p>
             <a:r>
               <a:rPr lang="nl-NL" dirty="0" smtClean="0"/>
-              <a:t>€</a:t>
+              <a:t>€25.159.019</a:t>
             </a:r>
             <a:endParaRPr lang="nl-NL" dirty="0"/>
           </a:p>
@@ -7711,6 +7753,96 @@
           </a:p>
         </p:txBody>
       </p:sp>
+      <p:pic>
+        <p:nvPicPr>
+          <p:cNvPr id="3" name="Afbeelding 2"/>
+          <p:cNvPicPr>
+            <a:picLocks noChangeAspect="1"/>
+          </p:cNvPicPr>
+          <p:nvPr/>
+        </p:nvPicPr>
+        <p:blipFill>
+          <a:blip r:embed="rId2">
+            <a:extLst>
+              <a:ext uri="{28A0092B-C50C-407E-A947-70E740481C1C}">
+                <a14:useLocalDpi xmlns:a14="http://schemas.microsoft.com/office/drawing/2010/main" val="0"/>
+              </a:ext>
+            </a:extLst>
+          </a:blip>
+          <a:stretch>
+            <a:fillRect/>
+          </a:stretch>
+        </p:blipFill>
+        <p:spPr>
+          <a:xfrm>
+            <a:off x="9003544" y="1"/>
+            <a:ext cx="3188455" cy="2416260"/>
+          </a:xfrm>
+          <a:prstGeom prst="rect">
+            <a:avLst/>
+          </a:prstGeom>
+        </p:spPr>
+      </p:pic>
+      <p:pic>
+        <p:nvPicPr>
+          <p:cNvPr id="8" name="Afbeelding 7"/>
+          <p:cNvPicPr>
+            <a:picLocks noChangeAspect="1"/>
+          </p:cNvPicPr>
+          <p:nvPr/>
+        </p:nvPicPr>
+        <p:blipFill>
+          <a:blip r:embed="rId3">
+            <a:extLst>
+              <a:ext uri="{28A0092B-C50C-407E-A947-70E740481C1C}">
+                <a14:useLocalDpi xmlns:a14="http://schemas.microsoft.com/office/drawing/2010/main" val="0"/>
+              </a:ext>
+            </a:extLst>
+          </a:blip>
+          <a:stretch>
+            <a:fillRect/>
+          </a:stretch>
+        </p:blipFill>
+        <p:spPr>
+          <a:xfrm>
+            <a:off x="9003545" y="2158400"/>
+            <a:ext cx="3188455" cy="2371414"/>
+          </a:xfrm>
+          <a:prstGeom prst="rect">
+            <a:avLst/>
+          </a:prstGeom>
+        </p:spPr>
+      </p:pic>
+      <p:pic>
+        <p:nvPicPr>
+          <p:cNvPr id="9" name="Afbeelding 8"/>
+          <p:cNvPicPr>
+            <a:picLocks noChangeAspect="1"/>
+          </p:cNvPicPr>
+          <p:nvPr/>
+        </p:nvPicPr>
+        <p:blipFill>
+          <a:blip r:embed="rId4">
+            <a:extLst>
+              <a:ext uri="{28A0092B-C50C-407E-A947-70E740481C1C}">
+                <a14:useLocalDpi xmlns:a14="http://schemas.microsoft.com/office/drawing/2010/main" val="0"/>
+              </a:ext>
+            </a:extLst>
+          </a:blip>
+          <a:stretch>
+            <a:fillRect/>
+          </a:stretch>
+        </p:blipFill>
+        <p:spPr>
+          <a:xfrm>
+            <a:off x="9003545" y="4524665"/>
+            <a:ext cx="3188455" cy="2371413"/>
+          </a:xfrm>
+          <a:prstGeom prst="rect">
+            <a:avLst/>
+          </a:prstGeom>
+        </p:spPr>
+      </p:pic>
     </p:spTree>
     <p:extLst>
       <p:ext uri="{BB962C8B-B14F-4D97-AF65-F5344CB8AC3E}">
@@ -8155,7 +8287,7 @@
   <a:extraClrSchemeLst/>
   <a:extLst>
     <a:ext uri="{05A4C25C-085E-4340-85A3-A5531E510DB2}">
-      <thm15:themeFamily xmlns:thm15="http://schemas.microsoft.com/office/thememl/2012/main" xmlns="" name="Facet" id="{C0C680CD-088A-49FC-A102-D699147F32B2}" vid="{0B5AB586-D108-4FC1-8368-649FE654B894}"/>
+      <thm15:themeFamily xmlns="" xmlns:thm15="http://schemas.microsoft.com/office/thememl/2012/main" name="Facet" id="{C0C680CD-088A-49FC-A102-D699147F32B2}" vid="{0B5AB586-D108-4FC1-8368-649FE654B894}"/>
     </a:ext>
   </a:extLst>
 </a:theme>

</xml_diff>

<commit_message>
improved ppt and changed way of saving
</commit_message>
<xml_diff>
--- a/files/presentatie heuristieken.pptx
+++ b/files/presentatie heuristieken.pptx
@@ -12,6 +12,8 @@
     <p:sldId id="262" r:id="rId6"/>
     <p:sldId id="268" r:id="rId7"/>
     <p:sldId id="269" r:id="rId8"/>
+    <p:sldId id="270" r:id="rId9"/>
+    <p:sldId id="271" r:id="rId10"/>
   </p:sldIdLst>
   <p:sldSz cx="12192000" cy="6858000"/>
   <p:notesSz cx="6858000" cy="9144000"/>
@@ -874,7 +876,7 @@
           <a:p>
             <a:fld id="{B527434C-DB8D-3E4A-85E1-336D115BA189}" type="datetimeFigureOut">
               <a:rPr lang="nl-NL" smtClean="0"/>
-              <a:t>16-5-2018</a:t>
+              <a:t>18-5-2018</a:t>
             </a:fld>
             <a:endParaRPr lang="nl-NL"/>
           </a:p>
@@ -1120,7 +1122,7 @@
           <a:p>
             <a:fld id="{B527434C-DB8D-3E4A-85E1-336D115BA189}" type="datetimeFigureOut">
               <a:rPr lang="nl-NL" smtClean="0"/>
-              <a:t>16-5-2018</a:t>
+              <a:t>18-5-2018</a:t>
             </a:fld>
             <a:endParaRPr lang="nl-NL"/>
           </a:p>
@@ -1429,7 +1431,7 @@
           <a:p>
             <a:fld id="{B527434C-DB8D-3E4A-85E1-336D115BA189}" type="datetimeFigureOut">
               <a:rPr lang="nl-NL" smtClean="0"/>
-              <a:t>16-5-2018</a:t>
+              <a:t>18-5-2018</a:t>
             </a:fld>
             <a:endParaRPr lang="nl-NL"/>
           </a:p>
@@ -1757,7 +1759,7 @@
           <a:p>
             <a:fld id="{B527434C-DB8D-3E4A-85E1-336D115BA189}" type="datetimeFigureOut">
               <a:rPr lang="nl-NL" smtClean="0"/>
-              <a:t>16-5-2018</a:t>
+              <a:t>18-5-2018</a:t>
             </a:fld>
             <a:endParaRPr lang="nl-NL"/>
           </a:p>
@@ -2066,7 +2068,7 @@
           <a:p>
             <a:fld id="{B527434C-DB8D-3E4A-85E1-336D115BA189}" type="datetimeFigureOut">
               <a:rPr lang="nl-NL" smtClean="0"/>
-              <a:t>16-5-2018</a:t>
+              <a:t>18-5-2018</a:t>
             </a:fld>
             <a:endParaRPr lang="nl-NL"/>
           </a:p>
@@ -2454,7 +2456,7 @@
           <a:p>
             <a:fld id="{B527434C-DB8D-3E4A-85E1-336D115BA189}" type="datetimeFigureOut">
               <a:rPr lang="nl-NL" smtClean="0"/>
-              <a:t>16-5-2018</a:t>
+              <a:t>18-5-2018</a:t>
             </a:fld>
             <a:endParaRPr lang="nl-NL"/>
           </a:p>
@@ -2619,7 +2621,7 @@
           <a:p>
             <a:fld id="{B527434C-DB8D-3E4A-85E1-336D115BA189}" type="datetimeFigureOut">
               <a:rPr lang="nl-NL" smtClean="0"/>
-              <a:t>16-5-2018</a:t>
+              <a:t>18-5-2018</a:t>
             </a:fld>
             <a:endParaRPr lang="nl-NL"/>
           </a:p>
@@ -2794,7 +2796,7 @@
           <a:p>
             <a:fld id="{B527434C-DB8D-3E4A-85E1-336D115BA189}" type="datetimeFigureOut">
               <a:rPr lang="nl-NL" smtClean="0"/>
-              <a:t>16-5-2018</a:t>
+              <a:t>18-5-2018</a:t>
             </a:fld>
             <a:endParaRPr lang="nl-NL"/>
           </a:p>
@@ -2959,7 +2961,7 @@
           <a:p>
             <a:fld id="{B527434C-DB8D-3E4A-85E1-336D115BA189}" type="datetimeFigureOut">
               <a:rPr lang="nl-NL" smtClean="0"/>
-              <a:t>16-5-2018</a:t>
+              <a:t>18-5-2018</a:t>
             </a:fld>
             <a:endParaRPr lang="nl-NL"/>
           </a:p>
@@ -3201,7 +3203,7 @@
           <a:p>
             <a:fld id="{B527434C-DB8D-3E4A-85E1-336D115BA189}" type="datetimeFigureOut">
               <a:rPr lang="nl-NL" smtClean="0"/>
-              <a:t>16-5-2018</a:t>
+              <a:t>18-5-2018</a:t>
             </a:fld>
             <a:endParaRPr lang="nl-NL"/>
           </a:p>
@@ -3428,7 +3430,7 @@
           <a:p>
             <a:fld id="{B527434C-DB8D-3E4A-85E1-336D115BA189}" type="datetimeFigureOut">
               <a:rPr lang="nl-NL" smtClean="0"/>
-              <a:t>16-5-2018</a:t>
+              <a:t>18-5-2018</a:t>
             </a:fld>
             <a:endParaRPr lang="nl-NL"/>
           </a:p>
@@ -3797,7 +3799,7 @@
           <a:p>
             <a:fld id="{B527434C-DB8D-3E4A-85E1-336D115BA189}" type="datetimeFigureOut">
               <a:rPr lang="nl-NL" smtClean="0"/>
-              <a:t>16-5-2018</a:t>
+              <a:t>18-5-2018</a:t>
             </a:fld>
             <a:endParaRPr lang="nl-NL"/>
           </a:p>
@@ -3915,7 +3917,7 @@
           <a:p>
             <a:fld id="{B527434C-DB8D-3E4A-85E1-336D115BA189}" type="datetimeFigureOut">
               <a:rPr lang="nl-NL" smtClean="0"/>
-              <a:t>16-5-2018</a:t>
+              <a:t>18-5-2018</a:t>
             </a:fld>
             <a:endParaRPr lang="nl-NL"/>
           </a:p>
@@ -4005,7 +4007,7 @@
           <a:p>
             <a:fld id="{B527434C-DB8D-3E4A-85E1-336D115BA189}" type="datetimeFigureOut">
               <a:rPr lang="nl-NL" smtClean="0"/>
-              <a:t>16-5-2018</a:t>
+              <a:t>18-5-2018</a:t>
             </a:fld>
             <a:endParaRPr lang="nl-NL"/>
           </a:p>
@@ -4255,7 +4257,7 @@
           <a:p>
             <a:fld id="{B527434C-DB8D-3E4A-85E1-336D115BA189}" type="datetimeFigureOut">
               <a:rPr lang="nl-NL" smtClean="0"/>
-              <a:t>16-5-2018</a:t>
+              <a:t>18-5-2018</a:t>
             </a:fld>
             <a:endParaRPr lang="nl-NL"/>
           </a:p>
@@ -4555,7 +4557,7 @@
           <a:p>
             <a:fld id="{B527434C-DB8D-3E4A-85E1-336D115BA189}" type="datetimeFigureOut">
               <a:rPr lang="nl-NL" smtClean="0"/>
-              <a:t>16-5-2018</a:t>
+              <a:t>18-5-2018</a:t>
             </a:fld>
             <a:endParaRPr lang="nl-NL"/>
           </a:p>
@@ -5252,7 +5254,7 @@
           <a:p>
             <a:fld id="{B527434C-DB8D-3E4A-85E1-336D115BA189}" type="datetimeFigureOut">
               <a:rPr lang="nl-NL" smtClean="0"/>
-              <a:t>16-5-2018</a:t>
+              <a:t>18-5-2018</a:t>
             </a:fld>
             <a:endParaRPr lang="nl-NL"/>
           </a:p>
@@ -5793,7 +5795,7 @@
         </p:nvSpPr>
         <p:spPr>
           <a:xfrm>
-            <a:off x="596537" y="625974"/>
+            <a:off x="596537" y="288350"/>
             <a:ext cx="9144000" cy="2387600"/>
           </a:xfrm>
         </p:spPr>
@@ -5803,17 +5805,20 @@
           <a:p>
             <a:pPr algn="ctr"/>
             <a:r>
+              <a:rPr lang="nl-NL" dirty="0" err="1"/>
+              <a:t>Amstelhaege</a:t>
+            </a:r>
+            <a:r>
               <a:rPr lang="nl-NL" dirty="0"/>
-              <a:t>Heuristieken</a:t>
+              <a:t>: </a:t>
             </a:r>
             <a:br>
               <a:rPr lang="nl-NL" dirty="0"/>
             </a:br>
             <a:r>
-              <a:rPr lang="nl-NL" dirty="0" err="1"/>
-              <a:t>Amstelhaege</a:t>
-            </a:r>
-            <a:endParaRPr lang="nl-NL" dirty="0"/>
+              <a:rPr lang="nl-NL" dirty="0"/>
+              <a:t>De Huisjesmelkers</a:t>
+            </a:r>
           </a:p>
         </p:txBody>
       </p:sp>
@@ -5829,7 +5834,7 @@
         </p:nvSpPr>
         <p:spPr>
           <a:xfrm>
-            <a:off x="596537" y="3432221"/>
+            <a:off x="605362" y="2865143"/>
             <a:ext cx="9144000" cy="1655762"/>
           </a:xfrm>
         </p:spPr>
@@ -5871,14 +5876,6 @@
               </a:rPr>
               <a:t>Sterkenburg</a:t>
             </a:r>
-            <a:r>
-              <a:rPr lang="nl-NL" sz="2800" dirty="0">
-                <a:solidFill>
-                  <a:schemeClr val="tx1"/>
-                </a:solidFill>
-              </a:rPr>
-              <a:t/>
-            </a:r>
             <a:br>
               <a:rPr lang="nl-NL" sz="2800" dirty="0">
                 <a:solidFill>
@@ -5905,6 +5902,36 @@
           </a:p>
         </p:txBody>
       </p:sp>
+      <p:pic>
+        <p:nvPicPr>
+          <p:cNvPr id="7" name="Afbeelding 6">
+            <a:extLst>
+              <a:ext uri="{FF2B5EF4-FFF2-40B4-BE49-F238E27FC236}">
+                <a16:creationId xmlns:a16="http://schemas.microsoft.com/office/drawing/2014/main" id="{A799BD4C-8142-4C26-8CA6-2B32CB0AAF49}"/>
+              </a:ext>
+            </a:extLst>
+          </p:cNvPr>
+          <p:cNvPicPr>
+            <a:picLocks noChangeAspect="1"/>
+          </p:cNvPicPr>
+          <p:nvPr/>
+        </p:nvPicPr>
+        <p:blipFill>
+          <a:blip r:embed="rId2"/>
+          <a:stretch>
+            <a:fillRect/>
+          </a:stretch>
+        </p:blipFill>
+        <p:spPr>
+          <a:xfrm>
+            <a:off x="2485499" y="4520905"/>
+            <a:ext cx="5383725" cy="2225274"/>
+          </a:xfrm>
+          <a:prstGeom prst="rect">
+            <a:avLst/>
+          </a:prstGeom>
+        </p:spPr>
+      </p:pic>
     </p:spTree>
     <p:extLst>
       <p:ext uri="{BB962C8B-B14F-4D97-AF65-F5344CB8AC3E}">
@@ -5959,11 +5986,14 @@
           <a:p>
             <a:r>
               <a:rPr lang="nl-NL" dirty="0"/>
-              <a:t>Nieuwbouw wijk </a:t>
+              <a:t>Nieuwbouwwijk </a:t>
             </a:r>
             <a:br>
               <a:rPr lang="nl-NL" dirty="0"/>
             </a:br>
+            <a:br>
+              <a:rPr lang="nl-NL" dirty="0"/>
+            </a:br>
             <a:r>
               <a:rPr lang="nl-NL" dirty="0">
                 <a:solidFill>
@@ -5979,7 +6009,7 @@
                 </a:solidFill>
                 <a:sym typeface="Wingdings"/>
               </a:rPr>
-              <a:t>:</a:t>
+              <a:t>: Hoogste kavelwaarde bereiken</a:t>
             </a:r>
             <a:br>
               <a:rPr lang="nl-NL" dirty="0">
@@ -5989,32 +6019,6 @@
                 <a:sym typeface="Wingdings"/>
               </a:rPr>
             </a:br>
-            <a:r>
-              <a:rPr lang="nl-NL" dirty="0">
-                <a:solidFill>
-                  <a:schemeClr val="tx1"/>
-                </a:solidFill>
-                <a:sym typeface="Wingdings"/>
-              </a:rPr>
-              <a:t>Hoogste kavelwaarde bereiken</a:t>
-            </a:r>
-            <a:br>
-              <a:rPr lang="nl-NL" dirty="0">
-                <a:solidFill>
-                  <a:schemeClr val="tx1"/>
-                </a:solidFill>
-                <a:sym typeface="Wingdings"/>
-              </a:rPr>
-            </a:br>
-            <a:r>
-              <a:rPr lang="nl-NL" dirty="0">
-                <a:solidFill>
-                  <a:schemeClr val="tx1"/>
-                </a:solidFill>
-                <a:sym typeface="Wingdings"/>
-              </a:rPr>
-              <a:t/>
-            </a:r>
             <a:br>
               <a:rPr lang="nl-NL" dirty="0">
                 <a:solidFill>
@@ -6039,8 +6043,8 @@
         </p:nvSpPr>
         <p:spPr>
           <a:xfrm>
-            <a:off x="677334" y="2640169"/>
-            <a:ext cx="3657600" cy="3231654"/>
+            <a:off x="677333" y="2943109"/>
+            <a:ext cx="6412579" cy="3231654"/>
           </a:xfrm>
           <a:prstGeom prst="rect">
             <a:avLst/>
@@ -6058,10 +6062,10 @@
               <a:buChar char="-"/>
             </a:pPr>
             <a:r>
-              <a:rPr lang="nl-NL" sz="2800" dirty="0" err="1" smtClean="0"/>
+              <a:rPr lang="nl-NL" sz="2800" dirty="0" err="1"/>
               <a:t>Eengezins</a:t>
             </a:r>
-            <a:endParaRPr lang="nl-NL" sz="2800" dirty="0" smtClean="0"/>
+            <a:endParaRPr lang="nl-NL" sz="2800" dirty="0"/>
           </a:p>
           <a:p>
             <a:pPr marL="742950" lvl="1" indent="-285750">
@@ -6069,14 +6073,14 @@
               <a:buChar char="-"/>
             </a:pPr>
             <a:r>
-              <a:rPr lang="nl-NL" sz="2000" dirty="0" smtClean="0"/>
-              <a:t>8x8, 2 </a:t>
-            </a:r>
-            <a:r>
-              <a:rPr lang="nl-NL" sz="2000" dirty="0" err="1" smtClean="0"/>
+              <a:rPr lang="nl-NL" sz="2000" dirty="0"/>
+              <a:t>8m x 8m, 2m verplichte </a:t>
+            </a:r>
+            <a:r>
+              <a:rPr lang="nl-NL" sz="2000" dirty="0" err="1"/>
               <a:t>vrijstand</a:t>
             </a:r>
-            <a:endParaRPr lang="nl-NL" sz="2000" dirty="0" smtClean="0"/>
+            <a:endParaRPr lang="nl-NL" sz="2000" dirty="0"/>
           </a:p>
           <a:p>
             <a:pPr marL="742950" lvl="1" indent="-285750">
@@ -6084,9 +6088,14 @@
               <a:buChar char="-"/>
             </a:pPr>
             <a:r>
-              <a:rPr lang="nl-NL" sz="2000" dirty="0" smtClean="0"/>
-              <a:t>€285.000, +3%</a:t>
-            </a:r>
+              <a:rPr lang="nl-NL" sz="2000" dirty="0"/>
+              <a:t>€285.000, +3% per extra meter </a:t>
+            </a:r>
+            <a:r>
+              <a:rPr lang="nl-NL" sz="2000" dirty="0" err="1"/>
+              <a:t>vrijstand</a:t>
+            </a:r>
+            <a:endParaRPr lang="nl-NL" sz="2000" dirty="0"/>
           </a:p>
           <a:p>
             <a:pPr marL="285750" indent="-285750">
@@ -6094,7 +6103,7 @@
               <a:buChar char="-"/>
             </a:pPr>
             <a:r>
-              <a:rPr lang="nl-NL" sz="2800" dirty="0" smtClean="0"/>
+              <a:rPr lang="nl-NL" sz="2800" dirty="0"/>
               <a:t>Bungalow</a:t>
             </a:r>
           </a:p>
@@ -6104,14 +6113,14 @@
               <a:buChar char="-"/>
             </a:pPr>
             <a:r>
-              <a:rPr lang="nl-NL" sz="2000" dirty="0" smtClean="0"/>
-              <a:t>10x7.5, 3 </a:t>
-            </a:r>
-            <a:r>
-              <a:rPr lang="nl-NL" sz="2000" dirty="0" err="1" smtClean="0"/>
+              <a:rPr lang="nl-NL" sz="2000" dirty="0"/>
+              <a:t>10m x 7.5m, 3m verplichte </a:t>
+            </a:r>
+            <a:r>
+              <a:rPr lang="nl-NL" sz="2000" dirty="0" err="1"/>
               <a:t>vrijstand</a:t>
             </a:r>
-            <a:endParaRPr lang="nl-NL" sz="2000" dirty="0" smtClean="0"/>
+            <a:endParaRPr lang="nl-NL" sz="2000" dirty="0"/>
           </a:p>
           <a:p>
             <a:pPr marL="742950" lvl="1" indent="-285750">
@@ -6119,8 +6128,12 @@
               <a:buChar char="-"/>
             </a:pPr>
             <a:r>
-              <a:rPr lang="nl-NL" sz="2000" dirty="0" smtClean="0"/>
-              <a:t>€399.000, +4%</a:t>
+              <a:rPr lang="nl-NL" sz="2000" dirty="0"/>
+              <a:t>€399.000, +4% per extra meter </a:t>
+            </a:r>
+            <a:r>
+              <a:rPr lang="nl-NL" sz="2000" dirty="0" err="1"/>
+              <a:t>vrijstand</a:t>
             </a:r>
             <a:endParaRPr lang="nl-NL" dirty="0"/>
           </a:p>
@@ -6130,7 +6143,7 @@
               <a:buChar char="-"/>
             </a:pPr>
             <a:r>
-              <a:rPr lang="nl-NL" sz="2800" dirty="0" smtClean="0"/>
+              <a:rPr lang="nl-NL" sz="2800" dirty="0"/>
               <a:t>Maison</a:t>
             </a:r>
           </a:p>
@@ -6140,14 +6153,14 @@
               <a:buChar char="-"/>
             </a:pPr>
             <a:r>
-              <a:rPr lang="nl-NL" sz="2000" dirty="0" smtClean="0"/>
-              <a:t>11x10.5, 6 </a:t>
-            </a:r>
-            <a:r>
-              <a:rPr lang="nl-NL" sz="2000" dirty="0" err="1" smtClean="0"/>
+              <a:rPr lang="nl-NL" sz="2000" dirty="0"/>
+              <a:t>11m x 10.5m, 6m verplichte </a:t>
+            </a:r>
+            <a:r>
+              <a:rPr lang="nl-NL" sz="2000" dirty="0" err="1"/>
               <a:t>vrijstand</a:t>
             </a:r>
-            <a:endParaRPr lang="nl-NL" sz="2000" dirty="0" smtClean="0"/>
+            <a:endParaRPr lang="nl-NL" sz="2000" dirty="0"/>
           </a:p>
           <a:p>
             <a:pPr marL="742950" lvl="1" indent="-285750">
@@ -6155,8 +6168,12 @@
               <a:buChar char="-"/>
             </a:pPr>
             <a:r>
-              <a:rPr lang="nl-NL" sz="2000" dirty="0" smtClean="0"/>
-              <a:t>€610.000 +6%</a:t>
+              <a:rPr lang="nl-NL" sz="2000" dirty="0"/>
+              <a:t>€610.000 +6% per extra meter </a:t>
+            </a:r>
+            <a:r>
+              <a:rPr lang="nl-NL" sz="2000" dirty="0" err="1"/>
+              <a:t>vrijstand</a:t>
             </a:r>
             <a:endParaRPr lang="nl-NL" sz="2000" dirty="0"/>
           </a:p>
@@ -6237,7 +6254,7 @@
               <a:buChar char="•"/>
             </a:pPr>
             <a:r>
-              <a:rPr lang="en-US" sz="2800" dirty="0" smtClean="0">
+              <a:rPr lang="en-US" sz="2800" dirty="0">
                 <a:solidFill>
                   <a:schemeClr val="tx1"/>
                 </a:solidFill>
@@ -6245,7 +6262,7 @@
               <a:t>Floorplan met </a:t>
             </a:r>
             <a:r>
-              <a:rPr lang="en-US" sz="2800" dirty="0" err="1" smtClean="0">
+              <a:rPr lang="en-US" sz="2800" dirty="0" err="1">
                 <a:solidFill>
                   <a:schemeClr val="tx1"/>
                 </a:solidFill>
@@ -6253,7 +6270,7 @@
               <a:t>daarin</a:t>
             </a:r>
             <a:r>
-              <a:rPr lang="en-US" sz="2800" dirty="0" smtClean="0">
+              <a:rPr lang="en-US" sz="2800" dirty="0">
                 <a:solidFill>
                   <a:schemeClr val="tx1"/>
                 </a:solidFill>
@@ -6261,7 +6278,7 @@
               <a:t> de </a:t>
             </a:r>
             <a:r>
-              <a:rPr lang="en-US" sz="2800" dirty="0" err="1" smtClean="0">
+              <a:rPr lang="en-US" sz="2800" dirty="0" err="1">
                 <a:solidFill>
                   <a:schemeClr val="tx1"/>
                 </a:solidFill>
@@ -6269,7 +6286,7 @@
               <a:t>grootte</a:t>
             </a:r>
             <a:r>
-              <a:rPr lang="en-US" sz="2800" dirty="0" smtClean="0">
+              <a:rPr lang="en-US" sz="2800" dirty="0">
                 <a:solidFill>
                   <a:schemeClr val="tx1"/>
                 </a:solidFill>
@@ -6277,7 +6294,7 @@
               <a:t> van het </a:t>
             </a:r>
             <a:r>
-              <a:rPr lang="en-US" sz="2800" dirty="0" err="1" smtClean="0">
+              <a:rPr lang="en-US" sz="2800" dirty="0" err="1">
                 <a:solidFill>
                   <a:schemeClr val="tx1"/>
                 </a:solidFill>
@@ -6285,7 +6302,7 @@
               <a:t>kavel</a:t>
             </a:r>
             <a:r>
-              <a:rPr lang="en-US" sz="2800" dirty="0" smtClean="0">
+              <a:rPr lang="en-US" sz="2800" dirty="0">
                 <a:solidFill>
                   <a:schemeClr val="tx1"/>
                 </a:solidFill>
@@ -6293,7 +6310,7 @@
               <a:t> </a:t>
             </a:r>
             <a:r>
-              <a:rPr lang="en-US" sz="2800" dirty="0" err="1" smtClean="0">
+              <a:rPr lang="en-US" sz="2800" dirty="0" err="1">
                 <a:solidFill>
                   <a:schemeClr val="tx1"/>
                 </a:solidFill>
@@ -6301,7 +6318,7 @@
               <a:t>en</a:t>
             </a:r>
             <a:r>
-              <a:rPr lang="en-US" sz="2800" dirty="0" smtClean="0">
+              <a:rPr lang="en-US" sz="2800" dirty="0">
                 <a:solidFill>
                   <a:schemeClr val="tx1"/>
                 </a:solidFill>
@@ -6309,7 +6326,7 @@
               <a:t> </a:t>
             </a:r>
             <a:r>
-              <a:rPr lang="en-US" sz="2800" dirty="0" err="1" smtClean="0">
+              <a:rPr lang="en-US" sz="2800" dirty="0" err="1">
                 <a:solidFill>
                   <a:schemeClr val="tx1"/>
                 </a:solidFill>
@@ -6317,7 +6334,7 @@
               <a:t>lijst</a:t>
             </a:r>
             <a:r>
-              <a:rPr lang="en-US" sz="2800" dirty="0" smtClean="0">
+              <a:rPr lang="en-US" sz="2800" dirty="0">
                 <a:solidFill>
                   <a:schemeClr val="tx1"/>
                 </a:solidFill>
@@ -6325,7 +6342,7 @@
               <a:t> van </a:t>
             </a:r>
             <a:r>
-              <a:rPr lang="en-US" sz="2800" dirty="0" err="1" smtClean="0">
+              <a:rPr lang="en-US" sz="2800" dirty="0" err="1">
                 <a:solidFill>
                   <a:schemeClr val="tx1"/>
                 </a:solidFill>
@@ -6333,7 +6350,7 @@
               <a:t>alle</a:t>
             </a:r>
             <a:r>
-              <a:rPr lang="en-US" sz="2800" dirty="0" smtClean="0">
+              <a:rPr lang="en-US" sz="2800" dirty="0">
                 <a:solidFill>
                   <a:schemeClr val="tx1"/>
                 </a:solidFill>
@@ -6341,7 +6358,7 @@
               <a:t> </a:t>
             </a:r>
             <a:r>
-              <a:rPr lang="en-US" sz="2800" dirty="0" err="1" smtClean="0">
+              <a:rPr lang="en-US" sz="2800" dirty="0" err="1">
                 <a:solidFill>
                   <a:schemeClr val="tx1"/>
                 </a:solidFill>
@@ -6349,7 +6366,7 @@
               <a:t>huizen</a:t>
             </a:r>
             <a:r>
-              <a:rPr lang="en-US" sz="2800" dirty="0" smtClean="0">
+              <a:rPr lang="en-US" sz="2800" dirty="0">
                 <a:solidFill>
                   <a:schemeClr val="tx1"/>
                 </a:solidFill>
@@ -6357,7 +6374,7 @@
               <a:t> </a:t>
             </a:r>
             <a:r>
-              <a:rPr lang="en-US" sz="2800" dirty="0" err="1" smtClean="0">
+              <a:rPr lang="en-US" sz="2800" dirty="0" err="1">
                 <a:solidFill>
                   <a:schemeClr val="tx1"/>
                 </a:solidFill>
@@ -6365,7 +6382,7 @@
               <a:t>en</a:t>
             </a:r>
             <a:r>
-              <a:rPr lang="en-US" sz="2800" dirty="0" smtClean="0">
+              <a:rPr lang="en-US" sz="2800" dirty="0">
                 <a:solidFill>
                   <a:schemeClr val="tx1"/>
                 </a:solidFill>
@@ -6384,23 +6401,7 @@
                   <a:schemeClr val="tx1"/>
                 </a:solidFill>
               </a:rPr>
-              <a:t>O</a:t>
-            </a:r>
-            <a:r>
-              <a:rPr lang="en-US" sz="2800" dirty="0" err="1" smtClean="0">
-                <a:solidFill>
-                  <a:schemeClr val="tx1"/>
-                </a:solidFill>
-              </a:rPr>
-              <a:t>verkoepelende</a:t>
-            </a:r>
-            <a:r>
-              <a:rPr lang="en-US" sz="2800" dirty="0" smtClean="0">
-                <a:solidFill>
-                  <a:schemeClr val="tx1"/>
-                </a:solidFill>
-              </a:rPr>
-              <a:t> </a:t>
+              <a:t>Overkoepelende</a:t>
             </a:r>
             <a:r>
               <a:rPr lang="en-US" sz="2800" dirty="0">
@@ -6408,15 +6409,7 @@
                   <a:schemeClr val="tx1"/>
                 </a:solidFill>
               </a:rPr>
-              <a:t>“House”-</a:t>
-            </a:r>
-            <a:r>
-              <a:rPr lang="en-US" sz="2800" dirty="0" smtClean="0">
-                <a:solidFill>
-                  <a:schemeClr val="tx1"/>
-                </a:solidFill>
-              </a:rPr>
-              <a:t>class</a:t>
+              <a:t> “House”-class</a:t>
             </a:r>
           </a:p>
           <a:p>
@@ -6425,7 +6418,7 @@
               <a:buChar char="•"/>
             </a:pPr>
             <a:r>
-              <a:rPr lang="en-US" sz="2800" dirty="0" smtClean="0">
+              <a:rPr lang="en-US" sz="2800" dirty="0">
                 <a:solidFill>
                   <a:schemeClr val="tx1"/>
                 </a:solidFill>
@@ -6465,144 +6458,139 @@
               <a:t> </a:t>
             </a:r>
             <a:r>
-              <a:rPr lang="en-US" sz="2800" dirty="0" err="1" smtClean="0">
+              <a:rPr lang="en-US" sz="2800" dirty="0" err="1">
                 <a:solidFill>
                   <a:schemeClr val="tx1"/>
                 </a:solidFill>
               </a:rPr>
               <a:t>huizen</a:t>
-            </a:r>
-            <a:endParaRPr lang="en-US" sz="2800" dirty="0" smtClean="0">
-              <a:solidFill>
-                <a:schemeClr val="tx1"/>
-              </a:solidFill>
-            </a:endParaRPr>
-          </a:p>
-          <a:p>
-            <a:pPr>
-              <a:buFont typeface="Arial" panose="020B0604020202020204" pitchFamily="34" charset="0"/>
-              <a:buChar char="•"/>
-            </a:pPr>
-            <a:r>
-              <a:rPr lang="en-US" sz="2800" dirty="0" err="1" smtClean="0">
-                <a:solidFill>
-                  <a:schemeClr val="tx1"/>
-                </a:solidFill>
-              </a:rPr>
-              <a:t>Ieder</a:t>
-            </a:r>
-            <a:r>
-              <a:rPr lang="en-US" sz="2800" dirty="0" smtClean="0">
-                <a:solidFill>
-                  <a:schemeClr val="tx1"/>
-                </a:solidFill>
-              </a:rPr>
-              <a:t> huis </a:t>
-            </a:r>
-            <a:r>
-              <a:rPr lang="en-US" sz="2800" dirty="0" err="1" smtClean="0">
-                <a:solidFill>
-                  <a:schemeClr val="tx1"/>
-                </a:solidFill>
-              </a:rPr>
-              <a:t>heeft</a:t>
-            </a:r>
-            <a:r>
-              <a:rPr lang="en-US" sz="2800" dirty="0" smtClean="0">
-                <a:solidFill>
-                  <a:schemeClr val="tx1"/>
-                </a:solidFill>
-              </a:rPr>
-              <a:t> </a:t>
-            </a:r>
-            <a:r>
-              <a:rPr lang="en-US" sz="2800" dirty="0" err="1" smtClean="0">
-                <a:solidFill>
-                  <a:schemeClr val="tx1"/>
-                </a:solidFill>
-              </a:rPr>
-              <a:t>coördinaten</a:t>
-            </a:r>
-            <a:endParaRPr lang="en-US" sz="2800" dirty="0" smtClean="0">
-              <a:solidFill>
-                <a:schemeClr val="tx1"/>
-              </a:solidFill>
-            </a:endParaRPr>
-          </a:p>
-          <a:p>
-            <a:pPr>
-              <a:buFont typeface="Arial" panose="020B0604020202020204" pitchFamily="34" charset="0"/>
-              <a:buChar char="•"/>
-            </a:pPr>
-            <a:r>
-              <a:rPr lang="en-US" sz="2800" dirty="0" err="1" smtClean="0">
-                <a:solidFill>
-                  <a:schemeClr val="tx1"/>
-                </a:solidFill>
-              </a:rPr>
-              <a:t>Voor</a:t>
-            </a:r>
-            <a:r>
-              <a:rPr lang="en-US" sz="2800" dirty="0" smtClean="0">
-                <a:solidFill>
-                  <a:schemeClr val="tx1"/>
-                </a:solidFill>
-              </a:rPr>
-              <a:t> particle swarm: </a:t>
-            </a:r>
-            <a:r>
-              <a:rPr lang="en-US" sz="2800" dirty="0" err="1" smtClean="0">
-                <a:solidFill>
-                  <a:schemeClr val="tx1"/>
-                </a:solidFill>
-              </a:rPr>
-              <a:t>een</a:t>
-            </a:r>
-            <a:r>
-              <a:rPr lang="en-US" sz="2800" dirty="0" smtClean="0">
-                <a:solidFill>
-                  <a:schemeClr val="tx1"/>
-                </a:solidFill>
-              </a:rPr>
-              <a:t> population met </a:t>
-            </a:r>
-            <a:r>
-              <a:rPr lang="en-US" sz="2800" dirty="0" err="1" smtClean="0">
-                <a:solidFill>
-                  <a:schemeClr val="tx1"/>
-                </a:solidFill>
-              </a:rPr>
-              <a:t>een</a:t>
-            </a:r>
-            <a:r>
-              <a:rPr lang="en-US" sz="2800" dirty="0" smtClean="0">
-                <a:solidFill>
-                  <a:schemeClr val="tx1"/>
-                </a:solidFill>
-              </a:rPr>
-              <a:t> </a:t>
-            </a:r>
-            <a:r>
-              <a:rPr lang="en-US" sz="2800" dirty="0" err="1" smtClean="0">
-                <a:solidFill>
-                  <a:schemeClr val="tx1"/>
-                </a:solidFill>
-              </a:rPr>
-              <a:t>lijst</a:t>
-            </a:r>
-            <a:r>
-              <a:rPr lang="en-US" sz="2800" dirty="0" smtClean="0">
-                <a:solidFill>
-                  <a:schemeClr val="tx1"/>
-                </a:solidFill>
-              </a:rPr>
-              <a:t> van floorplans</a:t>
             </a:r>
             <a:endParaRPr lang="en-US" sz="2800" dirty="0">
               <a:solidFill>
                 <a:schemeClr val="tx1"/>
               </a:solidFill>
             </a:endParaRPr>
+          </a:p>
+          <a:p>
+            <a:pPr>
+              <a:buFont typeface="Arial" panose="020B0604020202020204" pitchFamily="34" charset="0"/>
+              <a:buChar char="•"/>
+            </a:pPr>
+            <a:r>
+              <a:rPr lang="en-US" sz="2800" dirty="0" err="1">
+                <a:solidFill>
+                  <a:schemeClr val="tx1"/>
+                </a:solidFill>
+              </a:rPr>
+              <a:t>Ieder</a:t>
+            </a:r>
+            <a:r>
+              <a:rPr lang="en-US" sz="2800" dirty="0">
+                <a:solidFill>
+                  <a:schemeClr val="tx1"/>
+                </a:solidFill>
+              </a:rPr>
+              <a:t> huis </a:t>
+            </a:r>
+            <a:r>
+              <a:rPr lang="en-US" sz="2800" dirty="0" err="1">
+                <a:solidFill>
+                  <a:schemeClr val="tx1"/>
+                </a:solidFill>
+              </a:rPr>
+              <a:t>heeft</a:t>
+            </a:r>
+            <a:r>
+              <a:rPr lang="en-US" sz="2800" dirty="0">
+                <a:solidFill>
+                  <a:schemeClr val="tx1"/>
+                </a:solidFill>
+              </a:rPr>
+              <a:t> </a:t>
+            </a:r>
+            <a:r>
+              <a:rPr lang="en-US" sz="2800" dirty="0" err="1">
+                <a:solidFill>
+                  <a:schemeClr val="tx1"/>
+                </a:solidFill>
+              </a:rPr>
+              <a:t>coördinaten</a:t>
+            </a:r>
+            <a:endParaRPr lang="en-US" sz="2800" dirty="0">
+              <a:solidFill>
+                <a:schemeClr val="tx1"/>
+              </a:solidFill>
+            </a:endParaRPr>
+          </a:p>
+          <a:p>
+            <a:pPr>
+              <a:buFont typeface="Arial" panose="020B0604020202020204" pitchFamily="34" charset="0"/>
+              <a:buChar char="•"/>
+            </a:pPr>
+            <a:r>
+              <a:rPr lang="en-US" sz="2800" dirty="0" err="1">
+                <a:solidFill>
+                  <a:schemeClr val="tx1"/>
+                </a:solidFill>
+              </a:rPr>
+              <a:t>Voor</a:t>
+            </a:r>
+            <a:r>
+              <a:rPr lang="en-US" sz="2800" dirty="0">
+                <a:solidFill>
+                  <a:schemeClr val="tx1"/>
+                </a:solidFill>
+              </a:rPr>
+              <a:t> particle swarm: </a:t>
+            </a:r>
+            <a:r>
+              <a:rPr lang="en-US" sz="2800" dirty="0" err="1">
+                <a:solidFill>
+                  <a:schemeClr val="tx1"/>
+                </a:solidFill>
+              </a:rPr>
+              <a:t>een</a:t>
+            </a:r>
+            <a:r>
+              <a:rPr lang="en-US" sz="2800" dirty="0">
+                <a:solidFill>
+                  <a:schemeClr val="tx1"/>
+                </a:solidFill>
+              </a:rPr>
+              <a:t> population met </a:t>
+            </a:r>
+            <a:r>
+              <a:rPr lang="en-US" sz="2800" dirty="0" err="1">
+                <a:solidFill>
+                  <a:schemeClr val="tx1"/>
+                </a:solidFill>
+              </a:rPr>
+              <a:t>een</a:t>
+            </a:r>
+            <a:r>
+              <a:rPr lang="en-US" sz="2800" dirty="0">
+                <a:solidFill>
+                  <a:schemeClr val="tx1"/>
+                </a:solidFill>
+              </a:rPr>
+              <a:t> </a:t>
+            </a:r>
+            <a:r>
+              <a:rPr lang="en-US" sz="2800" dirty="0" err="1">
+                <a:solidFill>
+                  <a:schemeClr val="tx1"/>
+                </a:solidFill>
+              </a:rPr>
+              <a:t>lijst</a:t>
+            </a:r>
+            <a:r>
+              <a:rPr lang="en-US" sz="2800" dirty="0">
+                <a:solidFill>
+                  <a:schemeClr val="tx1"/>
+                </a:solidFill>
+              </a:rPr>
+              <a:t> van floorplans</a:t>
+            </a:r>
           </a:p>
         </p:txBody>
       </p:sp>
@@ -6652,7 +6640,7 @@
           <a:lstStyle/>
           <a:p>
             <a:r>
-              <a:rPr lang="en-US" dirty="0" err="1" smtClean="0"/>
+              <a:rPr lang="en-US" dirty="0" err="1"/>
               <a:t>Algoritmes</a:t>
             </a:r>
             <a:endParaRPr lang="nl-NL" dirty="0"/>
@@ -6681,7 +6669,7 @@
               <a:buChar char="•"/>
             </a:pPr>
             <a:r>
-              <a:rPr lang="en-US" sz="2800" dirty="0" smtClean="0">
+              <a:rPr lang="en-US" sz="2800" dirty="0">
                 <a:solidFill>
                   <a:schemeClr val="tx1"/>
                 </a:solidFill>
@@ -6695,7 +6683,7 @@
               <a:buChar char="•"/>
             </a:pPr>
             <a:r>
-              <a:rPr lang="en-US" sz="2800" dirty="0" smtClean="0">
+              <a:rPr lang="en-US" sz="2800" dirty="0">
                 <a:solidFill>
                   <a:schemeClr val="tx1"/>
                 </a:solidFill>
@@ -6709,7 +6697,7 @@
               <a:buChar char="•"/>
             </a:pPr>
             <a:r>
-              <a:rPr lang="en-US" sz="2800" dirty="0" smtClean="0">
+              <a:rPr lang="en-US" sz="2800" dirty="0">
                 <a:solidFill>
                   <a:schemeClr val="tx1"/>
                 </a:solidFill>
@@ -6723,21 +6711,36 @@
               <a:buChar char="•"/>
             </a:pPr>
             <a:r>
-              <a:rPr lang="en-US" sz="2800" dirty="0" smtClean="0">
-                <a:solidFill>
-                  <a:schemeClr val="tx1"/>
-                </a:solidFill>
-              </a:rPr>
-              <a:t>Simulated </a:t>
-            </a:r>
-            <a:r>
-              <a:rPr lang="en-US" sz="2800" dirty="0" smtClean="0">
-                <a:solidFill>
-                  <a:schemeClr val="tx1"/>
-                </a:solidFill>
-              </a:rPr>
-              <a:t>Annealing</a:t>
-            </a:r>
+              <a:rPr lang="en-US" sz="2800" dirty="0">
+                <a:solidFill>
+                  <a:schemeClr val="tx1"/>
+                </a:solidFill>
+              </a:rPr>
+              <a:t>Simulated Annealing </a:t>
+            </a:r>
+            <a:r>
+              <a:rPr lang="en-US" sz="2800" dirty="0">
+                <a:solidFill>
+                  <a:schemeClr val="tx1"/>
+                </a:solidFill>
+                <a:sym typeface="Wingdings" panose="05000000000000000000" pitchFamily="2" charset="2"/>
+              </a:rPr>
+              <a:t> </a:t>
+            </a:r>
+            <a:r>
+              <a:rPr lang="en-US" sz="2800" dirty="0" err="1">
+                <a:solidFill>
+                  <a:schemeClr val="tx1"/>
+                </a:solidFill>
+                <a:sym typeface="Wingdings" panose="05000000000000000000" pitchFamily="2" charset="2"/>
+              </a:rPr>
+              <a:t>momenteel</a:t>
+            </a:r>
+            <a:endParaRPr lang="en-US" sz="2800" dirty="0">
+              <a:solidFill>
+                <a:schemeClr val="tx1"/>
+              </a:solidFill>
+            </a:endParaRPr>
           </a:p>
           <a:p>
             <a:pPr>
@@ -6745,12 +6748,30 @@
               <a:buChar char="•"/>
             </a:pPr>
             <a:r>
-              <a:rPr lang="en-US" sz="2800" dirty="0" smtClean="0">
-                <a:solidFill>
-                  <a:schemeClr val="tx1"/>
-                </a:solidFill>
-              </a:rPr>
-              <a:t>Particle Swarm</a:t>
+              <a:rPr lang="en-US" sz="2800" dirty="0">
+                <a:solidFill>
+                  <a:schemeClr val="tx1"/>
+                </a:solidFill>
+              </a:rPr>
+              <a:t>Particle Swarm </a:t>
+            </a:r>
+            <a:r>
+              <a:rPr lang="en-US" sz="2800" dirty="0">
+                <a:solidFill>
+                  <a:schemeClr val="tx1"/>
+                </a:solidFill>
+                <a:sym typeface="Wingdings" panose="05000000000000000000" pitchFamily="2" charset="2"/>
+              </a:rPr>
+              <a:t> </a:t>
+            </a:r>
+            <a:r>
+              <a:rPr lang="en-US" sz="2800" dirty="0" err="1">
+                <a:solidFill>
+                  <a:schemeClr val="tx1"/>
+                </a:solidFill>
+                <a:sym typeface="Wingdings" panose="05000000000000000000" pitchFamily="2" charset="2"/>
+              </a:rPr>
+              <a:t>momenteel</a:t>
             </a:r>
             <a:endParaRPr lang="nl-NL" sz="2800" dirty="0">
               <a:solidFill>
@@ -6816,7 +6837,7 @@
               <a:buNone/>
             </a:pPr>
             <a:r>
-              <a:rPr lang="nl-NL" sz="2000" dirty="0" smtClean="0">
+              <a:rPr lang="nl-NL" sz="2000" dirty="0">
                 <a:solidFill>
                   <a:schemeClr val="tx1"/>
                 </a:solidFill>
@@ -6834,15 +6855,7 @@
                   <a:schemeClr val="tx1"/>
                 </a:solidFill>
               </a:rPr>
-              <a:t>	</a:t>
-            </a:r>
-            <a:r>
-              <a:rPr lang="nl-NL" sz="2000" dirty="0" smtClean="0">
-                <a:solidFill>
-                  <a:schemeClr val="tx1"/>
-                </a:solidFill>
-              </a:rPr>
-              <a:t>maak water</a:t>
+              <a:t>	maak water</a:t>
             </a:r>
           </a:p>
           <a:p>
@@ -6855,18 +6868,10 @@
                   <a:schemeClr val="tx1"/>
                 </a:solidFill>
               </a:rPr>
-              <a:t>	</a:t>
-            </a:r>
-            <a:r>
-              <a:rPr lang="nl-NL" sz="2000" dirty="0" smtClean="0">
-                <a:solidFill>
-                  <a:schemeClr val="tx1"/>
-                </a:solidFill>
-              </a:rPr>
-              <a:t>(</a:t>
-            </a:r>
-            <a:r>
-              <a:rPr lang="nl-NL" sz="2000" dirty="0" err="1" smtClean="0">
+              <a:t>	(</a:t>
+            </a:r>
+            <a:r>
+              <a:rPr lang="nl-NL" sz="2000" dirty="0" err="1">
                 <a:solidFill>
                   <a:schemeClr val="tx1"/>
                 </a:solidFill>
@@ -6874,7 +6879,7 @@
               <a:t>if</a:t>
             </a:r>
             <a:r>
-              <a:rPr lang="nl-NL" sz="2000" dirty="0" smtClean="0">
+              <a:rPr lang="nl-NL" sz="2000" dirty="0">
                 <a:solidFill>
                   <a:schemeClr val="tx1"/>
                 </a:solidFill>
@@ -6892,15 +6897,7 @@
                   <a:schemeClr val="tx1"/>
                 </a:solidFill>
               </a:rPr>
-              <a:t>	</a:t>
-            </a:r>
-            <a:r>
-              <a:rPr lang="nl-NL" sz="2000" dirty="0" smtClean="0">
-                <a:solidFill>
-                  <a:schemeClr val="tx1"/>
-                </a:solidFill>
-              </a:rPr>
-              <a:t>	plaats water</a:t>
+              <a:t>		plaats water</a:t>
             </a:r>
           </a:p>
           <a:p>
@@ -6918,7 +6915,7 @@
               <a:buNone/>
             </a:pPr>
             <a:r>
-              <a:rPr lang="nl-NL" sz="2000" dirty="0" smtClean="0">
+              <a:rPr lang="nl-NL" sz="2000" dirty="0">
                 <a:solidFill>
                   <a:schemeClr val="tx1"/>
                 </a:solidFill>
@@ -6936,15 +6933,7 @@
                   <a:schemeClr val="tx1"/>
                 </a:solidFill>
               </a:rPr>
-              <a:t>	</a:t>
-            </a:r>
-            <a:r>
-              <a:rPr lang="nl-NL" sz="2000" dirty="0" smtClean="0">
-                <a:solidFill>
-                  <a:schemeClr val="tx1"/>
-                </a:solidFill>
-              </a:rPr>
-              <a:t>maak huis</a:t>
+              <a:t>	maak huis</a:t>
             </a:r>
           </a:p>
           <a:p>
@@ -6952,7 +6941,7 @@
               <a:buNone/>
             </a:pPr>
             <a:r>
-              <a:rPr lang="nl-NL" sz="2000" dirty="0" smtClean="0">
+              <a:rPr lang="nl-NL" sz="2000" dirty="0">
                 <a:solidFill>
                   <a:schemeClr val="tx1"/>
                 </a:solidFill>
@@ -6960,7 +6949,7 @@
               <a:t>	(</a:t>
             </a:r>
             <a:r>
-              <a:rPr lang="nl-NL" sz="2000" dirty="0" err="1" smtClean="0">
+              <a:rPr lang="nl-NL" sz="2000" dirty="0" err="1">
                 <a:solidFill>
                   <a:schemeClr val="tx1"/>
                 </a:solidFill>
@@ -6968,7 +6957,7 @@
               <a:t>if</a:t>
             </a:r>
             <a:r>
-              <a:rPr lang="nl-NL" sz="2000" dirty="0" smtClean="0">
+              <a:rPr lang="nl-NL" sz="2000" dirty="0">
                 <a:solidFill>
                   <a:schemeClr val="tx1"/>
                 </a:solidFill>
@@ -6986,15 +6975,7 @@
                   <a:schemeClr val="tx1"/>
                 </a:solidFill>
               </a:rPr>
-              <a:t>	</a:t>
-            </a:r>
-            <a:r>
-              <a:rPr lang="nl-NL" sz="2000" dirty="0" smtClean="0">
-                <a:solidFill>
-                  <a:schemeClr val="tx1"/>
-                </a:solidFill>
-              </a:rPr>
-              <a:t>	plaats huis</a:t>
+              <a:t>		plaats huis</a:t>
             </a:r>
           </a:p>
           <a:p>
@@ -7012,18 +6993,13 @@
               <a:buNone/>
             </a:pPr>
             <a:r>
-              <a:rPr lang="nl-NL" sz="2000" dirty="0" smtClean="0">
+              <a:rPr lang="nl-NL" sz="2000" dirty="0">
                 <a:solidFill>
                   <a:schemeClr val="tx1"/>
                 </a:solidFill>
               </a:rPr>
               <a:t>scorefunctie + visualisatie</a:t>
             </a:r>
-            <a:endParaRPr lang="nl-NL" sz="2000" dirty="0">
-              <a:solidFill>
-                <a:schemeClr val="tx1"/>
-              </a:solidFill>
-            </a:endParaRPr>
           </a:p>
         </p:txBody>
       </p:sp>
@@ -7048,7 +7024,7 @@
           <a:lstStyle/>
           <a:p>
             <a:r>
-              <a:rPr lang="en-US" dirty="0" smtClean="0"/>
+              <a:rPr lang="en-US" dirty="0"/>
               <a:t>Random</a:t>
             </a:r>
             <a:endParaRPr lang="nl-NL" dirty="0"/>
@@ -7079,32 +7055,26 @@
           <a:p>
             <a:r>
               <a:rPr lang="nl-NL" dirty="0"/>
-              <a:t>W</a:t>
-            </a:r>
-            <a:r>
-              <a:rPr lang="nl-NL" dirty="0" smtClean="0"/>
-              <a:t>aarde:</a:t>
-            </a:r>
-          </a:p>
-          <a:p>
-            <a:r>
-              <a:rPr lang="nl-NL" dirty="0" smtClean="0"/>
+              <a:t>Waarde:</a:t>
+            </a:r>
+          </a:p>
+          <a:p>
+            <a:r>
+              <a:rPr lang="nl-NL" dirty="0"/>
               <a:t>€9.554.057</a:t>
             </a:r>
-            <a:endParaRPr lang="nl-NL" dirty="0"/>
-          </a:p>
-          <a:p>
-            <a:r>
-              <a:rPr lang="nl-NL" dirty="0" smtClean="0"/>
+          </a:p>
+          <a:p>
+            <a:r>
+              <a:rPr lang="nl-NL" dirty="0"/>
               <a:t>Minimale waarde:</a:t>
             </a:r>
           </a:p>
           <a:p>
             <a:r>
-              <a:rPr lang="nl-NL" dirty="0" smtClean="0"/>
+              <a:rPr lang="nl-NL" dirty="0"/>
               <a:t>€7.245.000</a:t>
             </a:r>
-            <a:endParaRPr lang="nl-NL" dirty="0"/>
           </a:p>
         </p:txBody>
       </p:sp>
@@ -7131,29 +7101,27 @@
           <a:lstStyle/>
           <a:p>
             <a:r>
-              <a:rPr lang="nl-NL" dirty="0" smtClean="0"/>
+              <a:rPr lang="nl-NL" dirty="0"/>
               <a:t>Waarde:</a:t>
             </a:r>
           </a:p>
           <a:p>
             <a:r>
-              <a:rPr lang="nl-NL" dirty="0" smtClean="0"/>
+              <a:rPr lang="nl-NL" dirty="0"/>
               <a:t>€16.102.734</a:t>
             </a:r>
-            <a:endParaRPr lang="nl-NL" dirty="0"/>
-          </a:p>
-          <a:p>
-            <a:r>
-              <a:rPr lang="nl-NL" dirty="0" smtClean="0"/>
+          </a:p>
+          <a:p>
+            <a:r>
+              <a:rPr lang="nl-NL" dirty="0"/>
               <a:t>Minimale waarde:</a:t>
             </a:r>
           </a:p>
           <a:p>
             <a:r>
-              <a:rPr lang="nl-NL" dirty="0" smtClean="0"/>
+              <a:rPr lang="nl-NL" dirty="0"/>
               <a:t>€14.490.000</a:t>
             </a:r>
-            <a:endParaRPr lang="nl-NL" dirty="0"/>
           </a:p>
         </p:txBody>
       </p:sp>
@@ -7181,58 +7149,53 @@
           <a:p>
             <a:r>
               <a:rPr lang="nl-NL" dirty="0"/>
-              <a:t>W</a:t>
-            </a:r>
-            <a:r>
-              <a:rPr lang="nl-NL" dirty="0" smtClean="0"/>
-              <a:t>aarde:</a:t>
-            </a:r>
-          </a:p>
-          <a:p>
-            <a:r>
-              <a:rPr lang="nl-NL" dirty="0" smtClean="0"/>
+              <a:t>Waarde:</a:t>
+            </a:r>
+          </a:p>
+          <a:p>
+            <a:r>
+              <a:rPr lang="nl-NL" dirty="0"/>
               <a:t>€23.469.612</a:t>
             </a:r>
           </a:p>
           <a:p>
             <a:r>
-              <a:rPr lang="nl-NL" dirty="0" smtClean="0"/>
+              <a:rPr lang="nl-NL" dirty="0"/>
               <a:t>Minimale waarde:</a:t>
             </a:r>
           </a:p>
           <a:p>
             <a:r>
-              <a:rPr lang="nl-NL" dirty="0" smtClean="0"/>
+              <a:rPr lang="nl-NL" dirty="0"/>
               <a:t>€21.735.000</a:t>
             </a:r>
-            <a:endParaRPr lang="nl-NL" dirty="0"/>
           </a:p>
         </p:txBody>
       </p:sp>
       <p:pic>
         <p:nvPicPr>
-          <p:cNvPr id="10" name="Afbeelding 9"/>
+          <p:cNvPr id="4" name="Afbeelding 3">
+            <a:extLst>
+              <a:ext uri="{FF2B5EF4-FFF2-40B4-BE49-F238E27FC236}">
+                <a16:creationId xmlns:a16="http://schemas.microsoft.com/office/drawing/2014/main" id="{F8B06D1C-915F-445C-9A52-C6DAC58AAE56}"/>
+              </a:ext>
+            </a:extLst>
+          </p:cNvPr>
           <p:cNvPicPr>
             <a:picLocks noChangeAspect="1"/>
           </p:cNvPicPr>
           <p:nvPr/>
         </p:nvPicPr>
         <p:blipFill>
-          <a:blip r:embed="rId2">
-            <a:extLst>
-              <a:ext uri="{28A0092B-C50C-407E-A947-70E740481C1C}">
-                <a14:useLocalDpi xmlns:a14="http://schemas.microsoft.com/office/drawing/2010/main" val="0"/>
-              </a:ext>
-            </a:extLst>
-          </a:blip>
+          <a:blip r:embed="rId2"/>
           <a:stretch>
             <a:fillRect/>
           </a:stretch>
         </p:blipFill>
         <p:spPr>
           <a:xfrm>
-            <a:off x="8986738" y="0"/>
-            <a:ext cx="3191259" cy="2373499"/>
+            <a:off x="9000741" y="-8970"/>
+            <a:ext cx="3191259" cy="2393444"/>
           </a:xfrm>
           <a:prstGeom prst="rect">
             <a:avLst/>
@@ -7241,28 +7204,28 @@
       </p:pic>
       <p:pic>
         <p:nvPicPr>
-          <p:cNvPr id="11" name="Afbeelding 10"/>
+          <p:cNvPr id="13" name="Afbeelding 12">
+            <a:extLst>
+              <a:ext uri="{FF2B5EF4-FFF2-40B4-BE49-F238E27FC236}">
+                <a16:creationId xmlns:a16="http://schemas.microsoft.com/office/drawing/2014/main" id="{EA28F051-4ED9-4159-8524-8C4DD231737C}"/>
+              </a:ext>
+            </a:extLst>
+          </p:cNvPr>
           <p:cNvPicPr>
             <a:picLocks noChangeAspect="1"/>
           </p:cNvPicPr>
           <p:nvPr/>
         </p:nvPicPr>
         <p:blipFill>
-          <a:blip r:embed="rId3">
-            <a:extLst>
-              <a:ext uri="{28A0092B-C50C-407E-A947-70E740481C1C}">
-                <a14:useLocalDpi xmlns:a14="http://schemas.microsoft.com/office/drawing/2010/main" val="0"/>
-              </a:ext>
-            </a:extLst>
-          </a:blip>
+          <a:blip r:embed="rId3"/>
           <a:stretch>
             <a:fillRect/>
           </a:stretch>
         </p:blipFill>
         <p:spPr>
           <a:xfrm>
-            <a:off x="9000741" y="2336912"/>
-            <a:ext cx="3191259" cy="2373499"/>
+            <a:off x="9040035" y="2135125"/>
+            <a:ext cx="3164661" cy="2373496"/>
           </a:xfrm>
           <a:prstGeom prst="rect">
             <a:avLst/>
@@ -7271,28 +7234,28 @@
       </p:pic>
       <p:pic>
         <p:nvPicPr>
-          <p:cNvPr id="12" name="Afbeelding 11"/>
+          <p:cNvPr id="15" name="Afbeelding 14">
+            <a:extLst>
+              <a:ext uri="{FF2B5EF4-FFF2-40B4-BE49-F238E27FC236}">
+                <a16:creationId xmlns:a16="http://schemas.microsoft.com/office/drawing/2014/main" id="{195ACEBB-B254-4D67-A96F-BA5466E6F542}"/>
+              </a:ext>
+            </a:extLst>
+          </p:cNvPr>
           <p:cNvPicPr>
             <a:picLocks noChangeAspect="1"/>
           </p:cNvPicPr>
           <p:nvPr/>
         </p:nvPicPr>
         <p:blipFill>
-          <a:blip r:embed="rId4">
-            <a:extLst>
-              <a:ext uri="{28A0092B-C50C-407E-A947-70E740481C1C}">
-                <a14:useLocalDpi xmlns:a14="http://schemas.microsoft.com/office/drawing/2010/main" val="0"/>
-              </a:ext>
-            </a:extLst>
-          </a:blip>
+          <a:blip r:embed="rId4"/>
           <a:stretch>
             <a:fillRect/>
           </a:stretch>
         </p:blipFill>
         <p:spPr>
           <a:xfrm>
-            <a:off x="9040031" y="4484501"/>
-            <a:ext cx="3191259" cy="2373499"/>
+            <a:off x="9040033" y="4484502"/>
+            <a:ext cx="3164663" cy="2373497"/>
           </a:xfrm>
           <a:prstGeom prst="rect">
             <a:avLst/>
@@ -7355,7 +7318,7 @@
               <a:buNone/>
             </a:pPr>
             <a:r>
-              <a:rPr lang="nl-NL" sz="2000" dirty="0" smtClean="0">
+              <a:rPr lang="nl-NL" sz="2000" dirty="0">
                 <a:solidFill>
                   <a:schemeClr val="tx1"/>
                 </a:solidFill>
@@ -7373,15 +7336,7 @@
                   <a:schemeClr val="tx1"/>
                 </a:solidFill>
               </a:rPr>
-              <a:t>	</a:t>
-            </a:r>
-            <a:r>
-              <a:rPr lang="nl-NL" sz="2000" dirty="0" smtClean="0">
-                <a:solidFill>
-                  <a:schemeClr val="tx1"/>
-                </a:solidFill>
-              </a:rPr>
-              <a:t>maak water</a:t>
+              <a:t>	maak water</a:t>
             </a:r>
           </a:p>
           <a:p>
@@ -7394,18 +7349,10 @@
                   <a:schemeClr val="tx1"/>
                 </a:solidFill>
               </a:rPr>
-              <a:t>	</a:t>
-            </a:r>
-            <a:r>
-              <a:rPr lang="nl-NL" sz="2000" dirty="0" smtClean="0">
-                <a:solidFill>
-                  <a:schemeClr val="tx1"/>
-                </a:solidFill>
-              </a:rPr>
-              <a:t>(</a:t>
-            </a:r>
-            <a:r>
-              <a:rPr lang="nl-NL" sz="2000" dirty="0" err="1" smtClean="0">
+              <a:t>	(</a:t>
+            </a:r>
+            <a:r>
+              <a:rPr lang="nl-NL" sz="2000" dirty="0" err="1">
                 <a:solidFill>
                   <a:schemeClr val="tx1"/>
                 </a:solidFill>
@@ -7413,7 +7360,7 @@
               <a:t>if</a:t>
             </a:r>
             <a:r>
-              <a:rPr lang="nl-NL" sz="2000" dirty="0" smtClean="0">
+              <a:rPr lang="nl-NL" sz="2000" dirty="0">
                 <a:solidFill>
                   <a:schemeClr val="tx1"/>
                 </a:solidFill>
@@ -7431,15 +7378,7 @@
                   <a:schemeClr val="tx1"/>
                 </a:solidFill>
               </a:rPr>
-              <a:t>	</a:t>
-            </a:r>
-            <a:r>
-              <a:rPr lang="nl-NL" sz="2000" dirty="0" smtClean="0">
-                <a:solidFill>
-                  <a:schemeClr val="tx1"/>
-                </a:solidFill>
-              </a:rPr>
-              <a:t>	plaats water</a:t>
+              <a:t>		plaats water</a:t>
             </a:r>
           </a:p>
           <a:p>
@@ -7457,7 +7396,7 @@
               <a:buNone/>
             </a:pPr>
             <a:r>
-              <a:rPr lang="nl-NL" sz="2000" dirty="0" smtClean="0">
+              <a:rPr lang="nl-NL" sz="2000" dirty="0">
                 <a:solidFill>
                   <a:schemeClr val="tx1"/>
                 </a:solidFill>
@@ -7475,15 +7414,7 @@
                   <a:schemeClr val="tx1"/>
                 </a:solidFill>
               </a:rPr>
-              <a:t>	</a:t>
-            </a:r>
-            <a:r>
-              <a:rPr lang="nl-NL" sz="2000" dirty="0" smtClean="0">
-                <a:solidFill>
-                  <a:schemeClr val="tx1"/>
-                </a:solidFill>
-              </a:rPr>
-              <a:t>maak huis</a:t>
+              <a:t>	maak huis</a:t>
             </a:r>
           </a:p>
           <a:p>
@@ -7491,7 +7422,7 @@
               <a:buNone/>
             </a:pPr>
             <a:r>
-              <a:rPr lang="nl-NL" sz="2000" dirty="0" smtClean="0">
+              <a:rPr lang="nl-NL" sz="2000" dirty="0">
                 <a:solidFill>
                   <a:schemeClr val="tx1"/>
                 </a:solidFill>
@@ -7509,18 +7440,10 @@
                   <a:schemeClr val="tx1"/>
                 </a:solidFill>
               </a:rPr>
-              <a:t>	</a:t>
-            </a:r>
-            <a:r>
-              <a:rPr lang="nl-NL" sz="2000" dirty="0" smtClean="0">
-                <a:solidFill>
-                  <a:schemeClr val="tx1"/>
-                </a:solidFill>
-              </a:rPr>
-              <a:t>	(</a:t>
-            </a:r>
-            <a:r>
-              <a:rPr lang="nl-NL" sz="2000" dirty="0" err="1" smtClean="0">
+              <a:t>		(</a:t>
+            </a:r>
+            <a:r>
+              <a:rPr lang="nl-NL" sz="2000" dirty="0" err="1">
                 <a:solidFill>
                   <a:schemeClr val="tx1"/>
                 </a:solidFill>
@@ -7528,7 +7451,7 @@
               <a:t>if</a:t>
             </a:r>
             <a:r>
-              <a:rPr lang="nl-NL" sz="2000" dirty="0" smtClean="0">
+              <a:rPr lang="nl-NL" sz="2000" dirty="0">
                 <a:solidFill>
                   <a:schemeClr val="tx1"/>
                 </a:solidFill>
@@ -7546,15 +7469,7 @@
                   <a:schemeClr val="tx1"/>
                 </a:solidFill>
               </a:rPr>
-              <a:t>	</a:t>
-            </a:r>
-            <a:r>
-              <a:rPr lang="nl-NL" sz="2000" dirty="0" smtClean="0">
-                <a:solidFill>
-                  <a:schemeClr val="tx1"/>
-                </a:solidFill>
-              </a:rPr>
-              <a:t>		onthoud coördinaat</a:t>
+              <a:t>			onthoud coördinaat</a:t>
             </a:r>
           </a:p>
           <a:p>
@@ -7567,15 +7482,7 @@
                   <a:schemeClr val="tx1"/>
                 </a:solidFill>
               </a:rPr>
-              <a:t>	</a:t>
-            </a:r>
-            <a:r>
-              <a:rPr lang="nl-NL" sz="2000" dirty="0" smtClean="0">
-                <a:solidFill>
-                  <a:schemeClr val="tx1"/>
-                </a:solidFill>
-              </a:rPr>
-              <a:t>plaats huis met beste coördinaat</a:t>
+              <a:t>	plaats huis met beste coördinaat</a:t>
             </a:r>
           </a:p>
           <a:p>
@@ -7588,15 +7495,7 @@
                   <a:schemeClr val="tx1"/>
                 </a:solidFill>
               </a:rPr>
-              <a:t>	</a:t>
-            </a:r>
-            <a:r>
-              <a:rPr lang="nl-NL" sz="2000" dirty="0" smtClean="0">
-                <a:solidFill>
-                  <a:schemeClr val="tx1"/>
-                </a:solidFill>
-              </a:rPr>
-              <a:t>verwijder onmogelijke coördinaten</a:t>
+              <a:t>	verwijder onmogelijke coördinaten</a:t>
             </a:r>
           </a:p>
           <a:p>
@@ -7614,18 +7513,13 @@
               <a:buNone/>
             </a:pPr>
             <a:r>
-              <a:rPr lang="nl-NL" sz="2000" dirty="0" smtClean="0">
+              <a:rPr lang="nl-NL" sz="2000" dirty="0">
                 <a:solidFill>
                   <a:schemeClr val="tx1"/>
                 </a:solidFill>
               </a:rPr>
               <a:t>scorefunctie + visualisatie</a:t>
             </a:r>
-            <a:endParaRPr lang="nl-NL" sz="2000" dirty="0">
-              <a:solidFill>
-                <a:schemeClr val="tx1"/>
-              </a:solidFill>
-            </a:endParaRPr>
           </a:p>
         </p:txBody>
       </p:sp>
@@ -7650,7 +7544,7 @@
           <a:lstStyle/>
           <a:p>
             <a:r>
-              <a:rPr lang="en-US" dirty="0" smtClean="0"/>
+              <a:rPr lang="en-US" dirty="0"/>
               <a:t>Greedy</a:t>
             </a:r>
             <a:endParaRPr lang="nl-NL" dirty="0"/>
@@ -7681,32 +7575,26 @@
           <a:p>
             <a:r>
               <a:rPr lang="nl-NL" dirty="0"/>
-              <a:t>W</a:t>
-            </a:r>
-            <a:r>
-              <a:rPr lang="nl-NL" dirty="0" smtClean="0"/>
-              <a:t>aarde:</a:t>
-            </a:r>
-          </a:p>
-          <a:p>
-            <a:r>
-              <a:rPr lang="nl-NL" dirty="0" smtClean="0"/>
+              <a:t>Waarde:</a:t>
+            </a:r>
+          </a:p>
+          <a:p>
+            <a:r>
+              <a:rPr lang="nl-NL" dirty="0"/>
               <a:t>€11.343.076</a:t>
             </a:r>
-            <a:endParaRPr lang="nl-NL" dirty="0"/>
-          </a:p>
-          <a:p>
-            <a:r>
-              <a:rPr lang="nl-NL" dirty="0" smtClean="0"/>
+          </a:p>
+          <a:p>
+            <a:r>
+              <a:rPr lang="nl-NL" dirty="0"/>
               <a:t>Minimale waarde:</a:t>
             </a:r>
           </a:p>
           <a:p>
             <a:r>
-              <a:rPr lang="nl-NL" dirty="0" smtClean="0"/>
+              <a:rPr lang="nl-NL" dirty="0"/>
               <a:t>€7.245.000</a:t>
             </a:r>
-            <a:endParaRPr lang="nl-NL" dirty="0"/>
           </a:p>
         </p:txBody>
       </p:sp>
@@ -7734,32 +7622,26 @@
           <a:p>
             <a:r>
               <a:rPr lang="nl-NL" dirty="0"/>
-              <a:t>W</a:t>
-            </a:r>
-            <a:r>
-              <a:rPr lang="nl-NL" dirty="0" smtClean="0"/>
-              <a:t>aarde:</a:t>
-            </a:r>
-          </a:p>
-          <a:p>
-            <a:r>
-              <a:rPr lang="nl-NL" dirty="0" smtClean="0"/>
+              <a:t>Waarde:</a:t>
+            </a:r>
+          </a:p>
+          <a:p>
+            <a:r>
+              <a:rPr lang="nl-NL" dirty="0"/>
               <a:t>€25.159.019</a:t>
             </a:r>
-            <a:endParaRPr lang="nl-NL" dirty="0"/>
-          </a:p>
-          <a:p>
-            <a:r>
-              <a:rPr lang="nl-NL" dirty="0" smtClean="0"/>
+          </a:p>
+          <a:p>
+            <a:r>
+              <a:rPr lang="nl-NL" dirty="0"/>
               <a:t>Minimale waarde:</a:t>
             </a:r>
           </a:p>
           <a:p>
             <a:r>
-              <a:rPr lang="nl-NL" dirty="0" smtClean="0"/>
+              <a:rPr lang="nl-NL" dirty="0"/>
               <a:t>€21.735.000</a:t>
             </a:r>
-            <a:endParaRPr lang="nl-NL" dirty="0"/>
           </a:p>
         </p:txBody>
       </p:sp>
@@ -7787,59 +7669,53 @@
           <a:p>
             <a:r>
               <a:rPr lang="nl-NL" dirty="0"/>
-              <a:t>W</a:t>
-            </a:r>
-            <a:r>
-              <a:rPr lang="nl-NL" dirty="0" smtClean="0"/>
-              <a:t>aarde:</a:t>
-            </a:r>
-          </a:p>
-          <a:p>
-            <a:r>
-              <a:rPr lang="nl-NL" smtClean="0"/>
+              <a:t>Waarde:</a:t>
+            </a:r>
+          </a:p>
+          <a:p>
+            <a:r>
+              <a:rPr lang="nl-NL" dirty="0"/>
               <a:t>€18.443.199</a:t>
             </a:r>
-            <a:endParaRPr lang="nl-NL" dirty="0"/>
-          </a:p>
-          <a:p>
-            <a:r>
-              <a:rPr lang="nl-NL" dirty="0" smtClean="0"/>
+          </a:p>
+          <a:p>
+            <a:r>
+              <a:rPr lang="nl-NL" dirty="0"/>
               <a:t>Minimale waarde:</a:t>
             </a:r>
           </a:p>
           <a:p>
             <a:r>
-              <a:rPr lang="nl-NL" dirty="0" smtClean="0"/>
+              <a:rPr lang="nl-NL" dirty="0"/>
               <a:t>€14.490.000</a:t>
             </a:r>
-            <a:endParaRPr lang="nl-NL" dirty="0"/>
           </a:p>
         </p:txBody>
       </p:sp>
       <p:pic>
         <p:nvPicPr>
-          <p:cNvPr id="3" name="Afbeelding 2"/>
+          <p:cNvPr id="11" name="Afbeelding 10">
+            <a:extLst>
+              <a:ext uri="{FF2B5EF4-FFF2-40B4-BE49-F238E27FC236}">
+                <a16:creationId xmlns:a16="http://schemas.microsoft.com/office/drawing/2014/main" id="{F34866F7-7D8E-4B87-8C00-40C07F23C14A}"/>
+              </a:ext>
+            </a:extLst>
+          </p:cNvPr>
           <p:cNvPicPr>
             <a:picLocks noChangeAspect="1"/>
           </p:cNvPicPr>
           <p:nvPr/>
         </p:nvPicPr>
         <p:blipFill>
-          <a:blip r:embed="rId2">
-            <a:extLst>
-              <a:ext uri="{28A0092B-C50C-407E-A947-70E740481C1C}">
-                <a14:useLocalDpi xmlns:a14="http://schemas.microsoft.com/office/drawing/2010/main" val="0"/>
-              </a:ext>
-            </a:extLst>
-          </a:blip>
+          <a:blip r:embed="rId2"/>
           <a:stretch>
             <a:fillRect/>
           </a:stretch>
         </p:blipFill>
         <p:spPr>
           <a:xfrm>
-            <a:off x="9003544" y="1"/>
-            <a:ext cx="3188455" cy="2416260"/>
+            <a:off x="9030115" y="-38079"/>
+            <a:ext cx="3161885" cy="2371414"/>
           </a:xfrm>
           <a:prstGeom prst="rect">
             <a:avLst/>
@@ -7848,28 +7724,28 @@
       </p:pic>
       <p:pic>
         <p:nvPicPr>
-          <p:cNvPr id="8" name="Afbeelding 7"/>
+          <p:cNvPr id="13" name="Afbeelding 12">
+            <a:extLst>
+              <a:ext uri="{FF2B5EF4-FFF2-40B4-BE49-F238E27FC236}">
+                <a16:creationId xmlns:a16="http://schemas.microsoft.com/office/drawing/2014/main" id="{7F380EBC-1A60-44D3-8653-DC6B2533E7F2}"/>
+              </a:ext>
+            </a:extLst>
+          </p:cNvPr>
           <p:cNvPicPr>
             <a:picLocks noChangeAspect="1"/>
           </p:cNvPicPr>
           <p:nvPr/>
         </p:nvPicPr>
         <p:blipFill>
-          <a:blip r:embed="rId3">
-            <a:extLst>
-              <a:ext uri="{28A0092B-C50C-407E-A947-70E740481C1C}">
-                <a14:useLocalDpi xmlns:a14="http://schemas.microsoft.com/office/drawing/2010/main" val="0"/>
-              </a:ext>
-            </a:extLst>
-          </a:blip>
+          <a:blip r:embed="rId3"/>
           <a:stretch>
             <a:fillRect/>
           </a:stretch>
         </p:blipFill>
         <p:spPr>
           <a:xfrm>
-            <a:off x="9003545" y="2158400"/>
-            <a:ext cx="3188455" cy="2371414"/>
+            <a:off x="9030116" y="2203158"/>
+            <a:ext cx="3161884" cy="2371413"/>
           </a:xfrm>
           <a:prstGeom prst="rect">
             <a:avLst/>
@@ -7878,28 +7754,28 @@
       </p:pic>
       <p:pic>
         <p:nvPicPr>
-          <p:cNvPr id="9" name="Afbeelding 8"/>
+          <p:cNvPr id="15" name="Afbeelding 14">
+            <a:extLst>
+              <a:ext uri="{FF2B5EF4-FFF2-40B4-BE49-F238E27FC236}">
+                <a16:creationId xmlns:a16="http://schemas.microsoft.com/office/drawing/2014/main" id="{2EA8CAB5-D0D7-448D-9231-454DFBAB9E64}"/>
+              </a:ext>
+            </a:extLst>
+          </p:cNvPr>
           <p:cNvPicPr>
             <a:picLocks noChangeAspect="1"/>
           </p:cNvPicPr>
           <p:nvPr/>
         </p:nvPicPr>
         <p:blipFill>
-          <a:blip r:embed="rId4">
-            <a:extLst>
-              <a:ext uri="{28A0092B-C50C-407E-A947-70E740481C1C}">
-                <a14:useLocalDpi xmlns:a14="http://schemas.microsoft.com/office/drawing/2010/main" val="0"/>
-              </a:ext>
-            </a:extLst>
-          </a:blip>
+          <a:blip r:embed="rId4"/>
           <a:stretch>
             <a:fillRect/>
           </a:stretch>
         </p:blipFill>
         <p:spPr>
           <a:xfrm>
-            <a:off x="9003545" y="4524665"/>
-            <a:ext cx="3188455" cy="2371413"/>
+            <a:off x="9030114" y="4486586"/>
+            <a:ext cx="3161885" cy="2371414"/>
           </a:xfrm>
           <a:prstGeom prst="rect">
             <a:avLst/>
@@ -7962,7 +7838,7 @@
               <a:buNone/>
             </a:pPr>
             <a:r>
-              <a:rPr lang="nl-NL" sz="2000" dirty="0" smtClean="0">
+              <a:rPr lang="nl-NL" sz="2000" dirty="0">
                 <a:solidFill>
                   <a:schemeClr val="tx1"/>
                 </a:solidFill>
@@ -7985,7 +7861,7 @@
               <a:buNone/>
             </a:pPr>
             <a:r>
-              <a:rPr lang="nl-NL" sz="2000" dirty="0" smtClean="0">
+              <a:rPr lang="nl-NL" sz="2000" dirty="0">
                 <a:solidFill>
                   <a:schemeClr val="tx1"/>
                 </a:solidFill>
@@ -8003,18 +7879,10 @@
                   <a:schemeClr val="tx1"/>
                 </a:solidFill>
               </a:rPr>
-              <a:t>	</a:t>
-            </a:r>
-            <a:r>
-              <a:rPr lang="nl-NL" sz="2000" dirty="0" smtClean="0">
-                <a:solidFill>
-                  <a:schemeClr val="tx1"/>
-                </a:solidFill>
-              </a:rPr>
-              <a:t>(</a:t>
-            </a:r>
-            <a:r>
-              <a:rPr lang="nl-NL" sz="2000" dirty="0" err="1" smtClean="0">
+              <a:t>	(</a:t>
+            </a:r>
+            <a:r>
+              <a:rPr lang="nl-NL" sz="2000" dirty="0" err="1">
                 <a:solidFill>
                   <a:schemeClr val="tx1"/>
                 </a:solidFill>
@@ -8022,7 +7890,7 @@
               <a:t>if</a:t>
             </a:r>
             <a:r>
-              <a:rPr lang="nl-NL" sz="2000" dirty="0" smtClean="0">
+              <a:rPr lang="nl-NL" sz="2000" dirty="0">
                 <a:solidFill>
                   <a:schemeClr val="tx1"/>
                 </a:solidFill>
@@ -8040,17 +7908,37 @@
                   <a:schemeClr val="tx1"/>
                 </a:solidFill>
               </a:rPr>
-              <a:t>a</a:t>
-            </a:r>
-            <a:r>
-              <a:rPr lang="nl-NL" sz="2000" dirty="0" smtClean="0">
-                <a:solidFill>
-                  <a:schemeClr val="tx1"/>
-                </a:solidFill>
-              </a:rPr>
-              <a:t>ccepteer verandering</a:t>
-            </a:r>
+              <a:t>accepteer verandering</a:t>
+            </a:r>
+          </a:p>
+          <a:p>
+            <a:pPr marL="800100" lvl="2" indent="0">
+              <a:buNone/>
+            </a:pPr>
             <a:endParaRPr lang="nl-NL" sz="2000" dirty="0">
+              <a:solidFill>
+                <a:schemeClr val="tx1"/>
+              </a:solidFill>
+            </a:endParaRPr>
+          </a:p>
+          <a:p>
+            <a:pPr marL="0" indent="0">
+              <a:buNone/>
+            </a:pPr>
+            <a:r>
+              <a:rPr lang="nl-NL" sz="2000" dirty="0">
+                <a:solidFill>
+                  <a:schemeClr val="tx1"/>
+                </a:solidFill>
+              </a:rPr>
+              <a:t>scorefunctie + visualisatie</a:t>
+            </a:r>
+          </a:p>
+          <a:p>
+            <a:pPr marL="0" indent="0">
+              <a:buNone/>
+            </a:pPr>
+            <a:endParaRPr lang="nl-NL" sz="2400" dirty="0">
               <a:solidFill>
                 <a:schemeClr val="tx1"/>
               </a:solidFill>
@@ -8079,17 +7967,619 @@
           <a:lstStyle/>
           <a:p>
             <a:r>
-              <a:rPr lang="en-US" dirty="0" smtClean="0"/>
+              <a:rPr lang="en-US" dirty="0"/>
               <a:t>Hill Climbing</a:t>
             </a:r>
             <a:endParaRPr lang="nl-NL" dirty="0"/>
           </a:p>
         </p:txBody>
       </p:sp>
+      <p:sp>
+        <p:nvSpPr>
+          <p:cNvPr id="4" name="Tekstvak 3">
+            <a:extLst>
+              <a:ext uri="{FF2B5EF4-FFF2-40B4-BE49-F238E27FC236}">
+                <a16:creationId xmlns:a16="http://schemas.microsoft.com/office/drawing/2014/main" id="{27E1EB4F-5AAE-4B80-95B9-1FB1FC0CDF72}"/>
+              </a:ext>
+            </a:extLst>
+          </p:cNvPr>
+          <p:cNvSpPr txBox="1"/>
+          <p:nvPr/>
+        </p:nvSpPr>
+        <p:spPr>
+          <a:xfrm>
+            <a:off x="6787166" y="961654"/>
+            <a:ext cx="2216379" cy="1200329"/>
+          </a:xfrm>
+          <a:prstGeom prst="rect">
+            <a:avLst/>
+          </a:prstGeom>
+          <a:noFill/>
+        </p:spPr>
+        <p:txBody>
+          <a:bodyPr wrap="square" rtlCol="0">
+            <a:spAutoFit/>
+          </a:bodyPr>
+          <a:lstStyle/>
+          <a:p>
+            <a:r>
+              <a:rPr lang="nl-NL" dirty="0"/>
+              <a:t>Waarde:</a:t>
+            </a:r>
+          </a:p>
+          <a:p>
+            <a:r>
+              <a:rPr lang="nl-NL" dirty="0"/>
+              <a:t>€12.152.965</a:t>
+            </a:r>
+          </a:p>
+          <a:p>
+            <a:r>
+              <a:rPr lang="nl-NL" dirty="0"/>
+              <a:t>Minimale waarde:</a:t>
+            </a:r>
+          </a:p>
+          <a:p>
+            <a:r>
+              <a:rPr lang="nl-NL" dirty="0"/>
+              <a:t>€7.245.000</a:t>
+            </a:r>
+          </a:p>
+        </p:txBody>
+      </p:sp>
+      <p:sp>
+        <p:nvSpPr>
+          <p:cNvPr id="5" name="Tekstvak 4">
+            <a:extLst>
+              <a:ext uri="{FF2B5EF4-FFF2-40B4-BE49-F238E27FC236}">
+                <a16:creationId xmlns:a16="http://schemas.microsoft.com/office/drawing/2014/main" id="{36077301-52CE-4C94-BC79-365B3C5B0C11}"/>
+              </a:ext>
+            </a:extLst>
+          </p:cNvPr>
+          <p:cNvSpPr txBox="1"/>
+          <p:nvPr/>
+        </p:nvSpPr>
+        <p:spPr>
+          <a:xfrm>
+            <a:off x="6787166" y="2623410"/>
+            <a:ext cx="2216379" cy="1200329"/>
+          </a:xfrm>
+          <a:prstGeom prst="rect">
+            <a:avLst/>
+          </a:prstGeom>
+          <a:noFill/>
+        </p:spPr>
+        <p:txBody>
+          <a:bodyPr wrap="square" rtlCol="0">
+            <a:spAutoFit/>
+          </a:bodyPr>
+          <a:lstStyle/>
+          <a:p>
+            <a:r>
+              <a:rPr lang="nl-NL" dirty="0"/>
+              <a:t>Waarde:</a:t>
+            </a:r>
+          </a:p>
+          <a:p>
+            <a:r>
+              <a:rPr lang="nl-NL" dirty="0"/>
+              <a:t>€19.663.836</a:t>
+            </a:r>
+          </a:p>
+          <a:p>
+            <a:r>
+              <a:rPr lang="nl-NL" dirty="0"/>
+              <a:t>Minimale waarde:</a:t>
+            </a:r>
+          </a:p>
+          <a:p>
+            <a:r>
+              <a:rPr lang="nl-NL" dirty="0"/>
+              <a:t>€14.490.000</a:t>
+            </a:r>
+          </a:p>
+        </p:txBody>
+      </p:sp>
+      <p:sp>
+        <p:nvSpPr>
+          <p:cNvPr id="7" name="Tekstvak 6">
+            <a:extLst>
+              <a:ext uri="{FF2B5EF4-FFF2-40B4-BE49-F238E27FC236}">
+                <a16:creationId xmlns:a16="http://schemas.microsoft.com/office/drawing/2014/main" id="{A6BCA1B6-567F-4B1E-A776-0C4F6AF5097A}"/>
+              </a:ext>
+            </a:extLst>
+          </p:cNvPr>
+          <p:cNvSpPr txBox="1"/>
+          <p:nvPr/>
+        </p:nvSpPr>
+        <p:spPr>
+          <a:xfrm>
+            <a:off x="6787166" y="4874654"/>
+            <a:ext cx="2216379" cy="1200329"/>
+          </a:xfrm>
+          <a:prstGeom prst="rect">
+            <a:avLst/>
+          </a:prstGeom>
+          <a:noFill/>
+        </p:spPr>
+        <p:txBody>
+          <a:bodyPr wrap="square" rtlCol="0">
+            <a:spAutoFit/>
+          </a:bodyPr>
+          <a:lstStyle/>
+          <a:p>
+            <a:r>
+              <a:rPr lang="nl-NL" dirty="0"/>
+              <a:t>Waarde:</a:t>
+            </a:r>
+          </a:p>
+          <a:p>
+            <a:r>
+              <a:rPr lang="nl-NL" dirty="0"/>
+              <a:t>€25.807.061</a:t>
+            </a:r>
+          </a:p>
+          <a:p>
+            <a:r>
+              <a:rPr lang="nl-NL" dirty="0"/>
+              <a:t>Minimale waarde:</a:t>
+            </a:r>
+          </a:p>
+          <a:p>
+            <a:r>
+              <a:rPr lang="nl-NL" dirty="0"/>
+              <a:t>€21.735.000</a:t>
+            </a:r>
+          </a:p>
+        </p:txBody>
+      </p:sp>
+      <p:pic>
+        <p:nvPicPr>
+          <p:cNvPr id="16" name="Afbeelding 15">
+            <a:extLst>
+              <a:ext uri="{FF2B5EF4-FFF2-40B4-BE49-F238E27FC236}">
+                <a16:creationId xmlns:a16="http://schemas.microsoft.com/office/drawing/2014/main" id="{17CF2297-E03D-4A0C-AFB9-F58DEF3C6B5D}"/>
+              </a:ext>
+            </a:extLst>
+          </p:cNvPr>
+          <p:cNvPicPr>
+            <a:picLocks noChangeAspect="1"/>
+          </p:cNvPicPr>
+          <p:nvPr/>
+        </p:nvPicPr>
+        <p:blipFill>
+          <a:blip r:embed="rId2"/>
+          <a:stretch>
+            <a:fillRect/>
+          </a:stretch>
+        </p:blipFill>
+        <p:spPr>
+          <a:xfrm>
+            <a:off x="8992014" y="-18200"/>
+            <a:ext cx="3199985" cy="2399989"/>
+          </a:xfrm>
+          <a:prstGeom prst="rect">
+            <a:avLst/>
+          </a:prstGeom>
+        </p:spPr>
+      </p:pic>
+      <p:pic>
+        <p:nvPicPr>
+          <p:cNvPr id="18" name="Afbeelding 17">
+            <a:extLst>
+              <a:ext uri="{FF2B5EF4-FFF2-40B4-BE49-F238E27FC236}">
+                <a16:creationId xmlns:a16="http://schemas.microsoft.com/office/drawing/2014/main" id="{7A8BCA89-BFEE-4016-8E36-FE1D406E91B6}"/>
+              </a:ext>
+            </a:extLst>
+          </p:cNvPr>
+          <p:cNvPicPr>
+            <a:picLocks noChangeAspect="1"/>
+          </p:cNvPicPr>
+          <p:nvPr/>
+        </p:nvPicPr>
+        <p:blipFill>
+          <a:blip r:embed="rId3"/>
+          <a:stretch>
+            <a:fillRect/>
+          </a:stretch>
+        </p:blipFill>
+        <p:spPr>
+          <a:xfrm>
+            <a:off x="8992014" y="2272089"/>
+            <a:ext cx="3199986" cy="2399989"/>
+          </a:xfrm>
+          <a:prstGeom prst="rect">
+            <a:avLst/>
+          </a:prstGeom>
+        </p:spPr>
+      </p:pic>
+      <p:pic>
+        <p:nvPicPr>
+          <p:cNvPr id="20" name="Afbeelding 19">
+            <a:extLst>
+              <a:ext uri="{FF2B5EF4-FFF2-40B4-BE49-F238E27FC236}">
+                <a16:creationId xmlns:a16="http://schemas.microsoft.com/office/drawing/2014/main" id="{390C84EA-2599-482A-AB51-0591723D3369}"/>
+              </a:ext>
+            </a:extLst>
+          </p:cNvPr>
+          <p:cNvPicPr>
+            <a:picLocks noChangeAspect="1"/>
+          </p:cNvPicPr>
+          <p:nvPr/>
+        </p:nvPicPr>
+        <p:blipFill>
+          <a:blip r:embed="rId4"/>
+          <a:stretch>
+            <a:fillRect/>
+          </a:stretch>
+        </p:blipFill>
+        <p:spPr>
+          <a:xfrm>
+            <a:off x="8992011" y="4509152"/>
+            <a:ext cx="3199987" cy="2399990"/>
+          </a:xfrm>
+          <a:prstGeom prst="rect">
+            <a:avLst/>
+          </a:prstGeom>
+        </p:spPr>
+      </p:pic>
     </p:spTree>
     <p:extLst>
       <p:ext uri="{BB962C8B-B14F-4D97-AF65-F5344CB8AC3E}">
         <p14:creationId xmlns:p14="http://schemas.microsoft.com/office/powerpoint/2010/main" val="2307696771"/>
+      </p:ext>
+    </p:extLst>
+  </p:cSld>
+  <p:clrMapOvr>
+    <a:masterClrMapping/>
+  </p:clrMapOvr>
+</p:sld>
+</file>
+
+<file path=ppt/slides/slide8.xml><?xml version="1.0" encoding="utf-8"?>
+<p:sld xmlns:a="http://schemas.openxmlformats.org/drawingml/2006/main" xmlns:r="http://schemas.openxmlformats.org/officeDocument/2006/relationships" xmlns:p="http://schemas.openxmlformats.org/presentationml/2006/main">
+  <p:cSld>
+    <p:spTree>
+      <p:nvGrpSpPr>
+        <p:cNvPr id="1" name=""/>
+        <p:cNvGrpSpPr/>
+        <p:nvPr/>
+      </p:nvGrpSpPr>
+      <p:grpSpPr>
+        <a:xfrm>
+          <a:off x="0" y="0"/>
+          <a:ext cx="0" cy="0"/>
+          <a:chOff x="0" y="0"/>
+          <a:chExt cx="0" cy="0"/>
+        </a:xfrm>
+      </p:grpSpPr>
+      <p:sp>
+        <p:nvSpPr>
+          <p:cNvPr id="2" name="Titel 1">
+            <a:extLst>
+              <a:ext uri="{FF2B5EF4-FFF2-40B4-BE49-F238E27FC236}">
+                <a16:creationId xmlns:a16="http://schemas.microsoft.com/office/drawing/2014/main" id="{BE427743-E54B-4DDE-9B02-D560B10387DB}"/>
+              </a:ext>
+            </a:extLst>
+          </p:cNvPr>
+          <p:cNvSpPr>
+            <a:spLocks noGrp="1"/>
+          </p:cNvSpPr>
+          <p:nvPr>
+            <p:ph type="title"/>
+          </p:nvPr>
+        </p:nvSpPr>
+        <p:spPr/>
+        <p:txBody>
+          <a:bodyPr/>
+          <a:lstStyle/>
+          <a:p>
+            <a:r>
+              <a:rPr lang="nl-NL" dirty="0"/>
+              <a:t>Experimenten</a:t>
+            </a:r>
+          </a:p>
+        </p:txBody>
+      </p:sp>
+      <p:sp>
+        <p:nvSpPr>
+          <p:cNvPr id="3" name="Tijdelijke aanduiding voor inhoud 2">
+            <a:extLst>
+              <a:ext uri="{FF2B5EF4-FFF2-40B4-BE49-F238E27FC236}">
+                <a16:creationId xmlns:a16="http://schemas.microsoft.com/office/drawing/2014/main" id="{4C2E54A3-095D-4219-8E8A-FB662372F717}"/>
+              </a:ext>
+            </a:extLst>
+          </p:cNvPr>
+          <p:cNvSpPr>
+            <a:spLocks noGrp="1"/>
+          </p:cNvSpPr>
+          <p:nvPr>
+            <p:ph idx="1"/>
+          </p:nvPr>
+        </p:nvSpPr>
+        <p:spPr>
+          <a:xfrm>
+            <a:off x="677334" y="1669774"/>
+            <a:ext cx="8596668" cy="4996069"/>
+          </a:xfrm>
+        </p:spPr>
+        <p:txBody>
+          <a:bodyPr>
+            <a:normAutofit/>
+          </a:bodyPr>
+          <a:lstStyle/>
+          <a:p>
+            <a:r>
+              <a:rPr lang="nl-NL" dirty="0">
+                <a:solidFill>
+                  <a:schemeClr val="tx1"/>
+                </a:solidFill>
+              </a:rPr>
+              <a:t>500x uitvoeren van:</a:t>
+            </a:r>
+          </a:p>
+          <a:p>
+            <a:pPr lvl="1"/>
+            <a:r>
+              <a:rPr lang="nl-NL" dirty="0">
+                <a:solidFill>
+                  <a:schemeClr val="tx1"/>
+                </a:solidFill>
+              </a:rPr>
+              <a:t>Random</a:t>
+            </a:r>
+          </a:p>
+          <a:p>
+            <a:pPr lvl="1"/>
+            <a:r>
+              <a:rPr lang="nl-NL" dirty="0" err="1">
+                <a:solidFill>
+                  <a:schemeClr val="tx1"/>
+                </a:solidFill>
+              </a:rPr>
+              <a:t>Greedy</a:t>
+            </a:r>
+            <a:endParaRPr lang="nl-NL" dirty="0">
+              <a:solidFill>
+                <a:schemeClr val="tx1"/>
+              </a:solidFill>
+            </a:endParaRPr>
+          </a:p>
+          <a:p>
+            <a:pPr lvl="1"/>
+            <a:r>
+              <a:rPr lang="nl-NL" dirty="0" err="1">
+                <a:solidFill>
+                  <a:schemeClr val="tx1"/>
+                </a:solidFill>
+              </a:rPr>
+              <a:t>Hillclimber</a:t>
+            </a:r>
+            <a:endParaRPr lang="nl-NL" dirty="0">
+              <a:solidFill>
+                <a:schemeClr val="tx1"/>
+              </a:solidFill>
+            </a:endParaRPr>
+          </a:p>
+          <a:p>
+            <a:pPr lvl="2"/>
+            <a:r>
+              <a:rPr lang="nl-NL" dirty="0">
+                <a:solidFill>
+                  <a:schemeClr val="tx1"/>
+                </a:solidFill>
+              </a:rPr>
+              <a:t>Verschillende percentages (nu 50% kans op verplaatsen, 25% kans op ruilen en 25% kans op roteren)</a:t>
+            </a:r>
+          </a:p>
+          <a:p>
+            <a:pPr lvl="1"/>
+            <a:r>
+              <a:rPr lang="nl-NL" dirty="0" err="1">
+                <a:solidFill>
+                  <a:schemeClr val="tx1"/>
+                </a:solidFill>
+              </a:rPr>
+              <a:t>Simulated</a:t>
+            </a:r>
+            <a:r>
+              <a:rPr lang="nl-NL" dirty="0">
+                <a:solidFill>
+                  <a:schemeClr val="tx1"/>
+                </a:solidFill>
+              </a:rPr>
+              <a:t> </a:t>
+            </a:r>
+            <a:r>
+              <a:rPr lang="nl-NL" dirty="0" err="1">
+                <a:solidFill>
+                  <a:schemeClr val="tx1"/>
+                </a:solidFill>
+              </a:rPr>
+              <a:t>annealing</a:t>
+            </a:r>
+            <a:r>
+              <a:rPr lang="nl-NL" dirty="0">
+                <a:solidFill>
+                  <a:schemeClr val="tx1"/>
+                </a:solidFill>
+              </a:rPr>
+              <a:t> </a:t>
+            </a:r>
+          </a:p>
+          <a:p>
+            <a:pPr lvl="1"/>
+            <a:r>
+              <a:rPr lang="nl-NL" dirty="0" err="1">
+                <a:solidFill>
+                  <a:schemeClr val="tx1"/>
+                </a:solidFill>
+              </a:rPr>
+              <a:t>Particle</a:t>
+            </a:r>
+            <a:r>
+              <a:rPr lang="nl-NL" dirty="0">
+                <a:solidFill>
+                  <a:schemeClr val="tx1"/>
+                </a:solidFill>
+              </a:rPr>
+              <a:t> </a:t>
+            </a:r>
+            <a:r>
+              <a:rPr lang="nl-NL" dirty="0" err="1">
+                <a:solidFill>
+                  <a:schemeClr val="tx1"/>
+                </a:solidFill>
+              </a:rPr>
+              <a:t>Swarm</a:t>
+            </a:r>
+            <a:endParaRPr lang="nl-NL" dirty="0">
+              <a:solidFill>
+                <a:schemeClr val="tx1"/>
+              </a:solidFill>
+            </a:endParaRPr>
+          </a:p>
+          <a:p>
+            <a:pPr lvl="2"/>
+            <a:endParaRPr lang="nl-NL" dirty="0">
+              <a:solidFill>
+                <a:schemeClr val="tx1"/>
+              </a:solidFill>
+            </a:endParaRPr>
+          </a:p>
+          <a:p>
+            <a:r>
+              <a:rPr lang="nl-NL" dirty="0">
+                <a:solidFill>
+                  <a:schemeClr val="tx1"/>
+                </a:solidFill>
+              </a:rPr>
+              <a:t>Opslaan in een histogram</a:t>
+            </a:r>
+          </a:p>
+          <a:p>
+            <a:pPr lvl="1"/>
+            <a:r>
+              <a:rPr lang="nl-NL" dirty="0" err="1">
+                <a:solidFill>
+                  <a:schemeClr val="tx1"/>
+                </a:solidFill>
+              </a:rPr>
+              <a:t>Matplotlib</a:t>
+            </a:r>
+            <a:r>
+              <a:rPr lang="nl-NL" dirty="0">
+                <a:solidFill>
+                  <a:schemeClr val="tx1"/>
+                </a:solidFill>
+              </a:rPr>
+              <a:t> of HTML?</a:t>
+            </a:r>
+          </a:p>
+          <a:p>
+            <a:pPr lvl="1"/>
+            <a:r>
+              <a:rPr lang="nl-NL" dirty="0">
+                <a:solidFill>
+                  <a:schemeClr val="tx1"/>
+                </a:solidFill>
+              </a:rPr>
+              <a:t>Mogelijkheid tot vergelijken van histogrammen</a:t>
+            </a:r>
+          </a:p>
+        </p:txBody>
+      </p:sp>
+    </p:spTree>
+    <p:extLst>
+      <p:ext uri="{BB962C8B-B14F-4D97-AF65-F5344CB8AC3E}">
+        <p14:creationId xmlns:p14="http://schemas.microsoft.com/office/powerpoint/2010/main" val="4105300462"/>
+      </p:ext>
+    </p:extLst>
+  </p:cSld>
+  <p:clrMapOvr>
+    <a:masterClrMapping/>
+  </p:clrMapOvr>
+</p:sld>
+</file>
+
+<file path=ppt/slides/slide9.xml><?xml version="1.0" encoding="utf-8"?>
+<p:sld xmlns:a="http://schemas.openxmlformats.org/drawingml/2006/main" xmlns:r="http://schemas.openxmlformats.org/officeDocument/2006/relationships" xmlns:p="http://schemas.openxmlformats.org/presentationml/2006/main">
+  <p:cSld>
+    <p:spTree>
+      <p:nvGrpSpPr>
+        <p:cNvPr id="1" name=""/>
+        <p:cNvGrpSpPr/>
+        <p:nvPr/>
+      </p:nvGrpSpPr>
+      <p:grpSpPr>
+        <a:xfrm>
+          <a:off x="0" y="0"/>
+          <a:ext cx="0" cy="0"/>
+          <a:chOff x="0" y="0"/>
+          <a:chExt cx="0" cy="0"/>
+        </a:xfrm>
+      </p:grpSpPr>
+      <p:sp>
+        <p:nvSpPr>
+          <p:cNvPr id="2" name="Titel 1">
+            <a:extLst>
+              <a:ext uri="{FF2B5EF4-FFF2-40B4-BE49-F238E27FC236}">
+                <a16:creationId xmlns:a16="http://schemas.microsoft.com/office/drawing/2014/main" id="{D9B64C69-C97B-46D5-A2D0-E531F39A79A6}"/>
+              </a:ext>
+            </a:extLst>
+          </p:cNvPr>
+          <p:cNvSpPr>
+            <a:spLocks noGrp="1"/>
+          </p:cNvSpPr>
+          <p:nvPr>
+            <p:ph type="title"/>
+          </p:nvPr>
+        </p:nvSpPr>
+        <p:spPr/>
+        <p:txBody>
+          <a:bodyPr/>
+          <a:lstStyle/>
+          <a:p>
+            <a:r>
+              <a:rPr lang="nl-NL" dirty="0"/>
+              <a:t>Vragen?</a:t>
+            </a:r>
+          </a:p>
+        </p:txBody>
+      </p:sp>
+      <p:pic>
+        <p:nvPicPr>
+          <p:cNvPr id="15" name="Tijdelijke aanduiding voor inhoud 14">
+            <a:extLst>
+              <a:ext uri="{FF2B5EF4-FFF2-40B4-BE49-F238E27FC236}">
+                <a16:creationId xmlns:a16="http://schemas.microsoft.com/office/drawing/2014/main" id="{592FCBFD-8824-4DE0-ABFF-9FAA48829F46}"/>
+              </a:ext>
+            </a:extLst>
+          </p:cNvPr>
+          <p:cNvPicPr>
+            <a:picLocks noGrp="1" noChangeAspect="1"/>
+          </p:cNvPicPr>
+          <p:nvPr>
+            <p:ph idx="1"/>
+          </p:nvPr>
+        </p:nvPicPr>
+        <p:blipFill>
+          <a:blip r:embed="rId2"/>
+          <a:stretch>
+            <a:fillRect/>
+          </a:stretch>
+        </p:blipFill>
+        <p:spPr>
+          <a:xfrm>
+            <a:off x="677863" y="2773823"/>
+            <a:ext cx="8596312" cy="2654967"/>
+          </a:xfrm>
+        </p:spPr>
+      </p:pic>
+    </p:spTree>
+    <p:extLst>
+      <p:ext uri="{BB962C8B-B14F-4D97-AF65-F5344CB8AC3E}">
+        <p14:creationId xmlns:p14="http://schemas.microsoft.com/office/powerpoint/2010/main" val="3376446962"/>
       </p:ext>
     </p:extLst>
   </p:cSld>

</xml_diff>

<commit_message>
changed way of saving csv
</commit_message>
<xml_diff>
--- a/files/presentatie heuristieken.pptx
+++ b/files/presentatie heuristieken.pptx
@@ -7968,7 +7968,7 @@
           <a:p>
             <a:r>
               <a:rPr lang="en-US" dirty="0"/>
-              <a:t>Hill Climbing</a:t>
+              <a:t>Hillclimber</a:t>
             </a:r>
             <a:endParaRPr lang="nl-NL" dirty="0"/>
           </a:p>
@@ -8369,7 +8369,7 @@
                   <a:schemeClr val="tx1"/>
                 </a:solidFill>
               </a:rPr>
-              <a:t>Verschillende percentages (nu 50% kans op verplaatsen, 25% kans op ruilen en 25% kans op roteren)</a:t>
+              <a:t>Verschillende percentages (nu: 50% kans op verplaatsen, 25% kans op swap en 25% kans op roteren)</a:t>
             </a:r>
           </a:p>
           <a:p>

</xml_diff>